<commit_message>
v 1.34, generate uniform rectangles now require x and y offsets, manual updates
</commit_message>
<xml_diff>
--- a/Docs/User's Guide/Imagery/Excel Images.pptx
+++ b/Docs/User's Guide/Imagery/Excel Images.pptx
@@ -5,21 +5,15 @@
     <p:sldMasterId id="2147483648" r:id="rId1"/>
   </p:sldMasterIdLst>
   <p:sldIdLst>
-    <p:sldId id="265" r:id="rId2"/>
-    <p:sldId id="256" r:id="rId3"/>
-    <p:sldId id="266" r:id="rId4"/>
-    <p:sldId id="258" r:id="rId5"/>
-    <p:sldId id="257" r:id="rId6"/>
-    <p:sldId id="267" r:id="rId7"/>
-    <p:sldId id="268" r:id="rId8"/>
+    <p:sldId id="266" r:id="rId2"/>
+    <p:sldId id="270" r:id="rId3"/>
+    <p:sldId id="267" r:id="rId4"/>
+    <p:sldId id="272" r:id="rId5"/>
+    <p:sldId id="271" r:id="rId6"/>
+    <p:sldId id="265" r:id="rId7"/>
+    <p:sldId id="273" r:id="rId8"/>
     <p:sldId id="269" r:id="rId9"/>
-    <p:sldId id="270" r:id="rId10"/>
-    <p:sldId id="259" r:id="rId11"/>
-    <p:sldId id="260" r:id="rId12"/>
-    <p:sldId id="264" r:id="rId13"/>
-    <p:sldId id="261" r:id="rId14"/>
-    <p:sldId id="262" r:id="rId15"/>
-    <p:sldId id="263" r:id="rId16"/>
+    <p:sldId id="268" r:id="rId10"/>
   </p:sldIdLst>
   <p:sldSz cx="12192000" cy="6858000"/>
   <p:notesSz cx="6858000" cy="9144000"/>
@@ -275,7 +269,7 @@
           <a:p>
             <a:fld id="{4D45891E-2CD5-4CE6-8274-44086644E53A}" type="datetimeFigureOut">
               <a:rPr lang="en-CA" smtClean="0"/>
-              <a:t>2024-10-21</a:t>
+              <a:t>2024-11-19</a:t>
             </a:fld>
             <a:endParaRPr lang="en-CA"/>
           </a:p>
@@ -475,7 +469,7 @@
           <a:p>
             <a:fld id="{4D45891E-2CD5-4CE6-8274-44086644E53A}" type="datetimeFigureOut">
               <a:rPr lang="en-CA" smtClean="0"/>
-              <a:t>2024-10-21</a:t>
+              <a:t>2024-11-19</a:t>
             </a:fld>
             <a:endParaRPr lang="en-CA"/>
           </a:p>
@@ -685,7 +679,7 @@
           <a:p>
             <a:fld id="{4D45891E-2CD5-4CE6-8274-44086644E53A}" type="datetimeFigureOut">
               <a:rPr lang="en-CA" smtClean="0"/>
-              <a:t>2024-10-21</a:t>
+              <a:t>2024-11-19</a:t>
             </a:fld>
             <a:endParaRPr lang="en-CA"/>
           </a:p>
@@ -885,7 +879,7 @@
           <a:p>
             <a:fld id="{4D45891E-2CD5-4CE6-8274-44086644E53A}" type="datetimeFigureOut">
               <a:rPr lang="en-CA" smtClean="0"/>
-              <a:t>2024-10-21</a:t>
+              <a:t>2024-11-19</a:t>
             </a:fld>
             <a:endParaRPr lang="en-CA"/>
           </a:p>
@@ -1161,7 +1155,7 @@
           <a:p>
             <a:fld id="{4D45891E-2CD5-4CE6-8274-44086644E53A}" type="datetimeFigureOut">
               <a:rPr lang="en-CA" smtClean="0"/>
-              <a:t>2024-10-21</a:t>
+              <a:t>2024-11-19</a:t>
             </a:fld>
             <a:endParaRPr lang="en-CA"/>
           </a:p>
@@ -1429,7 +1423,7 @@
           <a:p>
             <a:fld id="{4D45891E-2CD5-4CE6-8274-44086644E53A}" type="datetimeFigureOut">
               <a:rPr lang="en-CA" smtClean="0"/>
-              <a:t>2024-10-21</a:t>
+              <a:t>2024-11-19</a:t>
             </a:fld>
             <a:endParaRPr lang="en-CA"/>
           </a:p>
@@ -1844,7 +1838,7 @@
           <a:p>
             <a:fld id="{4D45891E-2CD5-4CE6-8274-44086644E53A}" type="datetimeFigureOut">
               <a:rPr lang="en-CA" smtClean="0"/>
-              <a:t>2024-10-21</a:t>
+              <a:t>2024-11-19</a:t>
             </a:fld>
             <a:endParaRPr lang="en-CA"/>
           </a:p>
@@ -1986,7 +1980,7 @@
           <a:p>
             <a:fld id="{4D45891E-2CD5-4CE6-8274-44086644E53A}" type="datetimeFigureOut">
               <a:rPr lang="en-CA" smtClean="0"/>
-              <a:t>2024-10-21</a:t>
+              <a:t>2024-11-19</a:t>
             </a:fld>
             <a:endParaRPr lang="en-CA"/>
           </a:p>
@@ -2099,7 +2093,7 @@
           <a:p>
             <a:fld id="{4D45891E-2CD5-4CE6-8274-44086644E53A}" type="datetimeFigureOut">
               <a:rPr lang="en-CA" smtClean="0"/>
-              <a:t>2024-10-21</a:t>
+              <a:t>2024-11-19</a:t>
             </a:fld>
             <a:endParaRPr lang="en-CA"/>
           </a:p>
@@ -2412,7 +2406,7 @@
           <a:p>
             <a:fld id="{4D45891E-2CD5-4CE6-8274-44086644E53A}" type="datetimeFigureOut">
               <a:rPr lang="en-CA" smtClean="0"/>
-              <a:t>2024-10-21</a:t>
+              <a:t>2024-11-19</a:t>
             </a:fld>
             <a:endParaRPr lang="en-CA"/>
           </a:p>
@@ -2701,7 +2695,7 @@
           <a:p>
             <a:fld id="{4D45891E-2CD5-4CE6-8274-44086644E53A}" type="datetimeFigureOut">
               <a:rPr lang="en-CA" smtClean="0"/>
-              <a:t>2024-10-21</a:t>
+              <a:t>2024-11-19</a:t>
             </a:fld>
             <a:endParaRPr lang="en-CA"/>
           </a:p>
@@ -2944,7 +2938,7 @@
           <a:p>
             <a:fld id="{4D45891E-2CD5-4CE6-8274-44086644E53A}" type="datetimeFigureOut">
               <a:rPr lang="en-CA" smtClean="0"/>
-              <a:t>2024-10-21</a:t>
+              <a:t>2024-11-19</a:t>
             </a:fld>
             <a:endParaRPr lang="en-CA"/>
           </a:p>
@@ -3363,10 +3357,10 @@
       </p:grpSpPr>
       <p:pic>
         <p:nvPicPr>
-          <p:cNvPr id="10" name="Picture 9">
-            <a:extLst>
-              <a:ext uri="{FF2B5EF4-FFF2-40B4-BE49-F238E27FC236}">
-                <a16:creationId xmlns:a16="http://schemas.microsoft.com/office/drawing/2014/main" id="{6A1A72DE-4126-E962-80B1-AC71063E29BB}"/>
+          <p:cNvPr id="20" name="Picture 19">
+            <a:extLst>
+              <a:ext uri="{FF2B5EF4-FFF2-40B4-BE49-F238E27FC236}">
+                <a16:creationId xmlns:a16="http://schemas.microsoft.com/office/drawing/2014/main" id="{791118DB-CA84-0BEF-F93E-2BFF63DA1F1F}"/>
               </a:ext>
             </a:extLst>
           </p:cNvPr>
@@ -3376,20 +3370,321 @@
           <p:nvPr/>
         </p:nvPicPr>
         <p:blipFill>
-          <a:blip r:embed="rId2"/>
-          <a:srcRect b="64945"/>
-          <a:stretch/>
+          <a:blip r:embed="rId2">
+            <a:extLst>
+              <a:ext uri="{28A0092B-C50C-407E-A947-70E740481C1C}">
+                <a14:useLocalDpi xmlns:a14="http://schemas.microsoft.com/office/drawing/2010/main" val="0"/>
+              </a:ext>
+            </a:extLst>
+          </a:blip>
+          <a:stretch>
+            <a:fillRect/>
+          </a:stretch>
         </p:blipFill>
         <p:spPr>
           <a:xfrm>
-            <a:off x="242070" y="1309392"/>
-            <a:ext cx="11707859" cy="1486060"/>
+            <a:off x="0" y="957197"/>
+            <a:ext cx="12192000" cy="4500701"/>
           </a:xfrm>
           <a:prstGeom prst="rect">
             <a:avLst/>
           </a:prstGeom>
         </p:spPr>
       </p:pic>
+    </p:spTree>
+    <p:extLst>
+      <p:ext uri="{BB962C8B-B14F-4D97-AF65-F5344CB8AC3E}">
+        <p14:creationId xmlns:p14="http://schemas.microsoft.com/office/powerpoint/2010/main" val="1597172770"/>
+      </p:ext>
+    </p:extLst>
+  </p:cSld>
+  <p:clrMapOvr>
+    <a:masterClrMapping/>
+  </p:clrMapOvr>
+</p:sld>
+</file>
+
+<file path=ppt/slides/slide2.xml><?xml version="1.0" encoding="utf-8"?>
+<p:sld xmlns:a="http://schemas.openxmlformats.org/drawingml/2006/main" xmlns:r="http://schemas.openxmlformats.org/officeDocument/2006/relationships" xmlns:p="http://schemas.openxmlformats.org/presentationml/2006/main">
+  <p:cSld>
+    <p:spTree>
+      <p:nvGrpSpPr>
+        <p:cNvPr id="1" name=""/>
+        <p:cNvGrpSpPr/>
+        <p:nvPr/>
+      </p:nvGrpSpPr>
+      <p:grpSpPr>
+        <a:xfrm>
+          <a:off x="0" y="0"/>
+          <a:ext cx="0" cy="0"/>
+          <a:chOff x="0" y="0"/>
+          <a:chExt cx="0" cy="0"/>
+        </a:xfrm>
+      </p:grpSpPr>
+      <p:pic>
+        <p:nvPicPr>
+          <p:cNvPr id="18" name="Picture 17">
+            <a:extLst>
+              <a:ext uri="{FF2B5EF4-FFF2-40B4-BE49-F238E27FC236}">
+                <a16:creationId xmlns:a16="http://schemas.microsoft.com/office/drawing/2014/main" id="{EA56E148-B081-ADB4-5331-C59598724DB4}"/>
+              </a:ext>
+            </a:extLst>
+          </p:cNvPr>
+          <p:cNvPicPr>
+            <a:picLocks noChangeAspect="1"/>
+          </p:cNvPicPr>
+          <p:nvPr/>
+        </p:nvPicPr>
+        <p:blipFill>
+          <a:blip r:embed="rId2">
+            <a:extLst>
+              <a:ext uri="{28A0092B-C50C-407E-A947-70E740481C1C}">
+                <a14:useLocalDpi xmlns:a14="http://schemas.microsoft.com/office/drawing/2010/main" val="0"/>
+              </a:ext>
+            </a:extLst>
+          </a:blip>
+          <a:stretch>
+            <a:fillRect/>
+          </a:stretch>
+        </p:blipFill>
+        <p:spPr>
+          <a:xfrm>
+            <a:off x="2942547" y="3781236"/>
+            <a:ext cx="8106906" cy="1095528"/>
+          </a:xfrm>
+          <a:prstGeom prst="rect">
+            <a:avLst/>
+          </a:prstGeom>
+        </p:spPr>
+      </p:pic>
+    </p:spTree>
+    <p:extLst>
+      <p:ext uri="{BB962C8B-B14F-4D97-AF65-F5344CB8AC3E}">
+        <p14:creationId xmlns:p14="http://schemas.microsoft.com/office/powerpoint/2010/main" val="2855264651"/>
+      </p:ext>
+    </p:extLst>
+  </p:cSld>
+  <p:clrMapOvr>
+    <a:masterClrMapping/>
+  </p:clrMapOvr>
+</p:sld>
+</file>
+
+<file path=ppt/slides/slide3.xml><?xml version="1.0" encoding="utf-8"?>
+<p:sld xmlns:a="http://schemas.openxmlformats.org/drawingml/2006/main" xmlns:r="http://schemas.openxmlformats.org/officeDocument/2006/relationships" xmlns:p="http://schemas.openxmlformats.org/presentationml/2006/main">
+  <p:cSld>
+    <p:spTree>
+      <p:nvGrpSpPr>
+        <p:cNvPr id="1" name=""/>
+        <p:cNvGrpSpPr/>
+        <p:nvPr/>
+      </p:nvGrpSpPr>
+      <p:grpSpPr>
+        <a:xfrm>
+          <a:off x="0" y="0"/>
+          <a:ext cx="0" cy="0"/>
+          <a:chOff x="0" y="0"/>
+          <a:chExt cx="0" cy="0"/>
+        </a:xfrm>
+      </p:grpSpPr>
+      <p:pic>
+        <p:nvPicPr>
+          <p:cNvPr id="16" name="Picture 15">
+            <a:extLst>
+              <a:ext uri="{FF2B5EF4-FFF2-40B4-BE49-F238E27FC236}">
+                <a16:creationId xmlns:a16="http://schemas.microsoft.com/office/drawing/2014/main" id="{CD79B1C6-AB79-0666-AC45-32D80D4E55D8}"/>
+              </a:ext>
+            </a:extLst>
+          </p:cNvPr>
+          <p:cNvPicPr>
+            <a:picLocks noChangeAspect="1"/>
+          </p:cNvPicPr>
+          <p:nvPr/>
+        </p:nvPicPr>
+        <p:blipFill>
+          <a:blip r:embed="rId2">
+            <a:extLst>
+              <a:ext uri="{28A0092B-C50C-407E-A947-70E740481C1C}">
+                <a14:useLocalDpi xmlns:a14="http://schemas.microsoft.com/office/drawing/2010/main" val="0"/>
+              </a:ext>
+            </a:extLst>
+          </a:blip>
+          <a:stretch>
+            <a:fillRect/>
+          </a:stretch>
+        </p:blipFill>
+        <p:spPr>
+          <a:xfrm>
+            <a:off x="3702311" y="2545234"/>
+            <a:ext cx="6287377" cy="3267531"/>
+          </a:xfrm>
+          <a:prstGeom prst="rect">
+            <a:avLst/>
+          </a:prstGeom>
+        </p:spPr>
+      </p:pic>
+    </p:spTree>
+    <p:extLst>
+      <p:ext uri="{BB962C8B-B14F-4D97-AF65-F5344CB8AC3E}">
+        <p14:creationId xmlns:p14="http://schemas.microsoft.com/office/powerpoint/2010/main" val="329848463"/>
+      </p:ext>
+    </p:extLst>
+  </p:cSld>
+  <p:clrMapOvr>
+    <a:masterClrMapping/>
+  </p:clrMapOvr>
+</p:sld>
+</file>
+
+<file path=ppt/slides/slide4.xml><?xml version="1.0" encoding="utf-8"?>
+<p:sld xmlns:a="http://schemas.openxmlformats.org/drawingml/2006/main" xmlns:r="http://schemas.openxmlformats.org/officeDocument/2006/relationships" xmlns:p="http://schemas.openxmlformats.org/presentationml/2006/main">
+  <p:cSld>
+    <p:spTree>
+      <p:nvGrpSpPr>
+        <p:cNvPr id="1" name=""/>
+        <p:cNvGrpSpPr/>
+        <p:nvPr/>
+      </p:nvGrpSpPr>
+      <p:grpSpPr>
+        <a:xfrm>
+          <a:off x="0" y="0"/>
+          <a:ext cx="0" cy="0"/>
+          <a:chOff x="0" y="0"/>
+          <a:chExt cx="0" cy="0"/>
+        </a:xfrm>
+      </p:grpSpPr>
+      <p:pic>
+        <p:nvPicPr>
+          <p:cNvPr id="12" name="Picture 11">
+            <a:extLst>
+              <a:ext uri="{FF2B5EF4-FFF2-40B4-BE49-F238E27FC236}">
+                <a16:creationId xmlns:a16="http://schemas.microsoft.com/office/drawing/2014/main" id="{585E86D7-EA4F-DE20-8C72-5D182164DBC0}"/>
+              </a:ext>
+            </a:extLst>
+          </p:cNvPr>
+          <p:cNvPicPr>
+            <a:picLocks noChangeAspect="1"/>
+          </p:cNvPicPr>
+          <p:nvPr/>
+        </p:nvPicPr>
+        <p:blipFill>
+          <a:blip r:embed="rId2">
+            <a:extLst>
+              <a:ext uri="{28A0092B-C50C-407E-A947-70E740481C1C}">
+                <a14:useLocalDpi xmlns:a14="http://schemas.microsoft.com/office/drawing/2010/main" val="0"/>
+              </a:ext>
+            </a:extLst>
+          </a:blip>
+          <a:stretch>
+            <a:fillRect/>
+          </a:stretch>
+        </p:blipFill>
+        <p:spPr>
+          <a:xfrm>
+            <a:off x="450000" y="3429587"/>
+            <a:ext cx="12192000" cy="898826"/>
+          </a:xfrm>
+          <a:prstGeom prst="rect">
+            <a:avLst/>
+          </a:prstGeom>
+        </p:spPr>
+      </p:pic>
+    </p:spTree>
+    <p:extLst>
+      <p:ext uri="{BB962C8B-B14F-4D97-AF65-F5344CB8AC3E}">
+        <p14:creationId xmlns:p14="http://schemas.microsoft.com/office/powerpoint/2010/main" val="2427980618"/>
+      </p:ext>
+    </p:extLst>
+  </p:cSld>
+  <p:clrMapOvr>
+    <a:masterClrMapping/>
+  </p:clrMapOvr>
+</p:sld>
+</file>
+
+<file path=ppt/slides/slide5.xml><?xml version="1.0" encoding="utf-8"?>
+<p:sld xmlns:a="http://schemas.openxmlformats.org/drawingml/2006/main" xmlns:r="http://schemas.openxmlformats.org/officeDocument/2006/relationships" xmlns:p="http://schemas.openxmlformats.org/presentationml/2006/main">
+  <p:cSld>
+    <p:spTree>
+      <p:nvGrpSpPr>
+        <p:cNvPr id="1" name=""/>
+        <p:cNvGrpSpPr/>
+        <p:nvPr/>
+      </p:nvGrpSpPr>
+      <p:grpSpPr>
+        <a:xfrm>
+          <a:off x="0" y="0"/>
+          <a:ext cx="0" cy="0"/>
+          <a:chOff x="0" y="0"/>
+          <a:chExt cx="0" cy="0"/>
+        </a:xfrm>
+      </p:grpSpPr>
+      <p:pic>
+        <p:nvPicPr>
+          <p:cNvPr id="14" name="Picture 13">
+            <a:extLst>
+              <a:ext uri="{FF2B5EF4-FFF2-40B4-BE49-F238E27FC236}">
+                <a16:creationId xmlns:a16="http://schemas.microsoft.com/office/drawing/2014/main" id="{8F121B7F-D903-D9C9-EE69-A9587D777AC6}"/>
+              </a:ext>
+            </a:extLst>
+          </p:cNvPr>
+          <p:cNvPicPr>
+            <a:picLocks noChangeAspect="1"/>
+          </p:cNvPicPr>
+          <p:nvPr/>
+        </p:nvPicPr>
+        <p:blipFill>
+          <a:blip r:embed="rId2">
+            <a:extLst>
+              <a:ext uri="{28A0092B-C50C-407E-A947-70E740481C1C}">
+                <a14:useLocalDpi xmlns:a14="http://schemas.microsoft.com/office/drawing/2010/main" val="0"/>
+              </a:ext>
+            </a:extLst>
+          </a:blip>
+          <a:stretch>
+            <a:fillRect/>
+          </a:stretch>
+        </p:blipFill>
+        <p:spPr>
+          <a:xfrm>
+            <a:off x="600000" y="3661987"/>
+            <a:ext cx="12192000" cy="734026"/>
+          </a:xfrm>
+          <a:prstGeom prst="rect">
+            <a:avLst/>
+          </a:prstGeom>
+        </p:spPr>
+      </p:pic>
+    </p:spTree>
+    <p:extLst>
+      <p:ext uri="{BB962C8B-B14F-4D97-AF65-F5344CB8AC3E}">
+        <p14:creationId xmlns:p14="http://schemas.microsoft.com/office/powerpoint/2010/main" val="4135018363"/>
+      </p:ext>
+    </p:extLst>
+  </p:cSld>
+  <p:clrMapOvr>
+    <a:masterClrMapping/>
+  </p:clrMapOvr>
+</p:sld>
+</file>
+
+<file path=ppt/slides/slide6.xml><?xml version="1.0" encoding="utf-8"?>
+<p:sld xmlns:a="http://schemas.openxmlformats.org/drawingml/2006/main" xmlns:r="http://schemas.openxmlformats.org/officeDocument/2006/relationships" xmlns:p="http://schemas.openxmlformats.org/presentationml/2006/main">
+  <p:cSld>
+    <p:spTree>
+      <p:nvGrpSpPr>
+        <p:cNvPr id="1" name=""/>
+        <p:cNvGrpSpPr/>
+        <p:nvPr/>
+      </p:nvGrpSpPr>
+      <p:grpSpPr>
+        <a:xfrm>
+          <a:off x="0" y="0"/>
+          <a:ext cx="0" cy="0"/>
+          <a:chOff x="0" y="0"/>
+          <a:chExt cx="0" cy="0"/>
+        </a:xfrm>
+      </p:grpSpPr>
       <p:sp>
         <p:nvSpPr>
           <p:cNvPr id="6" name="Rectangle 5">
@@ -3442,146 +3737,12 @@
           </a:p>
         </p:txBody>
       </p:sp>
-      <p:sp>
-        <p:nvSpPr>
-          <p:cNvPr id="4" name="Oval 3">
-            <a:extLst>
-              <a:ext uri="{FF2B5EF4-FFF2-40B4-BE49-F238E27FC236}">
-                <a16:creationId xmlns:a16="http://schemas.microsoft.com/office/drawing/2014/main" id="{AB2FCE58-D4CA-8C47-CA4A-55D4107F6A4E}"/>
-              </a:ext>
-            </a:extLst>
-          </p:cNvPr>
-          <p:cNvSpPr/>
-          <p:nvPr/>
-        </p:nvSpPr>
-        <p:spPr>
-          <a:xfrm>
-            <a:off x="10763251" y="2257426"/>
-            <a:ext cx="1234304" cy="707844"/>
-          </a:xfrm>
-          <a:prstGeom prst="ellipse">
-            <a:avLst/>
-          </a:prstGeom>
-          <a:noFill/>
-          <a:ln w="47625">
-            <a:solidFill>
-              <a:schemeClr val="accent2"/>
-            </a:solidFill>
-          </a:ln>
-        </p:spPr>
-        <p:style>
-          <a:lnRef idx="2">
-            <a:schemeClr val="accent1">
-              <a:shade val="15000"/>
-            </a:schemeClr>
-          </a:lnRef>
-          <a:fillRef idx="1">
-            <a:schemeClr val="accent1"/>
-          </a:fillRef>
-          <a:effectRef idx="0">
-            <a:schemeClr val="accent1"/>
-          </a:effectRef>
-          <a:fontRef idx="minor">
-            <a:schemeClr val="lt1"/>
-          </a:fontRef>
-        </p:style>
-        <p:txBody>
-          <a:bodyPr rtlCol="0" anchor="ctr"/>
-          <a:lstStyle/>
-          <a:p>
-            <a:pPr algn="ctr"/>
-            <a:endParaRPr lang="en-CA"/>
-          </a:p>
-        </p:txBody>
-      </p:sp>
-    </p:spTree>
-    <p:extLst>
-      <p:ext uri="{BB962C8B-B14F-4D97-AF65-F5344CB8AC3E}">
-        <p14:creationId xmlns:p14="http://schemas.microsoft.com/office/powerpoint/2010/main" val="1931239768"/>
-      </p:ext>
-    </p:extLst>
-  </p:cSld>
-  <p:clrMapOvr>
-    <a:masterClrMapping/>
-  </p:clrMapOvr>
-</p:sld>
-</file>
-
-<file path=ppt/slides/slide10.xml><?xml version="1.0" encoding="utf-8"?>
-<p:sld xmlns:a="http://schemas.openxmlformats.org/drawingml/2006/main" xmlns:r="http://schemas.openxmlformats.org/officeDocument/2006/relationships" xmlns:p="http://schemas.openxmlformats.org/presentationml/2006/main">
-  <p:cSld>
-    <p:spTree>
-      <p:nvGrpSpPr>
-        <p:cNvPr id="1" name=""/>
-        <p:cNvGrpSpPr/>
-        <p:nvPr/>
-      </p:nvGrpSpPr>
-      <p:grpSpPr>
-        <a:xfrm>
-          <a:off x="0" y="0"/>
-          <a:ext cx="0" cy="0"/>
-          <a:chOff x="0" y="0"/>
-          <a:chExt cx="0" cy="0"/>
-        </a:xfrm>
-      </p:grpSpPr>
-      <p:sp>
-        <p:nvSpPr>
-          <p:cNvPr id="4" name="Rectangle 3">
-            <a:extLst>
-              <a:ext uri="{FF2B5EF4-FFF2-40B4-BE49-F238E27FC236}">
-                <a16:creationId xmlns:a16="http://schemas.microsoft.com/office/drawing/2014/main" id="{9E6FDE31-8760-8702-42A7-7A0EABD25BB4}"/>
-              </a:ext>
-            </a:extLst>
-          </p:cNvPr>
-          <p:cNvSpPr/>
-          <p:nvPr/>
-        </p:nvSpPr>
-        <p:spPr>
-          <a:xfrm>
-            <a:off x="800100" y="504825"/>
-            <a:ext cx="4200525" cy="1771651"/>
-          </a:xfrm>
-          <a:prstGeom prst="rect">
-            <a:avLst/>
-          </a:prstGeom>
-          <a:solidFill>
-            <a:schemeClr val="bg1"/>
-          </a:solidFill>
-          <a:ln>
-            <a:noFill/>
-          </a:ln>
-        </p:spPr>
-        <p:style>
-          <a:lnRef idx="2">
-            <a:schemeClr val="accent1">
-              <a:shade val="15000"/>
-            </a:schemeClr>
-          </a:lnRef>
-          <a:fillRef idx="1">
-            <a:schemeClr val="accent1"/>
-          </a:fillRef>
-          <a:effectRef idx="0">
-            <a:schemeClr val="accent1"/>
-          </a:effectRef>
-          <a:fontRef idx="minor">
-            <a:schemeClr val="lt1"/>
-          </a:fontRef>
-        </p:style>
-        <p:txBody>
-          <a:bodyPr rtlCol="0" anchor="ctr"/>
-          <a:lstStyle/>
-          <a:p>
-            <a:pPr algn="ctr"/>
-            <a:endParaRPr lang="en-CA"/>
-          </a:p>
-        </p:txBody>
-      </p:sp>
       <p:pic>
         <p:nvPicPr>
-          <p:cNvPr id="3" name="Picture 2">
-            <a:extLst>
-              <a:ext uri="{FF2B5EF4-FFF2-40B4-BE49-F238E27FC236}">
-                <a16:creationId xmlns:a16="http://schemas.microsoft.com/office/drawing/2014/main" id="{9282D1F6-C550-3ED1-B87B-7795ADD770BF}"/>
+          <p:cNvPr id="9" name="Picture 8">
+            <a:extLst>
+              <a:ext uri="{FF2B5EF4-FFF2-40B4-BE49-F238E27FC236}">
+                <a16:creationId xmlns:a16="http://schemas.microsoft.com/office/drawing/2014/main" id="{5F3E5132-C8AE-D02E-721D-5BA4DAA2DA0E}"/>
               </a:ext>
             </a:extLst>
           </p:cNvPr>
@@ -3591,15 +3752,56 @@
           <p:nvPr/>
         </p:nvPicPr>
         <p:blipFill>
-          <a:blip r:embed="rId2"/>
+          <a:blip r:embed="rId2">
+            <a:extLst>
+              <a:ext uri="{28A0092B-C50C-407E-A947-70E740481C1C}">
+                <a14:useLocalDpi xmlns:a14="http://schemas.microsoft.com/office/drawing/2010/main" val="0"/>
+              </a:ext>
+            </a:extLst>
+          </a:blip>
           <a:stretch>
             <a:fillRect/>
           </a:stretch>
         </p:blipFill>
         <p:spPr>
           <a:xfrm>
-            <a:off x="904596" y="852413"/>
-            <a:ext cx="4001058" cy="1057423"/>
+            <a:off x="1732826" y="1973580"/>
+            <a:ext cx="2248214" cy="1419423"/>
+          </a:xfrm>
+          <a:prstGeom prst="rect">
+            <a:avLst/>
+          </a:prstGeom>
+        </p:spPr>
+      </p:pic>
+      <p:pic>
+        <p:nvPicPr>
+          <p:cNvPr id="24" name="Picture 23">
+            <a:extLst>
+              <a:ext uri="{FF2B5EF4-FFF2-40B4-BE49-F238E27FC236}">
+                <a16:creationId xmlns:a16="http://schemas.microsoft.com/office/drawing/2014/main" id="{EE42147C-0655-C4A6-68D1-62BE456CFCD4}"/>
+              </a:ext>
+            </a:extLst>
+          </p:cNvPr>
+          <p:cNvPicPr>
+            <a:picLocks noChangeAspect="1"/>
+          </p:cNvPicPr>
+          <p:nvPr/>
+        </p:nvPicPr>
+        <p:blipFill>
+          <a:blip r:embed="rId2">
+            <a:extLst>
+              <a:ext uri="{28A0092B-C50C-407E-A947-70E740481C1C}">
+                <a14:useLocalDpi xmlns:a14="http://schemas.microsoft.com/office/drawing/2010/main" val="0"/>
+              </a:ext>
+            </a:extLst>
+          </a:blip>
+          <a:srcRect l="64442" t="41617" r="27403" b="46471"/>
+          <a:stretch/>
+        </p:blipFill>
+        <p:spPr>
+          <a:xfrm>
+            <a:off x="7736681" y="2600324"/>
+            <a:ext cx="183357" cy="169069"/>
           </a:xfrm>
           <a:prstGeom prst="rect">
             <a:avLst/>
@@ -3609,1739 +3811,7 @@
     </p:spTree>
     <p:extLst>
       <p:ext uri="{BB962C8B-B14F-4D97-AF65-F5344CB8AC3E}">
-        <p14:creationId xmlns:p14="http://schemas.microsoft.com/office/powerpoint/2010/main" val="1675951217"/>
-      </p:ext>
-    </p:extLst>
-  </p:cSld>
-  <p:clrMapOvr>
-    <a:masterClrMapping/>
-  </p:clrMapOvr>
-</p:sld>
-</file>
-
-<file path=ppt/slides/slide11.xml><?xml version="1.0" encoding="utf-8"?>
-<p:sld xmlns:a="http://schemas.openxmlformats.org/drawingml/2006/main" xmlns:r="http://schemas.openxmlformats.org/officeDocument/2006/relationships" xmlns:p="http://schemas.openxmlformats.org/presentationml/2006/main">
-  <p:cSld>
-    <p:spTree>
-      <p:nvGrpSpPr>
-        <p:cNvPr id="1" name=""/>
-        <p:cNvGrpSpPr/>
-        <p:nvPr/>
-      </p:nvGrpSpPr>
-      <p:grpSpPr>
-        <a:xfrm>
-          <a:off x="0" y="0"/>
-          <a:ext cx="0" cy="0"/>
-          <a:chOff x="0" y="0"/>
-          <a:chExt cx="0" cy="0"/>
-        </a:xfrm>
-      </p:grpSpPr>
-      <p:sp>
-        <p:nvSpPr>
-          <p:cNvPr id="7" name="Rectangle 6">
-            <a:extLst>
-              <a:ext uri="{FF2B5EF4-FFF2-40B4-BE49-F238E27FC236}">
-                <a16:creationId xmlns:a16="http://schemas.microsoft.com/office/drawing/2014/main" id="{28DC8F54-824A-8518-D7E2-A78560480AE5}"/>
-              </a:ext>
-            </a:extLst>
-          </p:cNvPr>
-          <p:cNvSpPr/>
-          <p:nvPr/>
-        </p:nvSpPr>
-        <p:spPr>
-          <a:xfrm>
-            <a:off x="752476" y="600075"/>
-            <a:ext cx="6838950" cy="3438525"/>
-          </a:xfrm>
-          <a:prstGeom prst="rect">
-            <a:avLst/>
-          </a:prstGeom>
-          <a:solidFill>
-            <a:schemeClr val="bg1"/>
-          </a:solidFill>
-          <a:ln>
-            <a:noFill/>
-          </a:ln>
-        </p:spPr>
-        <p:style>
-          <a:lnRef idx="2">
-            <a:schemeClr val="accent1">
-              <a:shade val="15000"/>
-            </a:schemeClr>
-          </a:lnRef>
-          <a:fillRef idx="1">
-            <a:schemeClr val="accent1"/>
-          </a:fillRef>
-          <a:effectRef idx="0">
-            <a:schemeClr val="accent1"/>
-          </a:effectRef>
-          <a:fontRef idx="minor">
-            <a:schemeClr val="lt1"/>
-          </a:fontRef>
-        </p:style>
-        <p:txBody>
-          <a:bodyPr rtlCol="0" anchor="ctr"/>
-          <a:lstStyle/>
-          <a:p>
-            <a:pPr algn="ctr"/>
-            <a:endParaRPr lang="en-CA"/>
-          </a:p>
-        </p:txBody>
-      </p:sp>
-      <p:pic>
-        <p:nvPicPr>
-          <p:cNvPr id="3" name="Picture 2">
-            <a:extLst>
-              <a:ext uri="{FF2B5EF4-FFF2-40B4-BE49-F238E27FC236}">
-                <a16:creationId xmlns:a16="http://schemas.microsoft.com/office/drawing/2014/main" id="{C2775D54-B9E1-3926-F98A-3366B1BD498A}"/>
-              </a:ext>
-            </a:extLst>
-          </p:cNvPr>
-          <p:cNvPicPr>
-            <a:picLocks noChangeAspect="1"/>
-          </p:cNvPicPr>
-          <p:nvPr/>
-        </p:nvPicPr>
-        <p:blipFill rotWithShape="1">
-          <a:blip r:embed="rId2"/>
-          <a:srcRect r="29910" b="57927"/>
-          <a:stretch/>
-        </p:blipFill>
-        <p:spPr>
-          <a:xfrm>
-            <a:off x="847051" y="971552"/>
-            <a:ext cx="6544349" cy="2615061"/>
-          </a:xfrm>
-          <a:prstGeom prst="rect">
-            <a:avLst/>
-          </a:prstGeom>
-          <a:ln>
-            <a:solidFill>
-              <a:schemeClr val="tx1"/>
-            </a:solidFill>
-          </a:ln>
-        </p:spPr>
-      </p:pic>
-      <p:sp>
-        <p:nvSpPr>
-          <p:cNvPr id="4" name="Oval 3">
-            <a:extLst>
-              <a:ext uri="{FF2B5EF4-FFF2-40B4-BE49-F238E27FC236}">
-                <a16:creationId xmlns:a16="http://schemas.microsoft.com/office/drawing/2014/main" id="{F7149A0A-24C4-2191-7E81-FD333A4C9481}"/>
-              </a:ext>
-            </a:extLst>
-          </p:cNvPr>
-          <p:cNvSpPr/>
-          <p:nvPr/>
-        </p:nvSpPr>
-        <p:spPr>
-          <a:xfrm>
-            <a:off x="5419725" y="3310387"/>
-            <a:ext cx="676275" cy="276226"/>
-          </a:xfrm>
-          <a:prstGeom prst="ellipse">
-            <a:avLst/>
-          </a:prstGeom>
-          <a:noFill/>
-          <a:ln w="47625">
-            <a:solidFill>
-              <a:schemeClr val="accent2"/>
-            </a:solidFill>
-          </a:ln>
-        </p:spPr>
-        <p:style>
-          <a:lnRef idx="2">
-            <a:schemeClr val="accent1">
-              <a:shade val="15000"/>
-            </a:schemeClr>
-          </a:lnRef>
-          <a:fillRef idx="1">
-            <a:schemeClr val="accent1"/>
-          </a:fillRef>
-          <a:effectRef idx="0">
-            <a:schemeClr val="accent1"/>
-          </a:effectRef>
-          <a:fontRef idx="minor">
-            <a:schemeClr val="lt1"/>
-          </a:fontRef>
-        </p:style>
-        <p:txBody>
-          <a:bodyPr rtlCol="0" anchor="ctr"/>
-          <a:lstStyle/>
-          <a:p>
-            <a:pPr algn="ctr"/>
-            <a:endParaRPr lang="en-CA"/>
-          </a:p>
-        </p:txBody>
-      </p:sp>
-    </p:spTree>
-    <p:extLst>
-      <p:ext uri="{BB962C8B-B14F-4D97-AF65-F5344CB8AC3E}">
-        <p14:creationId xmlns:p14="http://schemas.microsoft.com/office/powerpoint/2010/main" val="577845057"/>
-      </p:ext>
-    </p:extLst>
-  </p:cSld>
-  <p:clrMapOvr>
-    <a:masterClrMapping/>
-  </p:clrMapOvr>
-</p:sld>
-</file>
-
-<file path=ppt/slides/slide12.xml><?xml version="1.0" encoding="utf-8"?>
-<p:sld xmlns:a="http://schemas.openxmlformats.org/drawingml/2006/main" xmlns:r="http://schemas.openxmlformats.org/officeDocument/2006/relationships" xmlns:p="http://schemas.openxmlformats.org/presentationml/2006/main">
-  <p:cSld>
-    <p:spTree>
-      <p:nvGrpSpPr>
-        <p:cNvPr id="1" name=""/>
-        <p:cNvGrpSpPr/>
-        <p:nvPr/>
-      </p:nvGrpSpPr>
-      <p:grpSpPr>
-        <a:xfrm>
-          <a:off x="0" y="0"/>
-          <a:ext cx="0" cy="0"/>
-          <a:chOff x="0" y="0"/>
-          <a:chExt cx="0" cy="0"/>
-        </a:xfrm>
-      </p:grpSpPr>
-      <p:sp>
-        <p:nvSpPr>
-          <p:cNvPr id="2" name="Rectangle 1">
-            <a:extLst>
-              <a:ext uri="{FF2B5EF4-FFF2-40B4-BE49-F238E27FC236}">
-                <a16:creationId xmlns:a16="http://schemas.microsoft.com/office/drawing/2014/main" id="{B31E72B7-CA73-B08D-567B-F8E97222FF74}"/>
-              </a:ext>
-            </a:extLst>
-          </p:cNvPr>
-          <p:cNvSpPr/>
-          <p:nvPr/>
-        </p:nvSpPr>
-        <p:spPr>
-          <a:xfrm>
-            <a:off x="3476626" y="1381126"/>
-            <a:ext cx="4057650" cy="1809750"/>
-          </a:xfrm>
-          <a:prstGeom prst="rect">
-            <a:avLst/>
-          </a:prstGeom>
-          <a:solidFill>
-            <a:schemeClr val="bg1"/>
-          </a:solidFill>
-          <a:ln>
-            <a:noFill/>
-          </a:ln>
-        </p:spPr>
-        <p:style>
-          <a:lnRef idx="2">
-            <a:schemeClr val="accent1">
-              <a:shade val="15000"/>
-            </a:schemeClr>
-          </a:lnRef>
-          <a:fillRef idx="1">
-            <a:schemeClr val="accent1"/>
-          </a:fillRef>
-          <a:effectRef idx="0">
-            <a:schemeClr val="accent1"/>
-          </a:effectRef>
-          <a:fontRef idx="minor">
-            <a:schemeClr val="lt1"/>
-          </a:fontRef>
-        </p:style>
-        <p:txBody>
-          <a:bodyPr rtlCol="0" anchor="ctr"/>
-          <a:lstStyle/>
-          <a:p>
-            <a:pPr algn="ctr"/>
-            <a:endParaRPr lang="en-CA"/>
-          </a:p>
-        </p:txBody>
-      </p:sp>
-      <p:pic>
-        <p:nvPicPr>
-          <p:cNvPr id="10" name="Picture 9">
-            <a:extLst>
-              <a:ext uri="{FF2B5EF4-FFF2-40B4-BE49-F238E27FC236}">
-                <a16:creationId xmlns:a16="http://schemas.microsoft.com/office/drawing/2014/main" id="{37DD410A-1074-BBFA-828A-97A9EA8E3AEF}"/>
-              </a:ext>
-            </a:extLst>
-          </p:cNvPr>
-          <p:cNvPicPr>
-            <a:picLocks noChangeAspect="1"/>
-          </p:cNvPicPr>
-          <p:nvPr/>
-        </p:nvPicPr>
-        <p:blipFill>
-          <a:blip r:embed="rId2"/>
-          <a:stretch>
-            <a:fillRect/>
-          </a:stretch>
-        </p:blipFill>
-        <p:spPr>
-          <a:xfrm>
-            <a:off x="3633599" y="1642614"/>
-            <a:ext cx="3753374" cy="1257475"/>
-          </a:xfrm>
-          <a:prstGeom prst="rect">
-            <a:avLst/>
-          </a:prstGeom>
-          <a:ln>
-            <a:solidFill>
-              <a:schemeClr val="tx1"/>
-            </a:solidFill>
-          </a:ln>
-        </p:spPr>
-      </p:pic>
-    </p:spTree>
-    <p:extLst>
-      <p:ext uri="{BB962C8B-B14F-4D97-AF65-F5344CB8AC3E}">
-        <p14:creationId xmlns:p14="http://schemas.microsoft.com/office/powerpoint/2010/main" val="964108410"/>
-      </p:ext>
-    </p:extLst>
-  </p:cSld>
-  <p:clrMapOvr>
-    <a:masterClrMapping/>
-  </p:clrMapOvr>
-</p:sld>
-</file>
-
-<file path=ppt/slides/slide13.xml><?xml version="1.0" encoding="utf-8"?>
-<p:sld xmlns:a="http://schemas.openxmlformats.org/drawingml/2006/main" xmlns:r="http://schemas.openxmlformats.org/officeDocument/2006/relationships" xmlns:p="http://schemas.openxmlformats.org/presentationml/2006/main">
-  <p:cSld>
-    <p:spTree>
-      <p:nvGrpSpPr>
-        <p:cNvPr id="1" name=""/>
-        <p:cNvGrpSpPr/>
-        <p:nvPr/>
-      </p:nvGrpSpPr>
-      <p:grpSpPr>
-        <a:xfrm>
-          <a:off x="0" y="0"/>
-          <a:ext cx="0" cy="0"/>
-          <a:chOff x="0" y="0"/>
-          <a:chExt cx="0" cy="0"/>
-        </a:xfrm>
-      </p:grpSpPr>
-      <p:sp>
-        <p:nvSpPr>
-          <p:cNvPr id="13" name="Rectangle 12">
-            <a:extLst>
-              <a:ext uri="{FF2B5EF4-FFF2-40B4-BE49-F238E27FC236}">
-                <a16:creationId xmlns:a16="http://schemas.microsoft.com/office/drawing/2014/main" id="{C40C316B-5156-2398-B0F3-A19E7B160FF4}"/>
-              </a:ext>
-            </a:extLst>
-          </p:cNvPr>
-          <p:cNvSpPr/>
-          <p:nvPr/>
-        </p:nvSpPr>
-        <p:spPr>
-          <a:xfrm>
-            <a:off x="4286250" y="704850"/>
-            <a:ext cx="7463026" cy="5072512"/>
-          </a:xfrm>
-          <a:prstGeom prst="rect">
-            <a:avLst/>
-          </a:prstGeom>
-          <a:solidFill>
-            <a:schemeClr val="bg1"/>
-          </a:solidFill>
-          <a:ln>
-            <a:noFill/>
-          </a:ln>
-        </p:spPr>
-        <p:style>
-          <a:lnRef idx="2">
-            <a:schemeClr val="accent1">
-              <a:shade val="15000"/>
-            </a:schemeClr>
-          </a:lnRef>
-          <a:fillRef idx="1">
-            <a:schemeClr val="accent1"/>
-          </a:fillRef>
-          <a:effectRef idx="0">
-            <a:schemeClr val="accent1"/>
-          </a:effectRef>
-          <a:fontRef idx="minor">
-            <a:schemeClr val="lt1"/>
-          </a:fontRef>
-        </p:style>
-        <p:txBody>
-          <a:bodyPr rtlCol="0" anchor="ctr"/>
-          <a:lstStyle/>
-          <a:p>
-            <a:pPr algn="ctr"/>
-            <a:endParaRPr lang="en-CA"/>
-          </a:p>
-        </p:txBody>
-      </p:sp>
-      <p:pic>
-        <p:nvPicPr>
-          <p:cNvPr id="3" name="Picture 2">
-            <a:extLst>
-              <a:ext uri="{FF2B5EF4-FFF2-40B4-BE49-F238E27FC236}">
-                <a16:creationId xmlns:a16="http://schemas.microsoft.com/office/drawing/2014/main" id="{2A0C9EA6-F4B6-3054-A22E-C8CB4C98F8E4}"/>
-              </a:ext>
-            </a:extLst>
-          </p:cNvPr>
-          <p:cNvPicPr>
-            <a:picLocks noChangeAspect="1"/>
-          </p:cNvPicPr>
-          <p:nvPr/>
-        </p:nvPicPr>
-        <p:blipFill rotWithShape="1">
-          <a:blip r:embed="rId2"/>
-          <a:srcRect r="30279" b="42742"/>
-          <a:stretch/>
-        </p:blipFill>
-        <p:spPr>
-          <a:xfrm>
-            <a:off x="4466551" y="1080639"/>
-            <a:ext cx="6734849" cy="3681860"/>
-          </a:xfrm>
-          <a:prstGeom prst="rect">
-            <a:avLst/>
-          </a:prstGeom>
-        </p:spPr>
-      </p:pic>
-      <p:pic>
-        <p:nvPicPr>
-          <p:cNvPr id="5" name="Picture 4">
-            <a:extLst>
-              <a:ext uri="{FF2B5EF4-FFF2-40B4-BE49-F238E27FC236}">
-                <a16:creationId xmlns:a16="http://schemas.microsoft.com/office/drawing/2014/main" id="{97FBDE8D-872B-33B7-B0A6-717B3EE8ACFB}"/>
-              </a:ext>
-            </a:extLst>
-          </p:cNvPr>
-          <p:cNvPicPr>
-            <a:picLocks noChangeAspect="1"/>
-          </p:cNvPicPr>
-          <p:nvPr/>
-        </p:nvPicPr>
-        <p:blipFill rotWithShape="1">
-          <a:blip r:embed="rId2"/>
-          <a:srcRect t="91031" r="53550"/>
-          <a:stretch/>
-        </p:blipFill>
-        <p:spPr>
-          <a:xfrm>
-            <a:off x="4466551" y="4762499"/>
-            <a:ext cx="4486949" cy="576711"/>
-          </a:xfrm>
-          <a:prstGeom prst="rect">
-            <a:avLst/>
-          </a:prstGeom>
-        </p:spPr>
-      </p:pic>
-      <p:pic>
-        <p:nvPicPr>
-          <p:cNvPr id="6" name="Picture 5">
-            <a:extLst>
-              <a:ext uri="{FF2B5EF4-FFF2-40B4-BE49-F238E27FC236}">
-                <a16:creationId xmlns:a16="http://schemas.microsoft.com/office/drawing/2014/main" id="{7537CC4B-76F6-C78F-5802-4D9699AC408B}"/>
-              </a:ext>
-            </a:extLst>
-          </p:cNvPr>
-          <p:cNvPicPr>
-            <a:picLocks noChangeAspect="1"/>
-          </p:cNvPicPr>
-          <p:nvPr/>
-        </p:nvPicPr>
-        <p:blipFill rotWithShape="1">
-          <a:blip r:embed="rId2"/>
-          <a:srcRect l="88653" b="42742"/>
-          <a:stretch/>
-        </p:blipFill>
-        <p:spPr>
-          <a:xfrm>
-            <a:off x="10496549" y="1080639"/>
-            <a:ext cx="1096049" cy="3681860"/>
-          </a:xfrm>
-          <a:prstGeom prst="rect">
-            <a:avLst/>
-          </a:prstGeom>
-        </p:spPr>
-      </p:pic>
-      <p:pic>
-        <p:nvPicPr>
-          <p:cNvPr id="8" name="Picture 7">
-            <a:extLst>
-              <a:ext uri="{FF2B5EF4-FFF2-40B4-BE49-F238E27FC236}">
-                <a16:creationId xmlns:a16="http://schemas.microsoft.com/office/drawing/2014/main" id="{B76C4895-3C33-F4AC-649A-AF306E1369F7}"/>
-              </a:ext>
-            </a:extLst>
-          </p:cNvPr>
-          <p:cNvPicPr>
-            <a:picLocks noChangeAspect="1"/>
-          </p:cNvPicPr>
-          <p:nvPr/>
-        </p:nvPicPr>
-        <p:blipFill rotWithShape="1">
-          <a:blip r:embed="rId2"/>
-          <a:srcRect l="74857" t="86250" r="-737" b="-1211"/>
-          <a:stretch/>
-        </p:blipFill>
-        <p:spPr>
-          <a:xfrm>
-            <a:off x="9168147" y="4457700"/>
-            <a:ext cx="2499978" cy="962025"/>
-          </a:xfrm>
-          <a:prstGeom prst="rect">
-            <a:avLst/>
-          </a:prstGeom>
-        </p:spPr>
-      </p:pic>
-      <p:pic>
-        <p:nvPicPr>
-          <p:cNvPr id="7" name="Picture 6">
-            <a:extLst>
-              <a:ext uri="{FF2B5EF4-FFF2-40B4-BE49-F238E27FC236}">
-                <a16:creationId xmlns:a16="http://schemas.microsoft.com/office/drawing/2014/main" id="{FB28446C-9235-E662-1CAF-E938000B0E52}"/>
-              </a:ext>
-            </a:extLst>
-          </p:cNvPr>
-          <p:cNvPicPr>
-            <a:picLocks noChangeAspect="1"/>
-          </p:cNvPicPr>
-          <p:nvPr/>
-        </p:nvPicPr>
-        <p:blipFill rotWithShape="1">
-          <a:blip r:embed="rId2"/>
-          <a:srcRect l="40534" t="91031" r="37576"/>
-          <a:stretch/>
-        </p:blipFill>
-        <p:spPr>
-          <a:xfrm>
-            <a:off x="7370474" y="4762052"/>
-            <a:ext cx="2114549" cy="576711"/>
-          </a:xfrm>
-          <a:prstGeom prst="rect">
-            <a:avLst/>
-          </a:prstGeom>
-        </p:spPr>
-      </p:pic>
-    </p:spTree>
-    <p:extLst>
-      <p:ext uri="{BB962C8B-B14F-4D97-AF65-F5344CB8AC3E}">
-        <p14:creationId xmlns:p14="http://schemas.microsoft.com/office/powerpoint/2010/main" val="2131930115"/>
-      </p:ext>
-    </p:extLst>
-  </p:cSld>
-  <p:clrMapOvr>
-    <a:masterClrMapping/>
-  </p:clrMapOvr>
-</p:sld>
-</file>
-
-<file path=ppt/slides/slide14.xml><?xml version="1.0" encoding="utf-8"?>
-<p:sld xmlns:a="http://schemas.openxmlformats.org/drawingml/2006/main" xmlns:r="http://schemas.openxmlformats.org/officeDocument/2006/relationships" xmlns:p="http://schemas.openxmlformats.org/presentationml/2006/main">
-  <p:cSld>
-    <p:spTree>
-      <p:nvGrpSpPr>
-        <p:cNvPr id="1" name=""/>
-        <p:cNvGrpSpPr/>
-        <p:nvPr/>
-      </p:nvGrpSpPr>
-      <p:grpSpPr>
-        <a:xfrm>
-          <a:off x="0" y="0"/>
-          <a:ext cx="0" cy="0"/>
-          <a:chOff x="0" y="0"/>
-          <a:chExt cx="0" cy="0"/>
-        </a:xfrm>
-      </p:grpSpPr>
-      <p:sp>
-        <p:nvSpPr>
-          <p:cNvPr id="5" name="Rectangle 4">
-            <a:extLst>
-              <a:ext uri="{FF2B5EF4-FFF2-40B4-BE49-F238E27FC236}">
-                <a16:creationId xmlns:a16="http://schemas.microsoft.com/office/drawing/2014/main" id="{05FA33F0-0DF6-FB25-4ACF-FB8D1C222D38}"/>
-              </a:ext>
-            </a:extLst>
-          </p:cNvPr>
-          <p:cNvSpPr/>
-          <p:nvPr/>
-        </p:nvSpPr>
-        <p:spPr>
-          <a:xfrm>
-            <a:off x="790575" y="1143000"/>
-            <a:ext cx="4410075" cy="3343275"/>
-          </a:xfrm>
-          <a:prstGeom prst="rect">
-            <a:avLst/>
-          </a:prstGeom>
-          <a:solidFill>
-            <a:schemeClr val="bg1"/>
-          </a:solidFill>
-          <a:ln>
-            <a:noFill/>
-          </a:ln>
-        </p:spPr>
-        <p:style>
-          <a:lnRef idx="2">
-            <a:schemeClr val="accent1">
-              <a:shade val="15000"/>
-            </a:schemeClr>
-          </a:lnRef>
-          <a:fillRef idx="1">
-            <a:schemeClr val="accent1"/>
-          </a:fillRef>
-          <a:effectRef idx="0">
-            <a:schemeClr val="accent1"/>
-          </a:effectRef>
-          <a:fontRef idx="minor">
-            <a:schemeClr val="lt1"/>
-          </a:fontRef>
-        </p:style>
-        <p:txBody>
-          <a:bodyPr rtlCol="0" anchor="ctr"/>
-          <a:lstStyle/>
-          <a:p>
-            <a:pPr algn="ctr"/>
-            <a:endParaRPr lang="en-CA"/>
-          </a:p>
-        </p:txBody>
-      </p:sp>
-      <p:grpSp>
-        <p:nvGrpSpPr>
-          <p:cNvPr id="4" name="Group 3">
-            <a:extLst>
-              <a:ext uri="{FF2B5EF4-FFF2-40B4-BE49-F238E27FC236}">
-                <a16:creationId xmlns:a16="http://schemas.microsoft.com/office/drawing/2014/main" id="{28A06D07-BE83-557B-80B5-5371217CD2BF}"/>
-              </a:ext>
-            </a:extLst>
-          </p:cNvPr>
-          <p:cNvGrpSpPr/>
-          <p:nvPr/>
-        </p:nvGrpSpPr>
-        <p:grpSpPr>
-          <a:xfrm>
-            <a:off x="1042786" y="1511869"/>
-            <a:ext cx="3943900" cy="2553312"/>
-            <a:chOff x="1042786" y="1511869"/>
-            <a:chExt cx="3943900" cy="2553312"/>
-          </a:xfrm>
-        </p:grpSpPr>
-        <p:pic>
-          <p:nvPicPr>
-            <p:cNvPr id="2" name="Picture 1">
-              <a:extLst>
-                <a:ext uri="{FF2B5EF4-FFF2-40B4-BE49-F238E27FC236}">
-                  <a16:creationId xmlns:a16="http://schemas.microsoft.com/office/drawing/2014/main" id="{69B5C19F-4834-90C4-EACC-78037E87E275}"/>
-                </a:ext>
-              </a:extLst>
-            </p:cNvPr>
-            <p:cNvPicPr>
-              <a:picLocks noChangeAspect="1"/>
-            </p:cNvPicPr>
-            <p:nvPr/>
-          </p:nvPicPr>
-          <p:blipFill rotWithShape="1">
-            <a:blip r:embed="rId2"/>
-            <a:srcRect b="60598"/>
-            <a:stretch/>
-          </p:blipFill>
-          <p:spPr>
-            <a:xfrm>
-              <a:off x="1042786" y="1511869"/>
-              <a:ext cx="3943900" cy="1726631"/>
-            </a:xfrm>
-            <a:prstGeom prst="rect">
-              <a:avLst/>
-            </a:prstGeom>
-          </p:spPr>
-        </p:pic>
-        <p:pic>
-          <p:nvPicPr>
-            <p:cNvPr id="3" name="Picture 2">
-              <a:extLst>
-                <a:ext uri="{FF2B5EF4-FFF2-40B4-BE49-F238E27FC236}">
-                  <a16:creationId xmlns:a16="http://schemas.microsoft.com/office/drawing/2014/main" id="{19D914CE-B47C-0075-F9E3-58913595D29B}"/>
-                </a:ext>
-              </a:extLst>
-            </p:cNvPr>
-            <p:cNvPicPr>
-              <a:picLocks noChangeAspect="1"/>
-            </p:cNvPicPr>
-            <p:nvPr/>
-          </p:nvPicPr>
-          <p:blipFill rotWithShape="1">
-            <a:blip r:embed="rId2"/>
-            <a:srcRect t="81135"/>
-            <a:stretch/>
-          </p:blipFill>
-          <p:spPr>
-            <a:xfrm>
-              <a:off x="1042786" y="3238500"/>
-              <a:ext cx="3943900" cy="826681"/>
-            </a:xfrm>
-            <a:prstGeom prst="rect">
-              <a:avLst/>
-            </a:prstGeom>
-          </p:spPr>
-        </p:pic>
-      </p:grpSp>
-    </p:spTree>
-    <p:extLst>
-      <p:ext uri="{BB962C8B-B14F-4D97-AF65-F5344CB8AC3E}">
-        <p14:creationId xmlns:p14="http://schemas.microsoft.com/office/powerpoint/2010/main" val="2247581634"/>
-      </p:ext>
-    </p:extLst>
-  </p:cSld>
-  <p:clrMapOvr>
-    <a:masterClrMapping/>
-  </p:clrMapOvr>
-</p:sld>
-</file>
-
-<file path=ppt/slides/slide15.xml><?xml version="1.0" encoding="utf-8"?>
-<p:sld xmlns:a="http://schemas.openxmlformats.org/drawingml/2006/main" xmlns:r="http://schemas.openxmlformats.org/officeDocument/2006/relationships" xmlns:p="http://schemas.openxmlformats.org/presentationml/2006/main">
-  <p:cSld>
-    <p:spTree>
-      <p:nvGrpSpPr>
-        <p:cNvPr id="1" name=""/>
-        <p:cNvGrpSpPr/>
-        <p:nvPr/>
-      </p:nvGrpSpPr>
-      <p:grpSpPr>
-        <a:xfrm>
-          <a:off x="0" y="0"/>
-          <a:ext cx="0" cy="0"/>
-          <a:chOff x="0" y="0"/>
-          <a:chExt cx="0" cy="0"/>
-        </a:xfrm>
-      </p:grpSpPr>
-      <p:sp>
-        <p:nvSpPr>
-          <p:cNvPr id="8" name="Oval 7">
-            <a:extLst>
-              <a:ext uri="{FF2B5EF4-FFF2-40B4-BE49-F238E27FC236}">
-                <a16:creationId xmlns:a16="http://schemas.microsoft.com/office/drawing/2014/main" id="{BD801201-31B2-1682-A270-5DDFC3C29CBD}"/>
-              </a:ext>
-            </a:extLst>
-          </p:cNvPr>
-          <p:cNvSpPr/>
-          <p:nvPr/>
-        </p:nvSpPr>
-        <p:spPr>
-          <a:xfrm>
-            <a:off x="7743825" y="4972050"/>
-            <a:ext cx="1943100" cy="400050"/>
-          </a:xfrm>
-          <a:prstGeom prst="ellipse">
-            <a:avLst/>
-          </a:prstGeom>
-          <a:noFill/>
-          <a:ln w="47625">
-            <a:solidFill>
-              <a:schemeClr val="accent2"/>
-            </a:solidFill>
-          </a:ln>
-        </p:spPr>
-        <p:style>
-          <a:lnRef idx="2">
-            <a:schemeClr val="accent1">
-              <a:shade val="15000"/>
-            </a:schemeClr>
-          </a:lnRef>
-          <a:fillRef idx="1">
-            <a:schemeClr val="accent1"/>
-          </a:fillRef>
-          <a:effectRef idx="0">
-            <a:schemeClr val="accent1"/>
-          </a:effectRef>
-          <a:fontRef idx="minor">
-            <a:schemeClr val="lt1"/>
-          </a:fontRef>
-        </p:style>
-        <p:txBody>
-          <a:bodyPr rtlCol="0" anchor="ctr"/>
-          <a:lstStyle/>
-          <a:p>
-            <a:pPr algn="ctr"/>
-            <a:endParaRPr lang="en-CA"/>
-          </a:p>
-        </p:txBody>
-      </p:sp>
-      <p:pic>
-        <p:nvPicPr>
-          <p:cNvPr id="7" name="Picture 6">
-            <a:extLst>
-              <a:ext uri="{FF2B5EF4-FFF2-40B4-BE49-F238E27FC236}">
-                <a16:creationId xmlns:a16="http://schemas.microsoft.com/office/drawing/2014/main" id="{E85A58A4-D2E4-8115-CB21-8C12D79C8009}"/>
-              </a:ext>
-            </a:extLst>
-          </p:cNvPr>
-          <p:cNvPicPr>
-            <a:picLocks noChangeAspect="1"/>
-          </p:cNvPicPr>
-          <p:nvPr/>
-        </p:nvPicPr>
-        <p:blipFill>
-          <a:blip r:embed="rId2"/>
-          <a:stretch>
-            <a:fillRect/>
-          </a:stretch>
-        </p:blipFill>
-        <p:spPr>
-          <a:xfrm>
-            <a:off x="880334" y="1276049"/>
-            <a:ext cx="10431331" cy="4305901"/>
-          </a:xfrm>
-          <a:prstGeom prst="rect">
-            <a:avLst/>
-          </a:prstGeom>
-        </p:spPr>
-      </p:pic>
-    </p:spTree>
-    <p:extLst>
-      <p:ext uri="{BB962C8B-B14F-4D97-AF65-F5344CB8AC3E}">
-        <p14:creationId xmlns:p14="http://schemas.microsoft.com/office/powerpoint/2010/main" val="366108043"/>
-      </p:ext>
-    </p:extLst>
-  </p:cSld>
-  <p:clrMapOvr>
-    <a:masterClrMapping/>
-  </p:clrMapOvr>
-</p:sld>
-</file>
-
-<file path=ppt/slides/slide2.xml><?xml version="1.0" encoding="utf-8"?>
-<p:sld xmlns:a="http://schemas.openxmlformats.org/drawingml/2006/main" xmlns:r="http://schemas.openxmlformats.org/officeDocument/2006/relationships" xmlns:p="http://schemas.openxmlformats.org/presentationml/2006/main">
-  <p:cSld>
-    <p:spTree>
-      <p:nvGrpSpPr>
-        <p:cNvPr id="1" name=""/>
-        <p:cNvGrpSpPr/>
-        <p:nvPr/>
-      </p:nvGrpSpPr>
-      <p:grpSpPr>
-        <a:xfrm>
-          <a:off x="0" y="0"/>
-          <a:ext cx="0" cy="0"/>
-          <a:chOff x="0" y="0"/>
-          <a:chExt cx="0" cy="0"/>
-        </a:xfrm>
-      </p:grpSpPr>
-      <p:pic>
-        <p:nvPicPr>
-          <p:cNvPr id="10" name="Picture 9">
-            <a:extLst>
-              <a:ext uri="{FF2B5EF4-FFF2-40B4-BE49-F238E27FC236}">
-                <a16:creationId xmlns:a16="http://schemas.microsoft.com/office/drawing/2014/main" id="{6A1A72DE-4126-E962-80B1-AC71063E29BB}"/>
-              </a:ext>
-            </a:extLst>
-          </p:cNvPr>
-          <p:cNvPicPr>
-            <a:picLocks noChangeAspect="1"/>
-          </p:cNvPicPr>
-          <p:nvPr/>
-        </p:nvPicPr>
-        <p:blipFill>
-          <a:blip r:embed="rId2"/>
-          <a:srcRect l="66959" t="36288" r="908" b="2700"/>
-          <a:stretch/>
-        </p:blipFill>
-        <p:spPr>
-          <a:xfrm>
-            <a:off x="8081554" y="2847702"/>
-            <a:ext cx="3762103" cy="2586447"/>
-          </a:xfrm>
-          <a:prstGeom prst="rect">
-            <a:avLst/>
-          </a:prstGeom>
-          <a:ln>
-            <a:solidFill>
-              <a:schemeClr val="accent1"/>
-            </a:solidFill>
-          </a:ln>
-        </p:spPr>
-      </p:pic>
-      <p:sp>
-        <p:nvSpPr>
-          <p:cNvPr id="6" name="Rectangle 5">
-            <a:extLst>
-              <a:ext uri="{FF2B5EF4-FFF2-40B4-BE49-F238E27FC236}">
-                <a16:creationId xmlns:a16="http://schemas.microsoft.com/office/drawing/2014/main" id="{32760571-B84B-2BA5-579B-40E9EECF02B3}"/>
-              </a:ext>
-            </a:extLst>
-          </p:cNvPr>
-          <p:cNvSpPr/>
-          <p:nvPr/>
-        </p:nvSpPr>
-        <p:spPr>
-          <a:xfrm>
-            <a:off x="-9525" y="1973580"/>
-            <a:ext cx="306434" cy="4610100"/>
-          </a:xfrm>
-          <a:prstGeom prst="rect">
-            <a:avLst/>
-          </a:prstGeom>
-          <a:solidFill>
-            <a:schemeClr val="bg1"/>
-          </a:solidFill>
-          <a:ln>
-            <a:noFill/>
-          </a:ln>
-        </p:spPr>
-        <p:style>
-          <a:lnRef idx="2">
-            <a:schemeClr val="accent1">
-              <a:shade val="15000"/>
-            </a:schemeClr>
-          </a:lnRef>
-          <a:fillRef idx="1">
-            <a:schemeClr val="accent1"/>
-          </a:fillRef>
-          <a:effectRef idx="0">
-            <a:schemeClr val="accent1"/>
-          </a:effectRef>
-          <a:fontRef idx="minor">
-            <a:schemeClr val="lt1"/>
-          </a:fontRef>
-        </p:style>
-        <p:txBody>
-          <a:bodyPr rtlCol="0" anchor="ctr"/>
-          <a:lstStyle/>
-          <a:p>
-            <a:pPr algn="ctr"/>
-            <a:endParaRPr lang="en-CA"/>
-          </a:p>
-        </p:txBody>
-      </p:sp>
-      <p:sp>
-        <p:nvSpPr>
-          <p:cNvPr id="8" name="Oval 7">
-            <a:extLst>
-              <a:ext uri="{FF2B5EF4-FFF2-40B4-BE49-F238E27FC236}">
-                <a16:creationId xmlns:a16="http://schemas.microsoft.com/office/drawing/2014/main" id="{72C62E71-D361-BC15-E3EF-A834F301FACB}"/>
-              </a:ext>
-            </a:extLst>
-          </p:cNvPr>
-          <p:cNvSpPr/>
-          <p:nvPr/>
-        </p:nvSpPr>
-        <p:spPr>
-          <a:xfrm>
-            <a:off x="7924801" y="4895465"/>
-            <a:ext cx="1600200" cy="653143"/>
-          </a:xfrm>
-          <a:prstGeom prst="ellipse">
-            <a:avLst/>
-          </a:prstGeom>
-          <a:noFill/>
-          <a:ln w="47625">
-            <a:solidFill>
-              <a:schemeClr val="accent2"/>
-            </a:solidFill>
-          </a:ln>
-        </p:spPr>
-        <p:style>
-          <a:lnRef idx="2">
-            <a:schemeClr val="accent1">
-              <a:shade val="15000"/>
-            </a:schemeClr>
-          </a:lnRef>
-          <a:fillRef idx="1">
-            <a:schemeClr val="accent1"/>
-          </a:fillRef>
-          <a:effectRef idx="0">
-            <a:schemeClr val="accent1"/>
-          </a:effectRef>
-          <a:fontRef idx="minor">
-            <a:schemeClr val="lt1"/>
-          </a:fontRef>
-        </p:style>
-        <p:txBody>
-          <a:bodyPr rtlCol="0" anchor="ctr"/>
-          <a:lstStyle/>
-          <a:p>
-            <a:pPr algn="ctr"/>
-            <a:endParaRPr lang="en-CA"/>
-          </a:p>
-        </p:txBody>
-      </p:sp>
-    </p:spTree>
-    <p:extLst>
-      <p:ext uri="{BB962C8B-B14F-4D97-AF65-F5344CB8AC3E}">
-        <p14:creationId xmlns:p14="http://schemas.microsoft.com/office/powerpoint/2010/main" val="3387442404"/>
-      </p:ext>
-    </p:extLst>
-  </p:cSld>
-  <p:clrMapOvr>
-    <a:masterClrMapping/>
-  </p:clrMapOvr>
-</p:sld>
-</file>
-
-<file path=ppt/slides/slide3.xml><?xml version="1.0" encoding="utf-8"?>
-<p:sld xmlns:a="http://schemas.openxmlformats.org/drawingml/2006/main" xmlns:r="http://schemas.openxmlformats.org/officeDocument/2006/relationships" xmlns:p="http://schemas.openxmlformats.org/presentationml/2006/main">
-  <p:cSld>
-    <p:spTree>
-      <p:nvGrpSpPr>
-        <p:cNvPr id="1" name=""/>
-        <p:cNvGrpSpPr/>
-        <p:nvPr/>
-      </p:nvGrpSpPr>
-      <p:grpSpPr>
-        <a:xfrm>
-          <a:off x="0" y="0"/>
-          <a:ext cx="0" cy="0"/>
-          <a:chOff x="0" y="0"/>
-          <a:chExt cx="0" cy="0"/>
-        </a:xfrm>
-      </p:grpSpPr>
-      <p:pic>
-        <p:nvPicPr>
-          <p:cNvPr id="3" name="Picture 2">
-            <a:extLst>
-              <a:ext uri="{FF2B5EF4-FFF2-40B4-BE49-F238E27FC236}">
-                <a16:creationId xmlns:a16="http://schemas.microsoft.com/office/drawing/2014/main" id="{A68F7D2F-4A4D-7ECE-E208-054B6F7BBB7E}"/>
-              </a:ext>
-            </a:extLst>
-          </p:cNvPr>
-          <p:cNvPicPr>
-            <a:picLocks noChangeAspect="1"/>
-          </p:cNvPicPr>
-          <p:nvPr/>
-        </p:nvPicPr>
-        <p:blipFill>
-          <a:blip r:embed="rId2"/>
-          <a:stretch>
-            <a:fillRect/>
-          </a:stretch>
-        </p:blipFill>
-        <p:spPr>
-          <a:xfrm>
-            <a:off x="637767" y="290375"/>
-            <a:ext cx="4887007" cy="1971950"/>
-          </a:xfrm>
-          <a:prstGeom prst="rect">
-            <a:avLst/>
-          </a:prstGeom>
-          <a:ln>
-            <a:solidFill>
-              <a:schemeClr val="tx1"/>
-            </a:solidFill>
-          </a:ln>
-        </p:spPr>
-      </p:pic>
-      <p:sp>
-        <p:nvSpPr>
-          <p:cNvPr id="2" name="Oval 1">
-            <a:extLst>
-              <a:ext uri="{FF2B5EF4-FFF2-40B4-BE49-F238E27FC236}">
-                <a16:creationId xmlns:a16="http://schemas.microsoft.com/office/drawing/2014/main" id="{FC0BC8B7-5C25-7567-9273-139111C9E197}"/>
-              </a:ext>
-            </a:extLst>
-          </p:cNvPr>
-          <p:cNvSpPr/>
-          <p:nvPr/>
-        </p:nvSpPr>
-        <p:spPr>
-          <a:xfrm>
-            <a:off x="3314700" y="1933576"/>
-            <a:ext cx="876300" cy="328750"/>
-          </a:xfrm>
-          <a:prstGeom prst="ellipse">
-            <a:avLst/>
-          </a:prstGeom>
-          <a:noFill/>
-          <a:ln w="47625">
-            <a:solidFill>
-              <a:schemeClr val="accent2"/>
-            </a:solidFill>
-          </a:ln>
-        </p:spPr>
-        <p:style>
-          <a:lnRef idx="2">
-            <a:schemeClr val="accent1">
-              <a:shade val="15000"/>
-            </a:schemeClr>
-          </a:lnRef>
-          <a:fillRef idx="1">
-            <a:schemeClr val="accent1"/>
-          </a:fillRef>
-          <a:effectRef idx="0">
-            <a:schemeClr val="accent1"/>
-          </a:effectRef>
-          <a:fontRef idx="minor">
-            <a:schemeClr val="lt1"/>
-          </a:fontRef>
-        </p:style>
-        <p:txBody>
-          <a:bodyPr rtlCol="0" anchor="ctr"/>
-          <a:lstStyle/>
-          <a:p>
-            <a:pPr algn="ctr"/>
-            <a:endParaRPr lang="en-CA"/>
-          </a:p>
-        </p:txBody>
-      </p:sp>
-      <p:pic>
-        <p:nvPicPr>
-          <p:cNvPr id="6" name="Picture 5">
-            <a:extLst>
-              <a:ext uri="{FF2B5EF4-FFF2-40B4-BE49-F238E27FC236}">
-                <a16:creationId xmlns:a16="http://schemas.microsoft.com/office/drawing/2014/main" id="{964CE425-A99E-6641-7DF8-F1EA0CE5EBD9}"/>
-              </a:ext>
-            </a:extLst>
-          </p:cNvPr>
-          <p:cNvPicPr>
-            <a:picLocks noChangeAspect="1"/>
-          </p:cNvPicPr>
-          <p:nvPr/>
-        </p:nvPicPr>
-        <p:blipFill>
-          <a:blip r:embed="rId3"/>
-          <a:srcRect t="-654" b="41403"/>
-          <a:stretch/>
-        </p:blipFill>
-        <p:spPr>
-          <a:xfrm>
-            <a:off x="5761945" y="457200"/>
-            <a:ext cx="5849166" cy="2562527"/>
-          </a:xfrm>
-          <a:prstGeom prst="rect">
-            <a:avLst/>
-          </a:prstGeom>
-          <a:ln>
-            <a:solidFill>
-              <a:schemeClr val="tx1"/>
-            </a:solidFill>
-          </a:ln>
-        </p:spPr>
-      </p:pic>
-      <p:pic>
-        <p:nvPicPr>
-          <p:cNvPr id="9" name="Picture 8">
-            <a:extLst>
-              <a:ext uri="{FF2B5EF4-FFF2-40B4-BE49-F238E27FC236}">
-                <a16:creationId xmlns:a16="http://schemas.microsoft.com/office/drawing/2014/main" id="{22E080F5-3C94-D4AC-008F-263F941C6DED}"/>
-              </a:ext>
-            </a:extLst>
-          </p:cNvPr>
-          <p:cNvPicPr>
-            <a:picLocks noChangeAspect="1"/>
-          </p:cNvPicPr>
-          <p:nvPr/>
-        </p:nvPicPr>
-        <p:blipFill>
-          <a:blip r:embed="rId3"/>
-          <a:srcRect t="88541"/>
-          <a:stretch/>
-        </p:blipFill>
-        <p:spPr>
-          <a:xfrm>
-            <a:off x="5762625" y="2524125"/>
-            <a:ext cx="5849166" cy="495602"/>
-          </a:xfrm>
-          <a:prstGeom prst="rect">
-            <a:avLst/>
-          </a:prstGeom>
-        </p:spPr>
-      </p:pic>
-      <p:sp>
-        <p:nvSpPr>
-          <p:cNvPr id="10" name="Oval 9">
-            <a:extLst>
-              <a:ext uri="{FF2B5EF4-FFF2-40B4-BE49-F238E27FC236}">
-                <a16:creationId xmlns:a16="http://schemas.microsoft.com/office/drawing/2014/main" id="{9F11F6C7-5D9F-7FA7-3DE0-C003766E8A63}"/>
-              </a:ext>
-            </a:extLst>
-          </p:cNvPr>
-          <p:cNvSpPr/>
-          <p:nvPr/>
-        </p:nvSpPr>
-        <p:spPr>
-          <a:xfrm>
-            <a:off x="9886950" y="2609850"/>
-            <a:ext cx="971550" cy="386202"/>
-          </a:xfrm>
-          <a:prstGeom prst="ellipse">
-            <a:avLst/>
-          </a:prstGeom>
-          <a:noFill/>
-          <a:ln w="47625">
-            <a:solidFill>
-              <a:schemeClr val="accent2"/>
-            </a:solidFill>
-          </a:ln>
-        </p:spPr>
-        <p:style>
-          <a:lnRef idx="2">
-            <a:schemeClr val="accent1">
-              <a:shade val="15000"/>
-            </a:schemeClr>
-          </a:lnRef>
-          <a:fillRef idx="1">
-            <a:schemeClr val="accent1"/>
-          </a:fillRef>
-          <a:effectRef idx="0">
-            <a:schemeClr val="accent1"/>
-          </a:effectRef>
-          <a:fontRef idx="minor">
-            <a:schemeClr val="lt1"/>
-          </a:fontRef>
-        </p:style>
-        <p:txBody>
-          <a:bodyPr rtlCol="0" anchor="ctr"/>
-          <a:lstStyle/>
-          <a:p>
-            <a:pPr algn="ctr"/>
-            <a:endParaRPr lang="en-CA"/>
-          </a:p>
-        </p:txBody>
-      </p:sp>
-    </p:spTree>
-    <p:extLst>
-      <p:ext uri="{BB962C8B-B14F-4D97-AF65-F5344CB8AC3E}">
-        <p14:creationId xmlns:p14="http://schemas.microsoft.com/office/powerpoint/2010/main" val="4234653831"/>
-      </p:ext>
-    </p:extLst>
-  </p:cSld>
-  <p:clrMapOvr>
-    <a:masterClrMapping/>
-  </p:clrMapOvr>
-</p:sld>
-</file>
-
-<file path=ppt/slides/slide4.xml><?xml version="1.0" encoding="utf-8"?>
-<p:sld xmlns:a="http://schemas.openxmlformats.org/drawingml/2006/main" xmlns:r="http://schemas.openxmlformats.org/officeDocument/2006/relationships" xmlns:p="http://schemas.openxmlformats.org/presentationml/2006/main">
-  <p:cSld>
-    <p:spTree>
-      <p:nvGrpSpPr>
-        <p:cNvPr id="1" name=""/>
-        <p:cNvGrpSpPr/>
-        <p:nvPr/>
-      </p:nvGrpSpPr>
-      <p:grpSpPr>
-        <a:xfrm>
-          <a:off x="0" y="0"/>
-          <a:ext cx="0" cy="0"/>
-          <a:chOff x="0" y="0"/>
-          <a:chExt cx="0" cy="0"/>
-        </a:xfrm>
-      </p:grpSpPr>
-      <p:pic>
-        <p:nvPicPr>
-          <p:cNvPr id="6" name="Picture 5">
-            <a:extLst>
-              <a:ext uri="{FF2B5EF4-FFF2-40B4-BE49-F238E27FC236}">
-                <a16:creationId xmlns:a16="http://schemas.microsoft.com/office/drawing/2014/main" id="{E65FABC1-72EC-6874-70D9-A0559004FDDC}"/>
-              </a:ext>
-            </a:extLst>
-          </p:cNvPr>
-          <p:cNvPicPr>
-            <a:picLocks noChangeAspect="1"/>
-          </p:cNvPicPr>
-          <p:nvPr/>
-        </p:nvPicPr>
-        <p:blipFill>
-          <a:blip r:embed="rId2"/>
-          <a:stretch>
-            <a:fillRect/>
-          </a:stretch>
-        </p:blipFill>
-        <p:spPr>
-          <a:xfrm>
-            <a:off x="885258" y="218627"/>
-            <a:ext cx="8116433" cy="3210373"/>
-          </a:xfrm>
-          <a:prstGeom prst="rect">
-            <a:avLst/>
-          </a:prstGeom>
-          <a:ln>
-            <a:solidFill>
-              <a:schemeClr val="tx1"/>
-            </a:solidFill>
-          </a:ln>
-        </p:spPr>
-      </p:pic>
-      <p:sp>
-        <p:nvSpPr>
-          <p:cNvPr id="2" name="Oval 1">
-            <a:extLst>
-              <a:ext uri="{FF2B5EF4-FFF2-40B4-BE49-F238E27FC236}">
-                <a16:creationId xmlns:a16="http://schemas.microsoft.com/office/drawing/2014/main" id="{FC0BC8B7-5C25-7567-9273-139111C9E197}"/>
-              </a:ext>
-            </a:extLst>
-          </p:cNvPr>
-          <p:cNvSpPr/>
-          <p:nvPr/>
-        </p:nvSpPr>
-        <p:spPr>
-          <a:xfrm>
-            <a:off x="2252516" y="5343526"/>
-            <a:ext cx="876300" cy="328750"/>
-          </a:xfrm>
-          <a:prstGeom prst="ellipse">
-            <a:avLst/>
-          </a:prstGeom>
-          <a:noFill/>
-          <a:ln w="47625">
-            <a:solidFill>
-              <a:schemeClr val="accent2"/>
-            </a:solidFill>
-          </a:ln>
-        </p:spPr>
-        <p:style>
-          <a:lnRef idx="2">
-            <a:schemeClr val="accent1">
-              <a:shade val="15000"/>
-            </a:schemeClr>
-          </a:lnRef>
-          <a:fillRef idx="1">
-            <a:schemeClr val="accent1"/>
-          </a:fillRef>
-          <a:effectRef idx="0">
-            <a:schemeClr val="accent1"/>
-          </a:effectRef>
-          <a:fontRef idx="minor">
-            <a:schemeClr val="lt1"/>
-          </a:fontRef>
-        </p:style>
-        <p:txBody>
-          <a:bodyPr rtlCol="0" anchor="ctr"/>
-          <a:lstStyle/>
-          <a:p>
-            <a:pPr algn="ctr"/>
-            <a:endParaRPr lang="en-CA"/>
-          </a:p>
-        </p:txBody>
-      </p:sp>
-      <p:pic>
-        <p:nvPicPr>
-          <p:cNvPr id="14" name="Picture 13">
-            <a:extLst>
-              <a:ext uri="{FF2B5EF4-FFF2-40B4-BE49-F238E27FC236}">
-                <a16:creationId xmlns:a16="http://schemas.microsoft.com/office/drawing/2014/main" id="{780ADAA9-9647-8AB1-A554-007FC1CD0DD2}"/>
-              </a:ext>
-            </a:extLst>
-          </p:cNvPr>
-          <p:cNvPicPr>
-            <a:picLocks noChangeAspect="1"/>
-          </p:cNvPicPr>
-          <p:nvPr/>
-        </p:nvPicPr>
-        <p:blipFill>
-          <a:blip r:embed="rId3"/>
-          <a:stretch>
-            <a:fillRect/>
-          </a:stretch>
-        </p:blipFill>
-        <p:spPr>
-          <a:xfrm>
-            <a:off x="885258" y="3505211"/>
-            <a:ext cx="7668695" cy="3134162"/>
-          </a:xfrm>
-          <a:prstGeom prst="rect">
-            <a:avLst/>
-          </a:prstGeom>
-        </p:spPr>
-      </p:pic>
-    </p:spTree>
-    <p:extLst>
-      <p:ext uri="{BB962C8B-B14F-4D97-AF65-F5344CB8AC3E}">
-        <p14:creationId xmlns:p14="http://schemas.microsoft.com/office/powerpoint/2010/main" val="3432582559"/>
-      </p:ext>
-    </p:extLst>
-  </p:cSld>
-  <p:clrMapOvr>
-    <a:masterClrMapping/>
-  </p:clrMapOvr>
-</p:sld>
-</file>
-
-<file path=ppt/slides/slide5.xml><?xml version="1.0" encoding="utf-8"?>
-<p:sld xmlns:a="http://schemas.openxmlformats.org/drawingml/2006/main" xmlns:r="http://schemas.openxmlformats.org/officeDocument/2006/relationships" xmlns:p="http://schemas.openxmlformats.org/presentationml/2006/main">
-  <p:cSld>
-    <p:spTree>
-      <p:nvGrpSpPr>
-        <p:cNvPr id="1" name=""/>
-        <p:cNvGrpSpPr/>
-        <p:nvPr/>
-      </p:nvGrpSpPr>
-      <p:grpSpPr>
-        <a:xfrm>
-          <a:off x="0" y="0"/>
-          <a:ext cx="0" cy="0"/>
-          <a:chOff x="0" y="0"/>
-          <a:chExt cx="0" cy="0"/>
-        </a:xfrm>
-      </p:grpSpPr>
-      <p:pic>
-        <p:nvPicPr>
-          <p:cNvPr id="3" name="Picture 2">
-            <a:extLst>
-              <a:ext uri="{FF2B5EF4-FFF2-40B4-BE49-F238E27FC236}">
-                <a16:creationId xmlns:a16="http://schemas.microsoft.com/office/drawing/2014/main" id="{B0B7D7E0-294A-EDCD-5017-6F9FF26A2063}"/>
-              </a:ext>
-            </a:extLst>
-          </p:cNvPr>
-          <p:cNvPicPr>
-            <a:picLocks noChangeAspect="1"/>
-          </p:cNvPicPr>
-          <p:nvPr/>
-        </p:nvPicPr>
-        <p:blipFill>
-          <a:blip r:embed="rId2"/>
-          <a:srcRect b="71728"/>
-          <a:stretch/>
-        </p:blipFill>
-        <p:spPr>
-          <a:xfrm>
-            <a:off x="572271" y="522622"/>
-            <a:ext cx="3916264" cy="1525254"/>
-          </a:xfrm>
-          <a:prstGeom prst="rect">
-            <a:avLst/>
-          </a:prstGeom>
-        </p:spPr>
-      </p:pic>
-      <p:pic>
-        <p:nvPicPr>
-          <p:cNvPr id="5" name="Picture 4">
-            <a:extLst>
-              <a:ext uri="{FF2B5EF4-FFF2-40B4-BE49-F238E27FC236}">
-                <a16:creationId xmlns:a16="http://schemas.microsoft.com/office/drawing/2014/main" id="{C9AD6573-0BCB-79A9-137E-77D706528361}"/>
-              </a:ext>
-            </a:extLst>
-          </p:cNvPr>
-          <p:cNvPicPr>
-            <a:picLocks noChangeAspect="1"/>
-          </p:cNvPicPr>
-          <p:nvPr/>
-        </p:nvPicPr>
-        <p:blipFill>
-          <a:blip r:embed="rId3"/>
-          <a:stretch>
-            <a:fillRect/>
-          </a:stretch>
-        </p:blipFill>
-        <p:spPr>
-          <a:xfrm>
-            <a:off x="2175779" y="2961731"/>
-            <a:ext cx="3087486" cy="3507144"/>
-          </a:xfrm>
-          <a:prstGeom prst="rect">
-            <a:avLst/>
-          </a:prstGeom>
-        </p:spPr>
-      </p:pic>
-      <p:pic>
-        <p:nvPicPr>
-          <p:cNvPr id="2" name="Picture 1">
-            <a:extLst>
-              <a:ext uri="{FF2B5EF4-FFF2-40B4-BE49-F238E27FC236}">
-                <a16:creationId xmlns:a16="http://schemas.microsoft.com/office/drawing/2014/main" id="{41C12CA7-BCFE-B83E-4425-890E5641F632}"/>
-              </a:ext>
-            </a:extLst>
-          </p:cNvPr>
-          <p:cNvPicPr>
-            <a:picLocks noChangeAspect="1"/>
-          </p:cNvPicPr>
-          <p:nvPr/>
-        </p:nvPicPr>
-        <p:blipFill>
-          <a:blip r:embed="rId4"/>
-          <a:srcRect t="94488"/>
-          <a:stretch/>
-        </p:blipFill>
-        <p:spPr>
-          <a:xfrm>
-            <a:off x="572271" y="2047876"/>
-            <a:ext cx="3916264" cy="297125"/>
-          </a:xfrm>
-          <a:prstGeom prst="rect">
-            <a:avLst/>
-          </a:prstGeom>
-        </p:spPr>
-      </p:pic>
-      <p:sp>
-        <p:nvSpPr>
-          <p:cNvPr id="8" name="Oval 7">
-            <a:extLst>
-              <a:ext uri="{FF2B5EF4-FFF2-40B4-BE49-F238E27FC236}">
-                <a16:creationId xmlns:a16="http://schemas.microsoft.com/office/drawing/2014/main" id="{07116172-8FBC-836A-DF1B-12BB832B1442}"/>
-              </a:ext>
-            </a:extLst>
-          </p:cNvPr>
-          <p:cNvSpPr/>
-          <p:nvPr/>
-        </p:nvSpPr>
-        <p:spPr>
-          <a:xfrm>
-            <a:off x="3943351" y="5705475"/>
-            <a:ext cx="1234304" cy="355420"/>
-          </a:xfrm>
-          <a:prstGeom prst="ellipse">
-            <a:avLst/>
-          </a:prstGeom>
-          <a:noFill/>
-          <a:ln w="47625">
-            <a:solidFill>
-              <a:schemeClr val="accent2"/>
-            </a:solidFill>
-          </a:ln>
-        </p:spPr>
-        <p:style>
-          <a:lnRef idx="2">
-            <a:schemeClr val="accent1">
-              <a:shade val="15000"/>
-            </a:schemeClr>
-          </a:lnRef>
-          <a:fillRef idx="1">
-            <a:schemeClr val="accent1"/>
-          </a:fillRef>
-          <a:effectRef idx="0">
-            <a:schemeClr val="accent1"/>
-          </a:effectRef>
-          <a:fontRef idx="minor">
-            <a:schemeClr val="lt1"/>
-          </a:fontRef>
-        </p:style>
-        <p:txBody>
-          <a:bodyPr rtlCol="0" anchor="ctr"/>
-          <a:lstStyle/>
-          <a:p>
-            <a:pPr algn="ctr"/>
-            <a:endParaRPr lang="en-CA"/>
-          </a:p>
-        </p:txBody>
-      </p:sp>
-      <p:pic>
-        <p:nvPicPr>
-          <p:cNvPr id="10" name="Picture 9">
-            <a:extLst>
-              <a:ext uri="{FF2B5EF4-FFF2-40B4-BE49-F238E27FC236}">
-                <a16:creationId xmlns:a16="http://schemas.microsoft.com/office/drawing/2014/main" id="{45AC736F-6B94-9829-DDDD-0A80F91BF3C7}"/>
-              </a:ext>
-            </a:extLst>
-          </p:cNvPr>
-          <p:cNvPicPr>
-            <a:picLocks noChangeAspect="1"/>
-          </p:cNvPicPr>
-          <p:nvPr/>
-        </p:nvPicPr>
-        <p:blipFill>
-          <a:blip r:embed="rId5"/>
-          <a:stretch>
-            <a:fillRect/>
-          </a:stretch>
-        </p:blipFill>
-        <p:spPr>
-          <a:xfrm>
-            <a:off x="5399036" y="773157"/>
-            <a:ext cx="6220693" cy="1571844"/>
-          </a:xfrm>
-          <a:prstGeom prst="rect">
-            <a:avLst/>
-          </a:prstGeom>
-        </p:spPr>
-      </p:pic>
-    </p:spTree>
-    <p:extLst>
-      <p:ext uri="{BB962C8B-B14F-4D97-AF65-F5344CB8AC3E}">
-        <p14:creationId xmlns:p14="http://schemas.microsoft.com/office/powerpoint/2010/main" val="314174546"/>
-      </p:ext>
-    </p:extLst>
-  </p:cSld>
-  <p:clrMapOvr>
-    <a:masterClrMapping/>
-  </p:clrMapOvr>
-</p:sld>
-</file>
-
-<file path=ppt/slides/slide6.xml><?xml version="1.0" encoding="utf-8"?>
-<p:sld xmlns:a="http://schemas.openxmlformats.org/drawingml/2006/main" xmlns:r="http://schemas.openxmlformats.org/officeDocument/2006/relationships" xmlns:p="http://schemas.openxmlformats.org/presentationml/2006/main">
-  <p:cSld>
-    <p:spTree>
-      <p:nvGrpSpPr>
-        <p:cNvPr id="1" name=""/>
-        <p:cNvGrpSpPr/>
-        <p:nvPr/>
-      </p:nvGrpSpPr>
-      <p:grpSpPr>
-        <a:xfrm>
-          <a:off x="0" y="0"/>
-          <a:ext cx="0" cy="0"/>
-          <a:chOff x="0" y="0"/>
-          <a:chExt cx="0" cy="0"/>
-        </a:xfrm>
-      </p:grpSpPr>
-      <p:pic>
-        <p:nvPicPr>
-          <p:cNvPr id="3" name="Picture 2">
-            <a:extLst>
-              <a:ext uri="{FF2B5EF4-FFF2-40B4-BE49-F238E27FC236}">
-                <a16:creationId xmlns:a16="http://schemas.microsoft.com/office/drawing/2014/main" id="{E8205430-76C2-592D-948B-90669E5A5FAC}"/>
-              </a:ext>
-            </a:extLst>
-          </p:cNvPr>
-          <p:cNvPicPr>
-            <a:picLocks noChangeAspect="1"/>
-          </p:cNvPicPr>
-          <p:nvPr/>
-        </p:nvPicPr>
-        <p:blipFill>
-          <a:blip r:embed="rId2"/>
-          <a:stretch>
-            <a:fillRect/>
-          </a:stretch>
-        </p:blipFill>
-        <p:spPr>
-          <a:xfrm>
-            <a:off x="5973941" y="572880"/>
-            <a:ext cx="5887272" cy="5572903"/>
-          </a:xfrm>
-          <a:prstGeom prst="rect">
-            <a:avLst/>
-          </a:prstGeom>
-        </p:spPr>
-      </p:pic>
-      <p:sp>
-        <p:nvSpPr>
-          <p:cNvPr id="4" name="Oval 3">
-            <a:extLst>
-              <a:ext uri="{FF2B5EF4-FFF2-40B4-BE49-F238E27FC236}">
-                <a16:creationId xmlns:a16="http://schemas.microsoft.com/office/drawing/2014/main" id="{90EB8330-D052-D24F-F09E-F73F4AE455F5}"/>
-              </a:ext>
-            </a:extLst>
-          </p:cNvPr>
-          <p:cNvSpPr/>
-          <p:nvPr/>
-        </p:nvSpPr>
-        <p:spPr>
-          <a:xfrm>
-            <a:off x="9691008" y="5182961"/>
-            <a:ext cx="1234304" cy="355420"/>
-          </a:xfrm>
-          <a:prstGeom prst="ellipse">
-            <a:avLst/>
-          </a:prstGeom>
-          <a:noFill/>
-          <a:ln w="47625">
-            <a:solidFill>
-              <a:schemeClr val="accent2"/>
-            </a:solidFill>
-          </a:ln>
-        </p:spPr>
-        <p:style>
-          <a:lnRef idx="2">
-            <a:schemeClr val="accent1">
-              <a:shade val="15000"/>
-            </a:schemeClr>
-          </a:lnRef>
-          <a:fillRef idx="1">
-            <a:schemeClr val="accent1"/>
-          </a:fillRef>
-          <a:effectRef idx="0">
-            <a:schemeClr val="accent1"/>
-          </a:effectRef>
-          <a:fontRef idx="minor">
-            <a:schemeClr val="lt1"/>
-          </a:fontRef>
-        </p:style>
-        <p:txBody>
-          <a:bodyPr rtlCol="0" anchor="ctr"/>
-          <a:lstStyle/>
-          <a:p>
-            <a:pPr algn="ctr"/>
-            <a:endParaRPr lang="en-CA"/>
-          </a:p>
-        </p:txBody>
-      </p:sp>
-      <p:pic>
-        <p:nvPicPr>
-          <p:cNvPr id="6" name="Picture 5">
-            <a:extLst>
-              <a:ext uri="{FF2B5EF4-FFF2-40B4-BE49-F238E27FC236}">
-                <a16:creationId xmlns:a16="http://schemas.microsoft.com/office/drawing/2014/main" id="{E6500350-3F63-D9B4-EFF0-430FC0664E95}"/>
-              </a:ext>
-            </a:extLst>
-          </p:cNvPr>
-          <p:cNvPicPr>
-            <a:picLocks noChangeAspect="1"/>
-          </p:cNvPicPr>
-          <p:nvPr/>
-        </p:nvPicPr>
-        <p:blipFill>
-          <a:blip r:embed="rId3">
-            <a:extLst>
-              <a:ext uri="{28A0092B-C50C-407E-A947-70E740481C1C}">
-                <a14:useLocalDpi xmlns:a14="http://schemas.microsoft.com/office/drawing/2010/main" val="0"/>
-              </a:ext>
-            </a:extLst>
-          </a:blip>
-          <a:stretch>
-            <a:fillRect/>
-          </a:stretch>
-        </p:blipFill>
-        <p:spPr>
-          <a:xfrm>
-            <a:off x="0" y="572879"/>
-            <a:ext cx="5887272" cy="5572903"/>
-          </a:xfrm>
-          <a:prstGeom prst="rect">
-            <a:avLst/>
-          </a:prstGeom>
-        </p:spPr>
-      </p:pic>
-      <p:sp>
-        <p:nvSpPr>
-          <p:cNvPr id="7" name="Oval 6">
-            <a:extLst>
-              <a:ext uri="{FF2B5EF4-FFF2-40B4-BE49-F238E27FC236}">
-                <a16:creationId xmlns:a16="http://schemas.microsoft.com/office/drawing/2014/main" id="{0F114BEE-C543-0871-99D7-153138EA7CF3}"/>
-              </a:ext>
-            </a:extLst>
-          </p:cNvPr>
-          <p:cNvSpPr/>
-          <p:nvPr/>
-        </p:nvSpPr>
-        <p:spPr>
-          <a:xfrm>
-            <a:off x="2763340" y="5182961"/>
-            <a:ext cx="1234304" cy="355420"/>
-          </a:xfrm>
-          <a:prstGeom prst="ellipse">
-            <a:avLst/>
-          </a:prstGeom>
-          <a:noFill/>
-          <a:ln w="47625">
-            <a:solidFill>
-              <a:schemeClr val="accent2"/>
-            </a:solidFill>
-          </a:ln>
-        </p:spPr>
-        <p:style>
-          <a:lnRef idx="2">
-            <a:schemeClr val="accent1">
-              <a:shade val="15000"/>
-            </a:schemeClr>
-          </a:lnRef>
-          <a:fillRef idx="1">
-            <a:schemeClr val="accent1"/>
-          </a:fillRef>
-          <a:effectRef idx="0">
-            <a:schemeClr val="accent1"/>
-          </a:effectRef>
-          <a:fontRef idx="minor">
-            <a:schemeClr val="lt1"/>
-          </a:fontRef>
-        </p:style>
-        <p:txBody>
-          <a:bodyPr rtlCol="0" anchor="ctr"/>
-          <a:lstStyle/>
-          <a:p>
-            <a:pPr algn="ctr"/>
-            <a:endParaRPr lang="en-CA"/>
-          </a:p>
-        </p:txBody>
-      </p:sp>
-    </p:spTree>
-    <p:extLst>
-      <p:ext uri="{BB962C8B-B14F-4D97-AF65-F5344CB8AC3E}">
-        <p14:creationId xmlns:p14="http://schemas.microsoft.com/office/powerpoint/2010/main" val="3387509795"/>
+        <p14:creationId xmlns:p14="http://schemas.microsoft.com/office/powerpoint/2010/main" val="1931239768"/>
       </p:ext>
     </p:extLst>
   </p:cSld>
@@ -5370,10 +3840,10 @@
       </p:grpSpPr>
       <p:pic>
         <p:nvPicPr>
-          <p:cNvPr id="6" name="Picture 5">
-            <a:extLst>
-              <a:ext uri="{FF2B5EF4-FFF2-40B4-BE49-F238E27FC236}">
-                <a16:creationId xmlns:a16="http://schemas.microsoft.com/office/drawing/2014/main" id="{5625F715-6C3E-35E3-A1BC-6F8A15C53DA3}"/>
+          <p:cNvPr id="3" name="Picture 2">
+            <a:extLst>
+              <a:ext uri="{FF2B5EF4-FFF2-40B4-BE49-F238E27FC236}">
+                <a16:creationId xmlns:a16="http://schemas.microsoft.com/office/drawing/2014/main" id="{FDC7CAC5-AC20-D696-C49A-04059D873EE3}"/>
               </a:ext>
             </a:extLst>
           </p:cNvPr>
@@ -5390,20 +3860,79 @@
         </p:blipFill>
         <p:spPr>
           <a:xfrm>
-            <a:off x="5789081" y="920734"/>
-            <a:ext cx="5020376" cy="4772691"/>
+            <a:off x="1054124" y="1309260"/>
+            <a:ext cx="295316" cy="285790"/>
           </a:xfrm>
           <a:prstGeom prst="rect">
             <a:avLst/>
           </a:prstGeom>
         </p:spPr>
       </p:pic>
-      <p:sp>
-        <p:nvSpPr>
-          <p:cNvPr id="7" name="Oval 6">
-            <a:extLst>
-              <a:ext uri="{FF2B5EF4-FFF2-40B4-BE49-F238E27FC236}">
-                <a16:creationId xmlns:a16="http://schemas.microsoft.com/office/drawing/2014/main" id="{4B7EB589-335A-490B-5476-679818C0DBFC}"/>
+      <p:pic>
+        <p:nvPicPr>
+          <p:cNvPr id="5" name="Picture 4">
+            <a:extLst>
+              <a:ext uri="{FF2B5EF4-FFF2-40B4-BE49-F238E27FC236}">
+                <a16:creationId xmlns:a16="http://schemas.microsoft.com/office/drawing/2014/main" id="{4A50F849-AB65-F990-D897-281D47A23BCF}"/>
+              </a:ext>
+            </a:extLst>
+          </p:cNvPr>
+          <p:cNvPicPr>
+            <a:picLocks noChangeAspect="1"/>
+          </p:cNvPicPr>
+          <p:nvPr/>
+        </p:nvPicPr>
+        <p:blipFill>
+          <a:blip r:embed="rId3"/>
+          <a:stretch>
+            <a:fillRect/>
+          </a:stretch>
+        </p:blipFill>
+        <p:spPr>
+          <a:xfrm>
+            <a:off x="2390354" y="1194486"/>
+            <a:ext cx="2133898" cy="3162741"/>
+          </a:xfrm>
+          <a:prstGeom prst="rect">
+            <a:avLst/>
+          </a:prstGeom>
+        </p:spPr>
+      </p:pic>
+      <p:pic>
+        <p:nvPicPr>
+          <p:cNvPr id="7" name="Picture 6">
+            <a:extLst>
+              <a:ext uri="{FF2B5EF4-FFF2-40B4-BE49-F238E27FC236}">
+                <a16:creationId xmlns:a16="http://schemas.microsoft.com/office/drawing/2014/main" id="{7AFEFA28-9821-F2CB-BE78-AB6880F201A1}"/>
+              </a:ext>
+            </a:extLst>
+          </p:cNvPr>
+          <p:cNvPicPr>
+            <a:picLocks noChangeAspect="1"/>
+          </p:cNvPicPr>
+          <p:nvPr/>
+        </p:nvPicPr>
+        <p:blipFill>
+          <a:blip r:embed="rId4"/>
+          <a:srcRect b="68965"/>
+          <a:stretch/>
+        </p:blipFill>
+        <p:spPr>
+          <a:xfrm>
+            <a:off x="4850865" y="1194486"/>
+            <a:ext cx="5207535" cy="1470337"/>
+          </a:xfrm>
+          <a:prstGeom prst="rect">
+            <a:avLst/>
+          </a:prstGeom>
+        </p:spPr>
+      </p:pic>
+      <p:sp>
+        <p:nvSpPr>
+          <p:cNvPr id="8" name="Oval 7">
+            <a:extLst>
+              <a:ext uri="{FF2B5EF4-FFF2-40B4-BE49-F238E27FC236}">
+                <a16:creationId xmlns:a16="http://schemas.microsoft.com/office/drawing/2014/main" id="{40015966-6434-1968-3798-263DF2EBFF28}"/>
               </a:ext>
             </a:extLst>
           </p:cNvPr>
@@ -5411,9 +3940,9 @@
           <p:nvPr/>
         </p:nvSpPr>
         <p:spPr>
-          <a:xfrm flipV="1">
-            <a:off x="5634447" y="4763588"/>
-            <a:ext cx="4171404" cy="400592"/>
+          <a:xfrm>
+            <a:off x="4524252" y="1811383"/>
+            <a:ext cx="1639389" cy="263438"/>
           </a:xfrm>
           <a:prstGeom prst="ellipse">
             <a:avLst/>
@@ -5450,12 +3979,41 @@
           </a:p>
         </p:txBody>
       </p:sp>
-      <p:sp>
-        <p:nvSpPr>
-          <p:cNvPr id="8" name="Oval 7">
-            <a:extLst>
-              <a:ext uri="{FF2B5EF4-FFF2-40B4-BE49-F238E27FC236}">
-                <a16:creationId xmlns:a16="http://schemas.microsoft.com/office/drawing/2014/main" id="{CF24484E-13C1-E99D-A078-1F826ADF432F}"/>
+      <p:pic>
+        <p:nvPicPr>
+          <p:cNvPr id="9" name="Picture 8">
+            <a:extLst>
+              <a:ext uri="{FF2B5EF4-FFF2-40B4-BE49-F238E27FC236}">
+                <a16:creationId xmlns:a16="http://schemas.microsoft.com/office/drawing/2014/main" id="{47016156-5D8D-8A04-C9F0-E69A2B8405C6}"/>
+              </a:ext>
+            </a:extLst>
+          </p:cNvPr>
+          <p:cNvPicPr>
+            <a:picLocks noChangeAspect="1"/>
+          </p:cNvPicPr>
+          <p:nvPr/>
+        </p:nvPicPr>
+        <p:blipFill>
+          <a:blip r:embed="rId4"/>
+          <a:srcRect t="62559" b="1"/>
+          <a:stretch/>
+        </p:blipFill>
+        <p:spPr>
+          <a:xfrm>
+            <a:off x="4850865" y="2542904"/>
+            <a:ext cx="5207535" cy="1773828"/>
+          </a:xfrm>
+          <a:prstGeom prst="rect">
+            <a:avLst/>
+          </a:prstGeom>
+        </p:spPr>
+      </p:pic>
+      <p:sp>
+        <p:nvSpPr>
+          <p:cNvPr id="13" name="Oval 12">
+            <a:extLst>
+              <a:ext uri="{FF2B5EF4-FFF2-40B4-BE49-F238E27FC236}">
+                <a16:creationId xmlns:a16="http://schemas.microsoft.com/office/drawing/2014/main" id="{3F2FDADF-145A-0930-52AB-DC6FA4376EA9}"/>
               </a:ext>
             </a:extLst>
           </p:cNvPr>
@@ -5464,8 +4022,8 @@
         </p:nvSpPr>
         <p:spPr>
           <a:xfrm>
-            <a:off x="9647466" y="1339489"/>
-            <a:ext cx="1234304" cy="355420"/>
+            <a:off x="7689669" y="1480456"/>
+            <a:ext cx="879566" cy="409303"/>
           </a:xfrm>
           <a:prstGeom prst="ellipse">
             <a:avLst/>
@@ -5505,7 +4063,7 @@
     </p:spTree>
     <p:extLst>
       <p:ext uri="{BB962C8B-B14F-4D97-AF65-F5344CB8AC3E}">
-        <p14:creationId xmlns:p14="http://schemas.microsoft.com/office/powerpoint/2010/main" val="3707435728"/>
+        <p14:creationId xmlns:p14="http://schemas.microsoft.com/office/powerpoint/2010/main" val="822535812"/>
       </p:ext>
     </p:extLst>
   </p:cSld>
@@ -5534,10 +4092,10 @@
       </p:grpSpPr>
       <p:pic>
         <p:nvPicPr>
-          <p:cNvPr id="3" name="Picture 2">
-            <a:extLst>
-              <a:ext uri="{FF2B5EF4-FFF2-40B4-BE49-F238E27FC236}">
-                <a16:creationId xmlns:a16="http://schemas.microsoft.com/office/drawing/2014/main" id="{25135CD1-DF58-C4EE-6A76-08C7117E6988}"/>
+          <p:cNvPr id="7" name="Picture 6">
+            <a:extLst>
+              <a:ext uri="{FF2B5EF4-FFF2-40B4-BE49-F238E27FC236}">
+                <a16:creationId xmlns:a16="http://schemas.microsoft.com/office/drawing/2014/main" id="{A176F4C2-F325-EC27-0277-3B51455CF835}"/>
               </a:ext>
             </a:extLst>
           </p:cNvPr>
@@ -5554,13 +4112,13 @@
               </a:ext>
             </a:extLst>
           </a:blip>
-          <a:srcRect b="61204"/>
+          <a:srcRect b="40346"/>
           <a:stretch/>
         </p:blipFill>
         <p:spPr>
           <a:xfrm>
-            <a:off x="1432861" y="990260"/>
-            <a:ext cx="9326277" cy="1892278"/>
+            <a:off x="920060" y="946446"/>
+            <a:ext cx="5391902" cy="2153805"/>
           </a:xfrm>
           <a:prstGeom prst="rect">
             <a:avLst/>
@@ -5569,10 +4127,10 @@
       </p:pic>
       <p:pic>
         <p:nvPicPr>
-          <p:cNvPr id="5" name="Picture 4">
-            <a:extLst>
-              <a:ext uri="{FF2B5EF4-FFF2-40B4-BE49-F238E27FC236}">
-                <a16:creationId xmlns:a16="http://schemas.microsoft.com/office/drawing/2014/main" id="{5BB643E3-9DC7-0731-B485-C9F25A7D790B}"/>
+          <p:cNvPr id="2" name="Picture 1">
+            <a:extLst>
+              <a:ext uri="{FF2B5EF4-FFF2-40B4-BE49-F238E27FC236}">
+                <a16:creationId xmlns:a16="http://schemas.microsoft.com/office/drawing/2014/main" id="{347A3631-1F11-7D9B-4B96-BC34419BEAB2}"/>
               </a:ext>
             </a:extLst>
           </p:cNvPr>
@@ -5582,20 +4140,20 @@
           <p:nvPr/>
         </p:nvPicPr>
         <p:blipFill>
-          <a:blip r:embed="rId3">
+          <a:blip r:embed="rId2">
             <a:extLst>
               <a:ext uri="{28A0092B-C50C-407E-A947-70E740481C1C}">
                 <a14:useLocalDpi xmlns:a14="http://schemas.microsoft.com/office/drawing/2010/main" val="0"/>
               </a:ext>
             </a:extLst>
           </a:blip>
-          <a:srcRect b="61204"/>
+          <a:srcRect t="90046"/>
           <a:stretch/>
         </p:blipFill>
         <p:spPr>
           <a:xfrm>
-            <a:off x="1432860" y="3429000"/>
-            <a:ext cx="9326277" cy="1892278"/>
+            <a:off x="920060" y="3069607"/>
+            <a:ext cx="5391902" cy="359393"/>
           </a:xfrm>
           <a:prstGeom prst="rect">
             <a:avLst/>
@@ -5605,7 +4163,7 @@
     </p:spTree>
     <p:extLst>
       <p:ext uri="{BB962C8B-B14F-4D97-AF65-F5344CB8AC3E}">
-        <p14:creationId xmlns:p14="http://schemas.microsoft.com/office/powerpoint/2010/main" val="1115456660"/>
+        <p14:creationId xmlns:p14="http://schemas.microsoft.com/office/powerpoint/2010/main" val="2802224780"/>
       </p:ext>
     </p:extLst>
   </p:cSld>
@@ -5632,10 +4190,46 @@
           <a:chExt cx="0" cy="0"/>
         </a:xfrm>
       </p:grpSpPr>
+      <p:pic>
+        <p:nvPicPr>
+          <p:cNvPr id="3" name="Picture 2">
+            <a:extLst>
+              <a:ext uri="{FF2B5EF4-FFF2-40B4-BE49-F238E27FC236}">
+                <a16:creationId xmlns:a16="http://schemas.microsoft.com/office/drawing/2014/main" id="{71CE1145-D278-D059-F862-0CFDFCFCF25B}"/>
+              </a:ext>
+            </a:extLst>
+          </p:cNvPr>
+          <p:cNvPicPr>
+            <a:picLocks noChangeAspect="1"/>
+          </p:cNvPicPr>
+          <p:nvPr/>
+        </p:nvPicPr>
+        <p:blipFill>
+          <a:blip r:embed="rId2">
+            <a:extLst>
+              <a:ext uri="{28A0092B-C50C-407E-A947-70E740481C1C}">
+                <a14:useLocalDpi xmlns:a14="http://schemas.microsoft.com/office/drawing/2010/main" val="0"/>
+              </a:ext>
+            </a:extLst>
+          </a:blip>
+          <a:stretch>
+            <a:fillRect/>
+          </a:stretch>
+        </p:blipFill>
+        <p:spPr>
+          <a:xfrm>
+            <a:off x="0" y="707820"/>
+            <a:ext cx="12192000" cy="5442360"/>
+          </a:xfrm>
+          <a:prstGeom prst="rect">
+            <a:avLst/>
+          </a:prstGeom>
+        </p:spPr>
+      </p:pic>
     </p:spTree>
     <p:extLst>
       <p:ext uri="{BB962C8B-B14F-4D97-AF65-F5344CB8AC3E}">
-        <p14:creationId xmlns:p14="http://schemas.microsoft.com/office/powerpoint/2010/main" val="3976848610"/>
+        <p14:creationId xmlns:p14="http://schemas.microsoft.com/office/powerpoint/2010/main" val="2812427647"/>
       </p:ext>
     </p:extLst>
   </p:cSld>

</xml_diff>

<commit_message>
Version 2025.004 - brown mutt, minor report change
</commit_message>
<xml_diff>
--- a/Docs/User's Guide/Imagery/Excel Images.pptx
+++ b/Docs/User's Guide/Imagery/Excel Images.pptx
@@ -3,17 +3,20 @@
 <p:presentation xmlns:a="http://schemas.openxmlformats.org/drawingml/2006/main" xmlns:r="http://schemas.openxmlformats.org/officeDocument/2006/relationships" xmlns:p="http://schemas.openxmlformats.org/presentationml/2006/main" saveSubsetFonts="1">
   <p:sldMasterIdLst>
     <p:sldMasterId id="2147483648" r:id="rId1"/>
+    <p:sldMasterId id="2147483660" r:id="rId2"/>
   </p:sldMasterIdLst>
   <p:sldIdLst>
-    <p:sldId id="266" r:id="rId2"/>
-    <p:sldId id="270" r:id="rId3"/>
-    <p:sldId id="267" r:id="rId4"/>
-    <p:sldId id="272" r:id="rId5"/>
-    <p:sldId id="271" r:id="rId6"/>
-    <p:sldId id="265" r:id="rId7"/>
-    <p:sldId id="273" r:id="rId8"/>
-    <p:sldId id="269" r:id="rId9"/>
-    <p:sldId id="268" r:id="rId10"/>
+    <p:sldId id="274" r:id="rId3"/>
+    <p:sldId id="293" r:id="rId4"/>
+    <p:sldId id="266" r:id="rId5"/>
+    <p:sldId id="270" r:id="rId6"/>
+    <p:sldId id="267" r:id="rId7"/>
+    <p:sldId id="272" r:id="rId8"/>
+    <p:sldId id="271" r:id="rId9"/>
+    <p:sldId id="265" r:id="rId10"/>
+    <p:sldId id="273" r:id="rId11"/>
+    <p:sldId id="269" r:id="rId12"/>
+    <p:sldId id="268" r:id="rId13"/>
   </p:sldIdLst>
   <p:sldSz cx="12192000" cy="6858000"/>
   <p:notesSz cx="6858000" cy="9144000"/>
@@ -269,7 +272,7 @@
           <a:p>
             <a:fld id="{4D45891E-2CD5-4CE6-8274-44086644E53A}" type="datetimeFigureOut">
               <a:rPr lang="en-CA" smtClean="0"/>
-              <a:t>2024-11-19</a:t>
+              <a:t>2025-12-15</a:t>
             </a:fld>
             <a:endParaRPr lang="en-CA"/>
           </a:p>
@@ -469,7 +472,7 @@
           <a:p>
             <a:fld id="{4D45891E-2CD5-4CE6-8274-44086644E53A}" type="datetimeFigureOut">
               <a:rPr lang="en-CA" smtClean="0"/>
-              <a:t>2024-11-19</a:t>
+              <a:t>2025-12-15</a:t>
             </a:fld>
             <a:endParaRPr lang="en-CA"/>
           </a:p>
@@ -679,7 +682,7 @@
           <a:p>
             <a:fld id="{4D45891E-2CD5-4CE6-8274-44086644E53A}" type="datetimeFigureOut">
               <a:rPr lang="en-CA" smtClean="0"/>
-              <a:t>2024-11-19</a:t>
+              <a:t>2025-12-15</a:t>
             </a:fld>
             <a:endParaRPr lang="en-CA"/>
           </a:p>
@@ -743,6 +746,1964 @@
     <p:extLst>
       <p:ext uri="{BB962C8B-B14F-4D97-AF65-F5344CB8AC3E}">
         <p14:creationId xmlns:p14="http://schemas.microsoft.com/office/powerpoint/2010/main" val="4193738916"/>
+      </p:ext>
+    </p:extLst>
+  </p:cSld>
+  <p:clrMapOvr>
+    <a:masterClrMapping/>
+  </p:clrMapOvr>
+</p:sldLayout>
+</file>
+
+<file path=ppt/slideLayouts/slideLayout12.xml><?xml version="1.0" encoding="utf-8"?>
+<p:sldLayout xmlns:a="http://schemas.openxmlformats.org/drawingml/2006/main" xmlns:r="http://schemas.openxmlformats.org/officeDocument/2006/relationships" xmlns:p="http://schemas.openxmlformats.org/presentationml/2006/main" type="title" preserve="1">
+  <p:cSld name="Title Slide">
+    <p:spTree>
+      <p:nvGrpSpPr>
+        <p:cNvPr id="1" name=""/>
+        <p:cNvGrpSpPr/>
+        <p:nvPr/>
+      </p:nvGrpSpPr>
+      <p:grpSpPr>
+        <a:xfrm>
+          <a:off x="0" y="0"/>
+          <a:ext cx="0" cy="0"/>
+          <a:chOff x="0" y="0"/>
+          <a:chExt cx="0" cy="0"/>
+        </a:xfrm>
+      </p:grpSpPr>
+      <p:sp>
+        <p:nvSpPr>
+          <p:cNvPr id="2" name="Title 1">
+            <a:extLst>
+              <a:ext uri="{FF2B5EF4-FFF2-40B4-BE49-F238E27FC236}">
+                <a16:creationId xmlns:a16="http://schemas.microsoft.com/office/drawing/2014/main" id="{84B45F31-0532-B685-C683-5FA8B4293341}"/>
+              </a:ext>
+            </a:extLst>
+          </p:cNvPr>
+          <p:cNvSpPr>
+            <a:spLocks noGrp="1"/>
+          </p:cNvSpPr>
+          <p:nvPr>
+            <p:ph type="ctrTitle"/>
+          </p:nvPr>
+        </p:nvSpPr>
+        <p:spPr>
+          <a:xfrm>
+            <a:off x="1524000" y="1122363"/>
+            <a:ext cx="9144000" cy="2387600"/>
+          </a:xfrm>
+        </p:spPr>
+        <p:txBody>
+          <a:bodyPr anchor="b"/>
+          <a:lstStyle>
+            <a:lvl1pPr algn="ctr">
+              <a:defRPr sz="6000"/>
+            </a:lvl1pPr>
+          </a:lstStyle>
+          <a:p>
+            <a:r>
+              <a:rPr lang="en-US"/>
+              <a:t>Click to edit Master title style</a:t>
+            </a:r>
+            <a:endParaRPr lang="en-CA"/>
+          </a:p>
+        </p:txBody>
+      </p:sp>
+      <p:sp>
+        <p:nvSpPr>
+          <p:cNvPr id="3" name="Subtitle 2">
+            <a:extLst>
+              <a:ext uri="{FF2B5EF4-FFF2-40B4-BE49-F238E27FC236}">
+                <a16:creationId xmlns:a16="http://schemas.microsoft.com/office/drawing/2014/main" id="{7CB4BB59-EEC0-0120-CC6A-6583CF683DAC}"/>
+              </a:ext>
+            </a:extLst>
+          </p:cNvPr>
+          <p:cNvSpPr>
+            <a:spLocks noGrp="1"/>
+          </p:cNvSpPr>
+          <p:nvPr>
+            <p:ph type="subTitle" idx="1"/>
+          </p:nvPr>
+        </p:nvSpPr>
+        <p:spPr>
+          <a:xfrm>
+            <a:off x="1524000" y="3602038"/>
+            <a:ext cx="9144000" cy="1655762"/>
+          </a:xfrm>
+        </p:spPr>
+        <p:txBody>
+          <a:bodyPr/>
+          <a:lstStyle>
+            <a:lvl1pPr marL="0" indent="0" algn="ctr">
+              <a:buNone/>
+              <a:defRPr sz="2400"/>
+            </a:lvl1pPr>
+            <a:lvl2pPr marL="457200" indent="0" algn="ctr">
+              <a:buNone/>
+              <a:defRPr sz="2000"/>
+            </a:lvl2pPr>
+            <a:lvl3pPr marL="914400" indent="0" algn="ctr">
+              <a:buNone/>
+              <a:defRPr sz="1800"/>
+            </a:lvl3pPr>
+            <a:lvl4pPr marL="1371600" indent="0" algn="ctr">
+              <a:buNone/>
+              <a:defRPr sz="1600"/>
+            </a:lvl4pPr>
+            <a:lvl5pPr marL="1828800" indent="0" algn="ctr">
+              <a:buNone/>
+              <a:defRPr sz="1600"/>
+            </a:lvl5pPr>
+            <a:lvl6pPr marL="2286000" indent="0" algn="ctr">
+              <a:buNone/>
+              <a:defRPr sz="1600"/>
+            </a:lvl6pPr>
+            <a:lvl7pPr marL="2743200" indent="0" algn="ctr">
+              <a:buNone/>
+              <a:defRPr sz="1600"/>
+            </a:lvl7pPr>
+            <a:lvl8pPr marL="3200400" indent="0" algn="ctr">
+              <a:buNone/>
+              <a:defRPr sz="1600"/>
+            </a:lvl8pPr>
+            <a:lvl9pPr marL="3657600" indent="0" algn="ctr">
+              <a:buNone/>
+              <a:defRPr sz="1600"/>
+            </a:lvl9pPr>
+          </a:lstStyle>
+          <a:p>
+            <a:r>
+              <a:rPr lang="en-US"/>
+              <a:t>Click to edit Master subtitle style</a:t>
+            </a:r>
+            <a:endParaRPr lang="en-CA"/>
+          </a:p>
+        </p:txBody>
+      </p:sp>
+      <p:sp>
+        <p:nvSpPr>
+          <p:cNvPr id="4" name="Date Placeholder 3">
+            <a:extLst>
+              <a:ext uri="{FF2B5EF4-FFF2-40B4-BE49-F238E27FC236}">
+                <a16:creationId xmlns:a16="http://schemas.microsoft.com/office/drawing/2014/main" id="{532F7876-D9A5-929F-D1D7-FEAAB63F2E06}"/>
+              </a:ext>
+            </a:extLst>
+          </p:cNvPr>
+          <p:cNvSpPr>
+            <a:spLocks noGrp="1"/>
+          </p:cNvSpPr>
+          <p:nvPr>
+            <p:ph type="dt" sz="half" idx="10"/>
+          </p:nvPr>
+        </p:nvSpPr>
+        <p:spPr/>
+        <p:txBody>
+          <a:bodyPr/>
+          <a:lstStyle/>
+          <a:p>
+            <a:fld id="{B9B56988-3E54-4E96-83C2-E79EB96AA973}" type="datetimeFigureOut">
+              <a:rPr lang="en-CA" smtClean="0"/>
+              <a:t>2025-12-12</a:t>
+            </a:fld>
+            <a:endParaRPr lang="en-CA"/>
+          </a:p>
+        </p:txBody>
+      </p:sp>
+      <p:sp>
+        <p:nvSpPr>
+          <p:cNvPr id="5" name="Footer Placeholder 4">
+            <a:extLst>
+              <a:ext uri="{FF2B5EF4-FFF2-40B4-BE49-F238E27FC236}">
+                <a16:creationId xmlns:a16="http://schemas.microsoft.com/office/drawing/2014/main" id="{59DA0104-A916-BB89-3864-0D9CB569A3AB}"/>
+              </a:ext>
+            </a:extLst>
+          </p:cNvPr>
+          <p:cNvSpPr>
+            <a:spLocks noGrp="1"/>
+          </p:cNvSpPr>
+          <p:nvPr>
+            <p:ph type="ftr" sz="quarter" idx="11"/>
+          </p:nvPr>
+        </p:nvSpPr>
+        <p:spPr/>
+        <p:txBody>
+          <a:bodyPr/>
+          <a:lstStyle/>
+          <a:p>
+            <a:endParaRPr lang="en-CA"/>
+          </a:p>
+        </p:txBody>
+      </p:sp>
+      <p:sp>
+        <p:nvSpPr>
+          <p:cNvPr id="6" name="Slide Number Placeholder 5">
+            <a:extLst>
+              <a:ext uri="{FF2B5EF4-FFF2-40B4-BE49-F238E27FC236}">
+                <a16:creationId xmlns:a16="http://schemas.microsoft.com/office/drawing/2014/main" id="{41EB9C9C-1A76-1DDD-ABB3-22DCCD6673A5}"/>
+              </a:ext>
+            </a:extLst>
+          </p:cNvPr>
+          <p:cNvSpPr>
+            <a:spLocks noGrp="1"/>
+          </p:cNvSpPr>
+          <p:nvPr>
+            <p:ph type="sldNum" sz="quarter" idx="12"/>
+          </p:nvPr>
+        </p:nvSpPr>
+        <p:spPr/>
+        <p:txBody>
+          <a:bodyPr/>
+          <a:lstStyle/>
+          <a:p>
+            <a:fld id="{80C47A6C-7241-4F58-9E0D-0713A14ED342}" type="slidenum">
+              <a:rPr lang="en-CA" smtClean="0"/>
+              <a:t>‹#›</a:t>
+            </a:fld>
+            <a:endParaRPr lang="en-CA"/>
+          </a:p>
+        </p:txBody>
+      </p:sp>
+    </p:spTree>
+    <p:extLst>
+      <p:ext uri="{BB962C8B-B14F-4D97-AF65-F5344CB8AC3E}">
+        <p14:creationId xmlns:p14="http://schemas.microsoft.com/office/powerpoint/2010/main" val="2525642883"/>
+      </p:ext>
+    </p:extLst>
+  </p:cSld>
+  <p:clrMapOvr>
+    <a:masterClrMapping/>
+  </p:clrMapOvr>
+</p:sldLayout>
+</file>
+
+<file path=ppt/slideLayouts/slideLayout13.xml><?xml version="1.0" encoding="utf-8"?>
+<p:sldLayout xmlns:a="http://schemas.openxmlformats.org/drawingml/2006/main" xmlns:r="http://schemas.openxmlformats.org/officeDocument/2006/relationships" xmlns:p="http://schemas.openxmlformats.org/presentationml/2006/main" type="obj" preserve="1">
+  <p:cSld name="Title and Content">
+    <p:spTree>
+      <p:nvGrpSpPr>
+        <p:cNvPr id="1" name=""/>
+        <p:cNvGrpSpPr/>
+        <p:nvPr/>
+      </p:nvGrpSpPr>
+      <p:grpSpPr>
+        <a:xfrm>
+          <a:off x="0" y="0"/>
+          <a:ext cx="0" cy="0"/>
+          <a:chOff x="0" y="0"/>
+          <a:chExt cx="0" cy="0"/>
+        </a:xfrm>
+      </p:grpSpPr>
+      <p:sp>
+        <p:nvSpPr>
+          <p:cNvPr id="2" name="Title 1">
+            <a:extLst>
+              <a:ext uri="{FF2B5EF4-FFF2-40B4-BE49-F238E27FC236}">
+                <a16:creationId xmlns:a16="http://schemas.microsoft.com/office/drawing/2014/main" id="{E39013D5-3D30-BBD0-0939-50E426DB5084}"/>
+              </a:ext>
+            </a:extLst>
+          </p:cNvPr>
+          <p:cNvSpPr>
+            <a:spLocks noGrp="1"/>
+          </p:cNvSpPr>
+          <p:nvPr>
+            <p:ph type="title"/>
+          </p:nvPr>
+        </p:nvSpPr>
+        <p:spPr/>
+        <p:txBody>
+          <a:bodyPr/>
+          <a:lstStyle/>
+          <a:p>
+            <a:r>
+              <a:rPr lang="en-US"/>
+              <a:t>Click to edit Master title style</a:t>
+            </a:r>
+            <a:endParaRPr lang="en-CA"/>
+          </a:p>
+        </p:txBody>
+      </p:sp>
+      <p:sp>
+        <p:nvSpPr>
+          <p:cNvPr id="3" name="Content Placeholder 2">
+            <a:extLst>
+              <a:ext uri="{FF2B5EF4-FFF2-40B4-BE49-F238E27FC236}">
+                <a16:creationId xmlns:a16="http://schemas.microsoft.com/office/drawing/2014/main" id="{14E5B2BA-D7F7-B365-8DED-81B9AA0F1BAE}"/>
+              </a:ext>
+            </a:extLst>
+          </p:cNvPr>
+          <p:cNvSpPr>
+            <a:spLocks noGrp="1"/>
+          </p:cNvSpPr>
+          <p:nvPr>
+            <p:ph idx="1"/>
+          </p:nvPr>
+        </p:nvSpPr>
+        <p:spPr/>
+        <p:txBody>
+          <a:bodyPr/>
+          <a:lstStyle/>
+          <a:p>
+            <a:pPr lvl="0"/>
+            <a:r>
+              <a:rPr lang="en-US"/>
+              <a:t>Click to edit Master text styles</a:t>
+            </a:r>
+          </a:p>
+          <a:p>
+            <a:pPr lvl="1"/>
+            <a:r>
+              <a:rPr lang="en-US"/>
+              <a:t>Second level</a:t>
+            </a:r>
+          </a:p>
+          <a:p>
+            <a:pPr lvl="2"/>
+            <a:r>
+              <a:rPr lang="en-US"/>
+              <a:t>Third level</a:t>
+            </a:r>
+          </a:p>
+          <a:p>
+            <a:pPr lvl="3"/>
+            <a:r>
+              <a:rPr lang="en-US"/>
+              <a:t>Fourth level</a:t>
+            </a:r>
+          </a:p>
+          <a:p>
+            <a:pPr lvl="4"/>
+            <a:r>
+              <a:rPr lang="en-US"/>
+              <a:t>Fifth level</a:t>
+            </a:r>
+            <a:endParaRPr lang="en-CA"/>
+          </a:p>
+        </p:txBody>
+      </p:sp>
+      <p:sp>
+        <p:nvSpPr>
+          <p:cNvPr id="4" name="Date Placeholder 3">
+            <a:extLst>
+              <a:ext uri="{FF2B5EF4-FFF2-40B4-BE49-F238E27FC236}">
+                <a16:creationId xmlns:a16="http://schemas.microsoft.com/office/drawing/2014/main" id="{2F1863BD-A1B2-F3FA-9AED-4E8D5D60C98E}"/>
+              </a:ext>
+            </a:extLst>
+          </p:cNvPr>
+          <p:cNvSpPr>
+            <a:spLocks noGrp="1"/>
+          </p:cNvSpPr>
+          <p:nvPr>
+            <p:ph type="dt" sz="half" idx="10"/>
+          </p:nvPr>
+        </p:nvSpPr>
+        <p:spPr/>
+        <p:txBody>
+          <a:bodyPr/>
+          <a:lstStyle/>
+          <a:p>
+            <a:fld id="{B9B56988-3E54-4E96-83C2-E79EB96AA973}" type="datetimeFigureOut">
+              <a:rPr lang="en-CA" smtClean="0"/>
+              <a:t>2025-12-12</a:t>
+            </a:fld>
+            <a:endParaRPr lang="en-CA"/>
+          </a:p>
+        </p:txBody>
+      </p:sp>
+      <p:sp>
+        <p:nvSpPr>
+          <p:cNvPr id="5" name="Footer Placeholder 4">
+            <a:extLst>
+              <a:ext uri="{FF2B5EF4-FFF2-40B4-BE49-F238E27FC236}">
+                <a16:creationId xmlns:a16="http://schemas.microsoft.com/office/drawing/2014/main" id="{745AB26D-9790-8328-4628-667803D517ED}"/>
+              </a:ext>
+            </a:extLst>
+          </p:cNvPr>
+          <p:cNvSpPr>
+            <a:spLocks noGrp="1"/>
+          </p:cNvSpPr>
+          <p:nvPr>
+            <p:ph type="ftr" sz="quarter" idx="11"/>
+          </p:nvPr>
+        </p:nvSpPr>
+        <p:spPr/>
+        <p:txBody>
+          <a:bodyPr/>
+          <a:lstStyle/>
+          <a:p>
+            <a:endParaRPr lang="en-CA"/>
+          </a:p>
+        </p:txBody>
+      </p:sp>
+      <p:sp>
+        <p:nvSpPr>
+          <p:cNvPr id="6" name="Slide Number Placeholder 5">
+            <a:extLst>
+              <a:ext uri="{FF2B5EF4-FFF2-40B4-BE49-F238E27FC236}">
+                <a16:creationId xmlns:a16="http://schemas.microsoft.com/office/drawing/2014/main" id="{8B939188-11B2-C5F9-87B7-ABE0A2A76A5C}"/>
+              </a:ext>
+            </a:extLst>
+          </p:cNvPr>
+          <p:cNvSpPr>
+            <a:spLocks noGrp="1"/>
+          </p:cNvSpPr>
+          <p:nvPr>
+            <p:ph type="sldNum" sz="quarter" idx="12"/>
+          </p:nvPr>
+        </p:nvSpPr>
+        <p:spPr/>
+        <p:txBody>
+          <a:bodyPr/>
+          <a:lstStyle/>
+          <a:p>
+            <a:fld id="{80C47A6C-7241-4F58-9E0D-0713A14ED342}" type="slidenum">
+              <a:rPr lang="en-CA" smtClean="0"/>
+              <a:t>‹#›</a:t>
+            </a:fld>
+            <a:endParaRPr lang="en-CA"/>
+          </a:p>
+        </p:txBody>
+      </p:sp>
+    </p:spTree>
+    <p:extLst>
+      <p:ext uri="{BB962C8B-B14F-4D97-AF65-F5344CB8AC3E}">
+        <p14:creationId xmlns:p14="http://schemas.microsoft.com/office/powerpoint/2010/main" val="1062796159"/>
+      </p:ext>
+    </p:extLst>
+  </p:cSld>
+  <p:clrMapOvr>
+    <a:masterClrMapping/>
+  </p:clrMapOvr>
+</p:sldLayout>
+</file>
+
+<file path=ppt/slideLayouts/slideLayout14.xml><?xml version="1.0" encoding="utf-8"?>
+<p:sldLayout xmlns:a="http://schemas.openxmlformats.org/drawingml/2006/main" xmlns:r="http://schemas.openxmlformats.org/officeDocument/2006/relationships" xmlns:p="http://schemas.openxmlformats.org/presentationml/2006/main" type="secHead" preserve="1">
+  <p:cSld name="Section Header">
+    <p:spTree>
+      <p:nvGrpSpPr>
+        <p:cNvPr id="1" name=""/>
+        <p:cNvGrpSpPr/>
+        <p:nvPr/>
+      </p:nvGrpSpPr>
+      <p:grpSpPr>
+        <a:xfrm>
+          <a:off x="0" y="0"/>
+          <a:ext cx="0" cy="0"/>
+          <a:chOff x="0" y="0"/>
+          <a:chExt cx="0" cy="0"/>
+        </a:xfrm>
+      </p:grpSpPr>
+      <p:sp>
+        <p:nvSpPr>
+          <p:cNvPr id="2" name="Title 1">
+            <a:extLst>
+              <a:ext uri="{FF2B5EF4-FFF2-40B4-BE49-F238E27FC236}">
+                <a16:creationId xmlns:a16="http://schemas.microsoft.com/office/drawing/2014/main" id="{CFD4E1CE-925B-F6E8-209E-A2834A19E68B}"/>
+              </a:ext>
+            </a:extLst>
+          </p:cNvPr>
+          <p:cNvSpPr>
+            <a:spLocks noGrp="1"/>
+          </p:cNvSpPr>
+          <p:nvPr>
+            <p:ph type="title"/>
+          </p:nvPr>
+        </p:nvSpPr>
+        <p:spPr>
+          <a:xfrm>
+            <a:off x="831850" y="1709738"/>
+            <a:ext cx="10515600" cy="2852737"/>
+          </a:xfrm>
+        </p:spPr>
+        <p:txBody>
+          <a:bodyPr anchor="b"/>
+          <a:lstStyle>
+            <a:lvl1pPr>
+              <a:defRPr sz="6000"/>
+            </a:lvl1pPr>
+          </a:lstStyle>
+          <a:p>
+            <a:r>
+              <a:rPr lang="en-US"/>
+              <a:t>Click to edit Master title style</a:t>
+            </a:r>
+            <a:endParaRPr lang="en-CA"/>
+          </a:p>
+        </p:txBody>
+      </p:sp>
+      <p:sp>
+        <p:nvSpPr>
+          <p:cNvPr id="3" name="Text Placeholder 2">
+            <a:extLst>
+              <a:ext uri="{FF2B5EF4-FFF2-40B4-BE49-F238E27FC236}">
+                <a16:creationId xmlns:a16="http://schemas.microsoft.com/office/drawing/2014/main" id="{9E1770B2-F518-596A-0A70-236631C5A649}"/>
+              </a:ext>
+            </a:extLst>
+          </p:cNvPr>
+          <p:cNvSpPr>
+            <a:spLocks noGrp="1"/>
+          </p:cNvSpPr>
+          <p:nvPr>
+            <p:ph type="body" idx="1"/>
+          </p:nvPr>
+        </p:nvSpPr>
+        <p:spPr>
+          <a:xfrm>
+            <a:off x="831850" y="4589463"/>
+            <a:ext cx="10515600" cy="1500187"/>
+          </a:xfrm>
+        </p:spPr>
+        <p:txBody>
+          <a:bodyPr/>
+          <a:lstStyle>
+            <a:lvl1pPr marL="0" indent="0">
+              <a:buNone/>
+              <a:defRPr sz="2400">
+                <a:solidFill>
+                  <a:schemeClr val="tx1">
+                    <a:tint val="75000"/>
+                  </a:schemeClr>
+                </a:solidFill>
+              </a:defRPr>
+            </a:lvl1pPr>
+            <a:lvl2pPr marL="457200" indent="0">
+              <a:buNone/>
+              <a:defRPr sz="2000">
+                <a:solidFill>
+                  <a:schemeClr val="tx1">
+                    <a:tint val="75000"/>
+                  </a:schemeClr>
+                </a:solidFill>
+              </a:defRPr>
+            </a:lvl2pPr>
+            <a:lvl3pPr marL="914400" indent="0">
+              <a:buNone/>
+              <a:defRPr sz="1800">
+                <a:solidFill>
+                  <a:schemeClr val="tx1">
+                    <a:tint val="75000"/>
+                  </a:schemeClr>
+                </a:solidFill>
+              </a:defRPr>
+            </a:lvl3pPr>
+            <a:lvl4pPr marL="1371600" indent="0">
+              <a:buNone/>
+              <a:defRPr sz="1600">
+                <a:solidFill>
+                  <a:schemeClr val="tx1">
+                    <a:tint val="75000"/>
+                  </a:schemeClr>
+                </a:solidFill>
+              </a:defRPr>
+            </a:lvl4pPr>
+            <a:lvl5pPr marL="1828800" indent="0">
+              <a:buNone/>
+              <a:defRPr sz="1600">
+                <a:solidFill>
+                  <a:schemeClr val="tx1">
+                    <a:tint val="75000"/>
+                  </a:schemeClr>
+                </a:solidFill>
+              </a:defRPr>
+            </a:lvl5pPr>
+            <a:lvl6pPr marL="2286000" indent="0">
+              <a:buNone/>
+              <a:defRPr sz="1600">
+                <a:solidFill>
+                  <a:schemeClr val="tx1">
+                    <a:tint val="75000"/>
+                  </a:schemeClr>
+                </a:solidFill>
+              </a:defRPr>
+            </a:lvl6pPr>
+            <a:lvl7pPr marL="2743200" indent="0">
+              <a:buNone/>
+              <a:defRPr sz="1600">
+                <a:solidFill>
+                  <a:schemeClr val="tx1">
+                    <a:tint val="75000"/>
+                  </a:schemeClr>
+                </a:solidFill>
+              </a:defRPr>
+            </a:lvl7pPr>
+            <a:lvl8pPr marL="3200400" indent="0">
+              <a:buNone/>
+              <a:defRPr sz="1600">
+                <a:solidFill>
+                  <a:schemeClr val="tx1">
+                    <a:tint val="75000"/>
+                  </a:schemeClr>
+                </a:solidFill>
+              </a:defRPr>
+            </a:lvl8pPr>
+            <a:lvl9pPr marL="3657600" indent="0">
+              <a:buNone/>
+              <a:defRPr sz="1600">
+                <a:solidFill>
+                  <a:schemeClr val="tx1">
+                    <a:tint val="75000"/>
+                  </a:schemeClr>
+                </a:solidFill>
+              </a:defRPr>
+            </a:lvl9pPr>
+          </a:lstStyle>
+          <a:p>
+            <a:pPr lvl="0"/>
+            <a:r>
+              <a:rPr lang="en-US"/>
+              <a:t>Click to edit Master text styles</a:t>
+            </a:r>
+          </a:p>
+        </p:txBody>
+      </p:sp>
+      <p:sp>
+        <p:nvSpPr>
+          <p:cNvPr id="4" name="Date Placeholder 3">
+            <a:extLst>
+              <a:ext uri="{FF2B5EF4-FFF2-40B4-BE49-F238E27FC236}">
+                <a16:creationId xmlns:a16="http://schemas.microsoft.com/office/drawing/2014/main" id="{8BB57CC0-C4C9-DCA9-C253-41600225EBBA}"/>
+              </a:ext>
+            </a:extLst>
+          </p:cNvPr>
+          <p:cNvSpPr>
+            <a:spLocks noGrp="1"/>
+          </p:cNvSpPr>
+          <p:nvPr>
+            <p:ph type="dt" sz="half" idx="10"/>
+          </p:nvPr>
+        </p:nvSpPr>
+        <p:spPr/>
+        <p:txBody>
+          <a:bodyPr/>
+          <a:lstStyle/>
+          <a:p>
+            <a:fld id="{B9B56988-3E54-4E96-83C2-E79EB96AA973}" type="datetimeFigureOut">
+              <a:rPr lang="en-CA" smtClean="0"/>
+              <a:t>2025-12-12</a:t>
+            </a:fld>
+            <a:endParaRPr lang="en-CA"/>
+          </a:p>
+        </p:txBody>
+      </p:sp>
+      <p:sp>
+        <p:nvSpPr>
+          <p:cNvPr id="5" name="Footer Placeholder 4">
+            <a:extLst>
+              <a:ext uri="{FF2B5EF4-FFF2-40B4-BE49-F238E27FC236}">
+                <a16:creationId xmlns:a16="http://schemas.microsoft.com/office/drawing/2014/main" id="{66B54645-3BAF-4EA3-B454-98BA2F45AFF0}"/>
+              </a:ext>
+            </a:extLst>
+          </p:cNvPr>
+          <p:cNvSpPr>
+            <a:spLocks noGrp="1"/>
+          </p:cNvSpPr>
+          <p:nvPr>
+            <p:ph type="ftr" sz="quarter" idx="11"/>
+          </p:nvPr>
+        </p:nvSpPr>
+        <p:spPr/>
+        <p:txBody>
+          <a:bodyPr/>
+          <a:lstStyle/>
+          <a:p>
+            <a:endParaRPr lang="en-CA"/>
+          </a:p>
+        </p:txBody>
+      </p:sp>
+      <p:sp>
+        <p:nvSpPr>
+          <p:cNvPr id="6" name="Slide Number Placeholder 5">
+            <a:extLst>
+              <a:ext uri="{FF2B5EF4-FFF2-40B4-BE49-F238E27FC236}">
+                <a16:creationId xmlns:a16="http://schemas.microsoft.com/office/drawing/2014/main" id="{378AF420-4CDE-A23D-BC13-4DFF4122EDE2}"/>
+              </a:ext>
+            </a:extLst>
+          </p:cNvPr>
+          <p:cNvSpPr>
+            <a:spLocks noGrp="1"/>
+          </p:cNvSpPr>
+          <p:nvPr>
+            <p:ph type="sldNum" sz="quarter" idx="12"/>
+          </p:nvPr>
+        </p:nvSpPr>
+        <p:spPr/>
+        <p:txBody>
+          <a:bodyPr/>
+          <a:lstStyle/>
+          <a:p>
+            <a:fld id="{80C47A6C-7241-4F58-9E0D-0713A14ED342}" type="slidenum">
+              <a:rPr lang="en-CA" smtClean="0"/>
+              <a:t>‹#›</a:t>
+            </a:fld>
+            <a:endParaRPr lang="en-CA"/>
+          </a:p>
+        </p:txBody>
+      </p:sp>
+    </p:spTree>
+    <p:extLst>
+      <p:ext uri="{BB962C8B-B14F-4D97-AF65-F5344CB8AC3E}">
+        <p14:creationId xmlns:p14="http://schemas.microsoft.com/office/powerpoint/2010/main" val="2783336850"/>
+      </p:ext>
+    </p:extLst>
+  </p:cSld>
+  <p:clrMapOvr>
+    <a:masterClrMapping/>
+  </p:clrMapOvr>
+</p:sldLayout>
+</file>
+
+<file path=ppt/slideLayouts/slideLayout15.xml><?xml version="1.0" encoding="utf-8"?>
+<p:sldLayout xmlns:a="http://schemas.openxmlformats.org/drawingml/2006/main" xmlns:r="http://schemas.openxmlformats.org/officeDocument/2006/relationships" xmlns:p="http://schemas.openxmlformats.org/presentationml/2006/main" type="twoObj" preserve="1">
+  <p:cSld name="Two Content">
+    <p:spTree>
+      <p:nvGrpSpPr>
+        <p:cNvPr id="1" name=""/>
+        <p:cNvGrpSpPr/>
+        <p:nvPr/>
+      </p:nvGrpSpPr>
+      <p:grpSpPr>
+        <a:xfrm>
+          <a:off x="0" y="0"/>
+          <a:ext cx="0" cy="0"/>
+          <a:chOff x="0" y="0"/>
+          <a:chExt cx="0" cy="0"/>
+        </a:xfrm>
+      </p:grpSpPr>
+      <p:sp>
+        <p:nvSpPr>
+          <p:cNvPr id="2" name="Title 1">
+            <a:extLst>
+              <a:ext uri="{FF2B5EF4-FFF2-40B4-BE49-F238E27FC236}">
+                <a16:creationId xmlns:a16="http://schemas.microsoft.com/office/drawing/2014/main" id="{9A8BDB97-4461-9418-7505-DA07248EC7B2}"/>
+              </a:ext>
+            </a:extLst>
+          </p:cNvPr>
+          <p:cNvSpPr>
+            <a:spLocks noGrp="1"/>
+          </p:cNvSpPr>
+          <p:nvPr>
+            <p:ph type="title"/>
+          </p:nvPr>
+        </p:nvSpPr>
+        <p:spPr/>
+        <p:txBody>
+          <a:bodyPr/>
+          <a:lstStyle/>
+          <a:p>
+            <a:r>
+              <a:rPr lang="en-US"/>
+              <a:t>Click to edit Master title style</a:t>
+            </a:r>
+            <a:endParaRPr lang="en-CA"/>
+          </a:p>
+        </p:txBody>
+      </p:sp>
+      <p:sp>
+        <p:nvSpPr>
+          <p:cNvPr id="3" name="Content Placeholder 2">
+            <a:extLst>
+              <a:ext uri="{FF2B5EF4-FFF2-40B4-BE49-F238E27FC236}">
+                <a16:creationId xmlns:a16="http://schemas.microsoft.com/office/drawing/2014/main" id="{3CDE2225-F98B-AFD1-CE8D-EB2786D080C6}"/>
+              </a:ext>
+            </a:extLst>
+          </p:cNvPr>
+          <p:cNvSpPr>
+            <a:spLocks noGrp="1"/>
+          </p:cNvSpPr>
+          <p:nvPr>
+            <p:ph sz="half" idx="1"/>
+          </p:nvPr>
+        </p:nvSpPr>
+        <p:spPr>
+          <a:xfrm>
+            <a:off x="838200" y="1825625"/>
+            <a:ext cx="5181600" cy="4351338"/>
+          </a:xfrm>
+        </p:spPr>
+        <p:txBody>
+          <a:bodyPr/>
+          <a:lstStyle/>
+          <a:p>
+            <a:pPr lvl="0"/>
+            <a:r>
+              <a:rPr lang="en-US"/>
+              <a:t>Click to edit Master text styles</a:t>
+            </a:r>
+          </a:p>
+          <a:p>
+            <a:pPr lvl="1"/>
+            <a:r>
+              <a:rPr lang="en-US"/>
+              <a:t>Second level</a:t>
+            </a:r>
+          </a:p>
+          <a:p>
+            <a:pPr lvl="2"/>
+            <a:r>
+              <a:rPr lang="en-US"/>
+              <a:t>Third level</a:t>
+            </a:r>
+          </a:p>
+          <a:p>
+            <a:pPr lvl="3"/>
+            <a:r>
+              <a:rPr lang="en-US"/>
+              <a:t>Fourth level</a:t>
+            </a:r>
+          </a:p>
+          <a:p>
+            <a:pPr lvl="4"/>
+            <a:r>
+              <a:rPr lang="en-US"/>
+              <a:t>Fifth level</a:t>
+            </a:r>
+            <a:endParaRPr lang="en-CA"/>
+          </a:p>
+        </p:txBody>
+      </p:sp>
+      <p:sp>
+        <p:nvSpPr>
+          <p:cNvPr id="4" name="Content Placeholder 3">
+            <a:extLst>
+              <a:ext uri="{FF2B5EF4-FFF2-40B4-BE49-F238E27FC236}">
+                <a16:creationId xmlns:a16="http://schemas.microsoft.com/office/drawing/2014/main" id="{13D78570-F9D5-BDF4-0962-FDD1766A90B8}"/>
+              </a:ext>
+            </a:extLst>
+          </p:cNvPr>
+          <p:cNvSpPr>
+            <a:spLocks noGrp="1"/>
+          </p:cNvSpPr>
+          <p:nvPr>
+            <p:ph sz="half" idx="2"/>
+          </p:nvPr>
+        </p:nvSpPr>
+        <p:spPr>
+          <a:xfrm>
+            <a:off x="6172200" y="1825625"/>
+            <a:ext cx="5181600" cy="4351338"/>
+          </a:xfrm>
+        </p:spPr>
+        <p:txBody>
+          <a:bodyPr/>
+          <a:lstStyle/>
+          <a:p>
+            <a:pPr lvl="0"/>
+            <a:r>
+              <a:rPr lang="en-US"/>
+              <a:t>Click to edit Master text styles</a:t>
+            </a:r>
+          </a:p>
+          <a:p>
+            <a:pPr lvl="1"/>
+            <a:r>
+              <a:rPr lang="en-US"/>
+              <a:t>Second level</a:t>
+            </a:r>
+          </a:p>
+          <a:p>
+            <a:pPr lvl="2"/>
+            <a:r>
+              <a:rPr lang="en-US"/>
+              <a:t>Third level</a:t>
+            </a:r>
+          </a:p>
+          <a:p>
+            <a:pPr lvl="3"/>
+            <a:r>
+              <a:rPr lang="en-US"/>
+              <a:t>Fourth level</a:t>
+            </a:r>
+          </a:p>
+          <a:p>
+            <a:pPr lvl="4"/>
+            <a:r>
+              <a:rPr lang="en-US"/>
+              <a:t>Fifth level</a:t>
+            </a:r>
+            <a:endParaRPr lang="en-CA"/>
+          </a:p>
+        </p:txBody>
+      </p:sp>
+      <p:sp>
+        <p:nvSpPr>
+          <p:cNvPr id="5" name="Date Placeholder 4">
+            <a:extLst>
+              <a:ext uri="{FF2B5EF4-FFF2-40B4-BE49-F238E27FC236}">
+                <a16:creationId xmlns:a16="http://schemas.microsoft.com/office/drawing/2014/main" id="{3AF7C6D5-D4CE-C1EC-C296-FEA0250B2B94}"/>
+              </a:ext>
+            </a:extLst>
+          </p:cNvPr>
+          <p:cNvSpPr>
+            <a:spLocks noGrp="1"/>
+          </p:cNvSpPr>
+          <p:nvPr>
+            <p:ph type="dt" sz="half" idx="10"/>
+          </p:nvPr>
+        </p:nvSpPr>
+        <p:spPr/>
+        <p:txBody>
+          <a:bodyPr/>
+          <a:lstStyle/>
+          <a:p>
+            <a:fld id="{B9B56988-3E54-4E96-83C2-E79EB96AA973}" type="datetimeFigureOut">
+              <a:rPr lang="en-CA" smtClean="0"/>
+              <a:t>2025-12-12</a:t>
+            </a:fld>
+            <a:endParaRPr lang="en-CA"/>
+          </a:p>
+        </p:txBody>
+      </p:sp>
+      <p:sp>
+        <p:nvSpPr>
+          <p:cNvPr id="6" name="Footer Placeholder 5">
+            <a:extLst>
+              <a:ext uri="{FF2B5EF4-FFF2-40B4-BE49-F238E27FC236}">
+                <a16:creationId xmlns:a16="http://schemas.microsoft.com/office/drawing/2014/main" id="{E827D367-CB57-D508-73FC-BD67C31A77B0}"/>
+              </a:ext>
+            </a:extLst>
+          </p:cNvPr>
+          <p:cNvSpPr>
+            <a:spLocks noGrp="1"/>
+          </p:cNvSpPr>
+          <p:nvPr>
+            <p:ph type="ftr" sz="quarter" idx="11"/>
+          </p:nvPr>
+        </p:nvSpPr>
+        <p:spPr/>
+        <p:txBody>
+          <a:bodyPr/>
+          <a:lstStyle/>
+          <a:p>
+            <a:endParaRPr lang="en-CA"/>
+          </a:p>
+        </p:txBody>
+      </p:sp>
+      <p:sp>
+        <p:nvSpPr>
+          <p:cNvPr id="7" name="Slide Number Placeholder 6">
+            <a:extLst>
+              <a:ext uri="{FF2B5EF4-FFF2-40B4-BE49-F238E27FC236}">
+                <a16:creationId xmlns:a16="http://schemas.microsoft.com/office/drawing/2014/main" id="{3C6A27B1-3430-82EF-DE86-9ECD8C0D3CDE}"/>
+              </a:ext>
+            </a:extLst>
+          </p:cNvPr>
+          <p:cNvSpPr>
+            <a:spLocks noGrp="1"/>
+          </p:cNvSpPr>
+          <p:nvPr>
+            <p:ph type="sldNum" sz="quarter" idx="12"/>
+          </p:nvPr>
+        </p:nvSpPr>
+        <p:spPr/>
+        <p:txBody>
+          <a:bodyPr/>
+          <a:lstStyle/>
+          <a:p>
+            <a:fld id="{80C47A6C-7241-4F58-9E0D-0713A14ED342}" type="slidenum">
+              <a:rPr lang="en-CA" smtClean="0"/>
+              <a:t>‹#›</a:t>
+            </a:fld>
+            <a:endParaRPr lang="en-CA"/>
+          </a:p>
+        </p:txBody>
+      </p:sp>
+    </p:spTree>
+    <p:extLst>
+      <p:ext uri="{BB962C8B-B14F-4D97-AF65-F5344CB8AC3E}">
+        <p14:creationId xmlns:p14="http://schemas.microsoft.com/office/powerpoint/2010/main" val="1498843358"/>
+      </p:ext>
+    </p:extLst>
+  </p:cSld>
+  <p:clrMapOvr>
+    <a:masterClrMapping/>
+  </p:clrMapOvr>
+</p:sldLayout>
+</file>
+
+<file path=ppt/slideLayouts/slideLayout16.xml><?xml version="1.0" encoding="utf-8"?>
+<p:sldLayout xmlns:a="http://schemas.openxmlformats.org/drawingml/2006/main" xmlns:r="http://schemas.openxmlformats.org/officeDocument/2006/relationships" xmlns:p="http://schemas.openxmlformats.org/presentationml/2006/main" type="twoTxTwoObj" preserve="1">
+  <p:cSld name="Comparison">
+    <p:spTree>
+      <p:nvGrpSpPr>
+        <p:cNvPr id="1" name=""/>
+        <p:cNvGrpSpPr/>
+        <p:nvPr/>
+      </p:nvGrpSpPr>
+      <p:grpSpPr>
+        <a:xfrm>
+          <a:off x="0" y="0"/>
+          <a:ext cx="0" cy="0"/>
+          <a:chOff x="0" y="0"/>
+          <a:chExt cx="0" cy="0"/>
+        </a:xfrm>
+      </p:grpSpPr>
+      <p:sp>
+        <p:nvSpPr>
+          <p:cNvPr id="2" name="Title 1">
+            <a:extLst>
+              <a:ext uri="{FF2B5EF4-FFF2-40B4-BE49-F238E27FC236}">
+                <a16:creationId xmlns:a16="http://schemas.microsoft.com/office/drawing/2014/main" id="{4B1A24B0-7BFF-C20C-7ED0-86747C7F1701}"/>
+              </a:ext>
+            </a:extLst>
+          </p:cNvPr>
+          <p:cNvSpPr>
+            <a:spLocks noGrp="1"/>
+          </p:cNvSpPr>
+          <p:nvPr>
+            <p:ph type="title"/>
+          </p:nvPr>
+        </p:nvSpPr>
+        <p:spPr>
+          <a:xfrm>
+            <a:off x="839788" y="365125"/>
+            <a:ext cx="10515600" cy="1325563"/>
+          </a:xfrm>
+        </p:spPr>
+        <p:txBody>
+          <a:bodyPr/>
+          <a:lstStyle/>
+          <a:p>
+            <a:r>
+              <a:rPr lang="en-US"/>
+              <a:t>Click to edit Master title style</a:t>
+            </a:r>
+            <a:endParaRPr lang="en-CA"/>
+          </a:p>
+        </p:txBody>
+      </p:sp>
+      <p:sp>
+        <p:nvSpPr>
+          <p:cNvPr id="3" name="Text Placeholder 2">
+            <a:extLst>
+              <a:ext uri="{FF2B5EF4-FFF2-40B4-BE49-F238E27FC236}">
+                <a16:creationId xmlns:a16="http://schemas.microsoft.com/office/drawing/2014/main" id="{59E19F4D-809F-53E2-FD86-0C6239A529CD}"/>
+              </a:ext>
+            </a:extLst>
+          </p:cNvPr>
+          <p:cNvSpPr>
+            <a:spLocks noGrp="1"/>
+          </p:cNvSpPr>
+          <p:nvPr>
+            <p:ph type="body" idx="1"/>
+          </p:nvPr>
+        </p:nvSpPr>
+        <p:spPr>
+          <a:xfrm>
+            <a:off x="839788" y="1681163"/>
+            <a:ext cx="5157787" cy="823912"/>
+          </a:xfrm>
+        </p:spPr>
+        <p:txBody>
+          <a:bodyPr anchor="b"/>
+          <a:lstStyle>
+            <a:lvl1pPr marL="0" indent="0">
+              <a:buNone/>
+              <a:defRPr sz="2400" b="1"/>
+            </a:lvl1pPr>
+            <a:lvl2pPr marL="457200" indent="0">
+              <a:buNone/>
+              <a:defRPr sz="2000" b="1"/>
+            </a:lvl2pPr>
+            <a:lvl3pPr marL="914400" indent="0">
+              <a:buNone/>
+              <a:defRPr sz="1800" b="1"/>
+            </a:lvl3pPr>
+            <a:lvl4pPr marL="1371600" indent="0">
+              <a:buNone/>
+              <a:defRPr sz="1600" b="1"/>
+            </a:lvl4pPr>
+            <a:lvl5pPr marL="1828800" indent="0">
+              <a:buNone/>
+              <a:defRPr sz="1600" b="1"/>
+            </a:lvl5pPr>
+            <a:lvl6pPr marL="2286000" indent="0">
+              <a:buNone/>
+              <a:defRPr sz="1600" b="1"/>
+            </a:lvl6pPr>
+            <a:lvl7pPr marL="2743200" indent="0">
+              <a:buNone/>
+              <a:defRPr sz="1600" b="1"/>
+            </a:lvl7pPr>
+            <a:lvl8pPr marL="3200400" indent="0">
+              <a:buNone/>
+              <a:defRPr sz="1600" b="1"/>
+            </a:lvl8pPr>
+            <a:lvl9pPr marL="3657600" indent="0">
+              <a:buNone/>
+              <a:defRPr sz="1600" b="1"/>
+            </a:lvl9pPr>
+          </a:lstStyle>
+          <a:p>
+            <a:pPr lvl="0"/>
+            <a:r>
+              <a:rPr lang="en-US"/>
+              <a:t>Click to edit Master text styles</a:t>
+            </a:r>
+          </a:p>
+        </p:txBody>
+      </p:sp>
+      <p:sp>
+        <p:nvSpPr>
+          <p:cNvPr id="4" name="Content Placeholder 3">
+            <a:extLst>
+              <a:ext uri="{FF2B5EF4-FFF2-40B4-BE49-F238E27FC236}">
+                <a16:creationId xmlns:a16="http://schemas.microsoft.com/office/drawing/2014/main" id="{6B982A7D-40B4-3728-0DA4-F8E73613D9BA}"/>
+              </a:ext>
+            </a:extLst>
+          </p:cNvPr>
+          <p:cNvSpPr>
+            <a:spLocks noGrp="1"/>
+          </p:cNvSpPr>
+          <p:nvPr>
+            <p:ph sz="half" idx="2"/>
+          </p:nvPr>
+        </p:nvSpPr>
+        <p:spPr>
+          <a:xfrm>
+            <a:off x="839788" y="2505075"/>
+            <a:ext cx="5157787" cy="3684588"/>
+          </a:xfrm>
+        </p:spPr>
+        <p:txBody>
+          <a:bodyPr/>
+          <a:lstStyle/>
+          <a:p>
+            <a:pPr lvl="0"/>
+            <a:r>
+              <a:rPr lang="en-US"/>
+              <a:t>Click to edit Master text styles</a:t>
+            </a:r>
+          </a:p>
+          <a:p>
+            <a:pPr lvl="1"/>
+            <a:r>
+              <a:rPr lang="en-US"/>
+              <a:t>Second level</a:t>
+            </a:r>
+          </a:p>
+          <a:p>
+            <a:pPr lvl="2"/>
+            <a:r>
+              <a:rPr lang="en-US"/>
+              <a:t>Third level</a:t>
+            </a:r>
+          </a:p>
+          <a:p>
+            <a:pPr lvl="3"/>
+            <a:r>
+              <a:rPr lang="en-US"/>
+              <a:t>Fourth level</a:t>
+            </a:r>
+          </a:p>
+          <a:p>
+            <a:pPr lvl="4"/>
+            <a:r>
+              <a:rPr lang="en-US"/>
+              <a:t>Fifth level</a:t>
+            </a:r>
+            <a:endParaRPr lang="en-CA"/>
+          </a:p>
+        </p:txBody>
+      </p:sp>
+      <p:sp>
+        <p:nvSpPr>
+          <p:cNvPr id="5" name="Text Placeholder 4">
+            <a:extLst>
+              <a:ext uri="{FF2B5EF4-FFF2-40B4-BE49-F238E27FC236}">
+                <a16:creationId xmlns:a16="http://schemas.microsoft.com/office/drawing/2014/main" id="{AD4E123D-24FE-FDB5-6F4A-DD636ED0EAE2}"/>
+              </a:ext>
+            </a:extLst>
+          </p:cNvPr>
+          <p:cNvSpPr>
+            <a:spLocks noGrp="1"/>
+          </p:cNvSpPr>
+          <p:nvPr>
+            <p:ph type="body" sz="quarter" idx="3"/>
+          </p:nvPr>
+        </p:nvSpPr>
+        <p:spPr>
+          <a:xfrm>
+            <a:off x="6172200" y="1681163"/>
+            <a:ext cx="5183188" cy="823912"/>
+          </a:xfrm>
+        </p:spPr>
+        <p:txBody>
+          <a:bodyPr anchor="b"/>
+          <a:lstStyle>
+            <a:lvl1pPr marL="0" indent="0">
+              <a:buNone/>
+              <a:defRPr sz="2400" b="1"/>
+            </a:lvl1pPr>
+            <a:lvl2pPr marL="457200" indent="0">
+              <a:buNone/>
+              <a:defRPr sz="2000" b="1"/>
+            </a:lvl2pPr>
+            <a:lvl3pPr marL="914400" indent="0">
+              <a:buNone/>
+              <a:defRPr sz="1800" b="1"/>
+            </a:lvl3pPr>
+            <a:lvl4pPr marL="1371600" indent="0">
+              <a:buNone/>
+              <a:defRPr sz="1600" b="1"/>
+            </a:lvl4pPr>
+            <a:lvl5pPr marL="1828800" indent="0">
+              <a:buNone/>
+              <a:defRPr sz="1600" b="1"/>
+            </a:lvl5pPr>
+            <a:lvl6pPr marL="2286000" indent="0">
+              <a:buNone/>
+              <a:defRPr sz="1600" b="1"/>
+            </a:lvl6pPr>
+            <a:lvl7pPr marL="2743200" indent="0">
+              <a:buNone/>
+              <a:defRPr sz="1600" b="1"/>
+            </a:lvl7pPr>
+            <a:lvl8pPr marL="3200400" indent="0">
+              <a:buNone/>
+              <a:defRPr sz="1600" b="1"/>
+            </a:lvl8pPr>
+            <a:lvl9pPr marL="3657600" indent="0">
+              <a:buNone/>
+              <a:defRPr sz="1600" b="1"/>
+            </a:lvl9pPr>
+          </a:lstStyle>
+          <a:p>
+            <a:pPr lvl="0"/>
+            <a:r>
+              <a:rPr lang="en-US"/>
+              <a:t>Click to edit Master text styles</a:t>
+            </a:r>
+          </a:p>
+        </p:txBody>
+      </p:sp>
+      <p:sp>
+        <p:nvSpPr>
+          <p:cNvPr id="6" name="Content Placeholder 5">
+            <a:extLst>
+              <a:ext uri="{FF2B5EF4-FFF2-40B4-BE49-F238E27FC236}">
+                <a16:creationId xmlns:a16="http://schemas.microsoft.com/office/drawing/2014/main" id="{6ABFD1E6-1823-E2E7-3717-59B424746D37}"/>
+              </a:ext>
+            </a:extLst>
+          </p:cNvPr>
+          <p:cNvSpPr>
+            <a:spLocks noGrp="1"/>
+          </p:cNvSpPr>
+          <p:nvPr>
+            <p:ph sz="quarter" idx="4"/>
+          </p:nvPr>
+        </p:nvSpPr>
+        <p:spPr>
+          <a:xfrm>
+            <a:off x="6172200" y="2505075"/>
+            <a:ext cx="5183188" cy="3684588"/>
+          </a:xfrm>
+        </p:spPr>
+        <p:txBody>
+          <a:bodyPr/>
+          <a:lstStyle/>
+          <a:p>
+            <a:pPr lvl="0"/>
+            <a:r>
+              <a:rPr lang="en-US"/>
+              <a:t>Click to edit Master text styles</a:t>
+            </a:r>
+          </a:p>
+          <a:p>
+            <a:pPr lvl="1"/>
+            <a:r>
+              <a:rPr lang="en-US"/>
+              <a:t>Second level</a:t>
+            </a:r>
+          </a:p>
+          <a:p>
+            <a:pPr lvl="2"/>
+            <a:r>
+              <a:rPr lang="en-US"/>
+              <a:t>Third level</a:t>
+            </a:r>
+          </a:p>
+          <a:p>
+            <a:pPr lvl="3"/>
+            <a:r>
+              <a:rPr lang="en-US"/>
+              <a:t>Fourth level</a:t>
+            </a:r>
+          </a:p>
+          <a:p>
+            <a:pPr lvl="4"/>
+            <a:r>
+              <a:rPr lang="en-US"/>
+              <a:t>Fifth level</a:t>
+            </a:r>
+            <a:endParaRPr lang="en-CA"/>
+          </a:p>
+        </p:txBody>
+      </p:sp>
+      <p:sp>
+        <p:nvSpPr>
+          <p:cNvPr id="7" name="Date Placeholder 6">
+            <a:extLst>
+              <a:ext uri="{FF2B5EF4-FFF2-40B4-BE49-F238E27FC236}">
+                <a16:creationId xmlns:a16="http://schemas.microsoft.com/office/drawing/2014/main" id="{9CF4CC42-FB3C-E3EA-3D62-4C4819214B00}"/>
+              </a:ext>
+            </a:extLst>
+          </p:cNvPr>
+          <p:cNvSpPr>
+            <a:spLocks noGrp="1"/>
+          </p:cNvSpPr>
+          <p:nvPr>
+            <p:ph type="dt" sz="half" idx="10"/>
+          </p:nvPr>
+        </p:nvSpPr>
+        <p:spPr/>
+        <p:txBody>
+          <a:bodyPr/>
+          <a:lstStyle/>
+          <a:p>
+            <a:fld id="{B9B56988-3E54-4E96-83C2-E79EB96AA973}" type="datetimeFigureOut">
+              <a:rPr lang="en-CA" smtClean="0"/>
+              <a:t>2025-12-12</a:t>
+            </a:fld>
+            <a:endParaRPr lang="en-CA"/>
+          </a:p>
+        </p:txBody>
+      </p:sp>
+      <p:sp>
+        <p:nvSpPr>
+          <p:cNvPr id="8" name="Footer Placeholder 7">
+            <a:extLst>
+              <a:ext uri="{FF2B5EF4-FFF2-40B4-BE49-F238E27FC236}">
+                <a16:creationId xmlns:a16="http://schemas.microsoft.com/office/drawing/2014/main" id="{A6AAD4C0-421B-44E2-64C1-17B282E1FF1B}"/>
+              </a:ext>
+            </a:extLst>
+          </p:cNvPr>
+          <p:cNvSpPr>
+            <a:spLocks noGrp="1"/>
+          </p:cNvSpPr>
+          <p:nvPr>
+            <p:ph type="ftr" sz="quarter" idx="11"/>
+          </p:nvPr>
+        </p:nvSpPr>
+        <p:spPr/>
+        <p:txBody>
+          <a:bodyPr/>
+          <a:lstStyle/>
+          <a:p>
+            <a:endParaRPr lang="en-CA"/>
+          </a:p>
+        </p:txBody>
+      </p:sp>
+      <p:sp>
+        <p:nvSpPr>
+          <p:cNvPr id="9" name="Slide Number Placeholder 8">
+            <a:extLst>
+              <a:ext uri="{FF2B5EF4-FFF2-40B4-BE49-F238E27FC236}">
+                <a16:creationId xmlns:a16="http://schemas.microsoft.com/office/drawing/2014/main" id="{08C9DC25-2AD4-134C-940B-6A39A7CC06B9}"/>
+              </a:ext>
+            </a:extLst>
+          </p:cNvPr>
+          <p:cNvSpPr>
+            <a:spLocks noGrp="1"/>
+          </p:cNvSpPr>
+          <p:nvPr>
+            <p:ph type="sldNum" sz="quarter" idx="12"/>
+          </p:nvPr>
+        </p:nvSpPr>
+        <p:spPr/>
+        <p:txBody>
+          <a:bodyPr/>
+          <a:lstStyle/>
+          <a:p>
+            <a:fld id="{80C47A6C-7241-4F58-9E0D-0713A14ED342}" type="slidenum">
+              <a:rPr lang="en-CA" smtClean="0"/>
+              <a:t>‹#›</a:t>
+            </a:fld>
+            <a:endParaRPr lang="en-CA"/>
+          </a:p>
+        </p:txBody>
+      </p:sp>
+    </p:spTree>
+    <p:extLst>
+      <p:ext uri="{BB962C8B-B14F-4D97-AF65-F5344CB8AC3E}">
+        <p14:creationId xmlns:p14="http://schemas.microsoft.com/office/powerpoint/2010/main" val="1702383092"/>
+      </p:ext>
+    </p:extLst>
+  </p:cSld>
+  <p:clrMapOvr>
+    <a:masterClrMapping/>
+  </p:clrMapOvr>
+</p:sldLayout>
+</file>
+
+<file path=ppt/slideLayouts/slideLayout17.xml><?xml version="1.0" encoding="utf-8"?>
+<p:sldLayout xmlns:a="http://schemas.openxmlformats.org/drawingml/2006/main" xmlns:r="http://schemas.openxmlformats.org/officeDocument/2006/relationships" xmlns:p="http://schemas.openxmlformats.org/presentationml/2006/main" type="titleOnly" preserve="1">
+  <p:cSld name="Title Only">
+    <p:spTree>
+      <p:nvGrpSpPr>
+        <p:cNvPr id="1" name=""/>
+        <p:cNvGrpSpPr/>
+        <p:nvPr/>
+      </p:nvGrpSpPr>
+      <p:grpSpPr>
+        <a:xfrm>
+          <a:off x="0" y="0"/>
+          <a:ext cx="0" cy="0"/>
+          <a:chOff x="0" y="0"/>
+          <a:chExt cx="0" cy="0"/>
+        </a:xfrm>
+      </p:grpSpPr>
+      <p:sp>
+        <p:nvSpPr>
+          <p:cNvPr id="2" name="Title 1">
+            <a:extLst>
+              <a:ext uri="{FF2B5EF4-FFF2-40B4-BE49-F238E27FC236}">
+                <a16:creationId xmlns:a16="http://schemas.microsoft.com/office/drawing/2014/main" id="{6D71F27F-516C-1530-0782-9E0A8E57B8E9}"/>
+              </a:ext>
+            </a:extLst>
+          </p:cNvPr>
+          <p:cNvSpPr>
+            <a:spLocks noGrp="1"/>
+          </p:cNvSpPr>
+          <p:nvPr>
+            <p:ph type="title"/>
+          </p:nvPr>
+        </p:nvSpPr>
+        <p:spPr>
+          <a:xfrm>
+            <a:off x="0" y="-152853"/>
+            <a:ext cx="12192000" cy="136524"/>
+          </a:xfrm>
+        </p:spPr>
+        <p:txBody>
+          <a:bodyPr/>
+          <a:lstStyle>
+            <a:lvl1pPr>
+              <a:defRPr sz="1100"/>
+            </a:lvl1pPr>
+          </a:lstStyle>
+          <a:p>
+            <a:r>
+              <a:rPr lang="en-US"/>
+              <a:t>Click to edit Master title style</a:t>
+            </a:r>
+            <a:endParaRPr lang="en-CA"/>
+          </a:p>
+        </p:txBody>
+      </p:sp>
+      <p:sp>
+        <p:nvSpPr>
+          <p:cNvPr id="3" name="Date Placeholder 2">
+            <a:extLst>
+              <a:ext uri="{FF2B5EF4-FFF2-40B4-BE49-F238E27FC236}">
+                <a16:creationId xmlns:a16="http://schemas.microsoft.com/office/drawing/2014/main" id="{FA49AEDF-D164-6229-D7CD-B35FA6EE6AD0}"/>
+              </a:ext>
+            </a:extLst>
+          </p:cNvPr>
+          <p:cNvSpPr>
+            <a:spLocks noGrp="1"/>
+          </p:cNvSpPr>
+          <p:nvPr>
+            <p:ph type="dt" sz="half" idx="10"/>
+          </p:nvPr>
+        </p:nvSpPr>
+        <p:spPr/>
+        <p:txBody>
+          <a:bodyPr/>
+          <a:lstStyle/>
+          <a:p>
+            <a:fld id="{B9B56988-3E54-4E96-83C2-E79EB96AA973}" type="datetimeFigureOut">
+              <a:rPr lang="en-CA" smtClean="0"/>
+              <a:t>2025-12-12</a:t>
+            </a:fld>
+            <a:endParaRPr lang="en-CA"/>
+          </a:p>
+        </p:txBody>
+      </p:sp>
+      <p:sp>
+        <p:nvSpPr>
+          <p:cNvPr id="4" name="Footer Placeholder 3">
+            <a:extLst>
+              <a:ext uri="{FF2B5EF4-FFF2-40B4-BE49-F238E27FC236}">
+                <a16:creationId xmlns:a16="http://schemas.microsoft.com/office/drawing/2014/main" id="{1E8F835F-D896-1377-1E6D-0EF655156961}"/>
+              </a:ext>
+            </a:extLst>
+          </p:cNvPr>
+          <p:cNvSpPr>
+            <a:spLocks noGrp="1"/>
+          </p:cNvSpPr>
+          <p:nvPr>
+            <p:ph type="ftr" sz="quarter" idx="11"/>
+          </p:nvPr>
+        </p:nvSpPr>
+        <p:spPr/>
+        <p:txBody>
+          <a:bodyPr/>
+          <a:lstStyle/>
+          <a:p>
+            <a:endParaRPr lang="en-CA"/>
+          </a:p>
+        </p:txBody>
+      </p:sp>
+      <p:sp>
+        <p:nvSpPr>
+          <p:cNvPr id="5" name="Slide Number Placeholder 4">
+            <a:extLst>
+              <a:ext uri="{FF2B5EF4-FFF2-40B4-BE49-F238E27FC236}">
+                <a16:creationId xmlns:a16="http://schemas.microsoft.com/office/drawing/2014/main" id="{72B36F08-49C6-C4D5-5D90-8014CC17F0C5}"/>
+              </a:ext>
+            </a:extLst>
+          </p:cNvPr>
+          <p:cNvSpPr>
+            <a:spLocks noGrp="1"/>
+          </p:cNvSpPr>
+          <p:nvPr>
+            <p:ph type="sldNum" sz="quarter" idx="12"/>
+          </p:nvPr>
+        </p:nvSpPr>
+        <p:spPr/>
+        <p:txBody>
+          <a:bodyPr/>
+          <a:lstStyle/>
+          <a:p>
+            <a:fld id="{80C47A6C-7241-4F58-9E0D-0713A14ED342}" type="slidenum">
+              <a:rPr lang="en-CA" smtClean="0"/>
+              <a:t>‹#›</a:t>
+            </a:fld>
+            <a:endParaRPr lang="en-CA"/>
+          </a:p>
+        </p:txBody>
+      </p:sp>
+    </p:spTree>
+    <p:extLst>
+      <p:ext uri="{BB962C8B-B14F-4D97-AF65-F5344CB8AC3E}">
+        <p14:creationId xmlns:p14="http://schemas.microsoft.com/office/powerpoint/2010/main" val="2195911999"/>
+      </p:ext>
+    </p:extLst>
+  </p:cSld>
+  <p:clrMapOvr>
+    <a:masterClrMapping/>
+  </p:clrMapOvr>
+</p:sldLayout>
+</file>
+
+<file path=ppt/slideLayouts/slideLayout18.xml><?xml version="1.0" encoding="utf-8"?>
+<p:sldLayout xmlns:a="http://schemas.openxmlformats.org/drawingml/2006/main" xmlns:r="http://schemas.openxmlformats.org/officeDocument/2006/relationships" xmlns:p="http://schemas.openxmlformats.org/presentationml/2006/main" type="blank" preserve="1">
+  <p:cSld name="Blank">
+    <p:spTree>
+      <p:nvGrpSpPr>
+        <p:cNvPr id="1" name=""/>
+        <p:cNvGrpSpPr/>
+        <p:nvPr/>
+      </p:nvGrpSpPr>
+      <p:grpSpPr>
+        <a:xfrm>
+          <a:off x="0" y="0"/>
+          <a:ext cx="0" cy="0"/>
+          <a:chOff x="0" y="0"/>
+          <a:chExt cx="0" cy="0"/>
+        </a:xfrm>
+      </p:grpSpPr>
+      <p:sp>
+        <p:nvSpPr>
+          <p:cNvPr id="2" name="Date Placeholder 1">
+            <a:extLst>
+              <a:ext uri="{FF2B5EF4-FFF2-40B4-BE49-F238E27FC236}">
+                <a16:creationId xmlns:a16="http://schemas.microsoft.com/office/drawing/2014/main" id="{EE953F60-5CE9-3E16-E50D-9B1231192E62}"/>
+              </a:ext>
+            </a:extLst>
+          </p:cNvPr>
+          <p:cNvSpPr>
+            <a:spLocks noGrp="1"/>
+          </p:cNvSpPr>
+          <p:nvPr>
+            <p:ph type="dt" sz="half" idx="10"/>
+          </p:nvPr>
+        </p:nvSpPr>
+        <p:spPr/>
+        <p:txBody>
+          <a:bodyPr/>
+          <a:lstStyle/>
+          <a:p>
+            <a:fld id="{B9B56988-3E54-4E96-83C2-E79EB96AA973}" type="datetimeFigureOut">
+              <a:rPr lang="en-CA" smtClean="0"/>
+              <a:t>2025-12-12</a:t>
+            </a:fld>
+            <a:endParaRPr lang="en-CA"/>
+          </a:p>
+        </p:txBody>
+      </p:sp>
+      <p:sp>
+        <p:nvSpPr>
+          <p:cNvPr id="3" name="Footer Placeholder 2">
+            <a:extLst>
+              <a:ext uri="{FF2B5EF4-FFF2-40B4-BE49-F238E27FC236}">
+                <a16:creationId xmlns:a16="http://schemas.microsoft.com/office/drawing/2014/main" id="{B040FC4B-80A6-3232-A1A4-671365ABE477}"/>
+              </a:ext>
+            </a:extLst>
+          </p:cNvPr>
+          <p:cNvSpPr>
+            <a:spLocks noGrp="1"/>
+          </p:cNvSpPr>
+          <p:nvPr>
+            <p:ph type="ftr" sz="quarter" idx="11"/>
+          </p:nvPr>
+        </p:nvSpPr>
+        <p:spPr/>
+        <p:txBody>
+          <a:bodyPr/>
+          <a:lstStyle/>
+          <a:p>
+            <a:endParaRPr lang="en-CA"/>
+          </a:p>
+        </p:txBody>
+      </p:sp>
+      <p:sp>
+        <p:nvSpPr>
+          <p:cNvPr id="4" name="Slide Number Placeholder 3">
+            <a:extLst>
+              <a:ext uri="{FF2B5EF4-FFF2-40B4-BE49-F238E27FC236}">
+                <a16:creationId xmlns:a16="http://schemas.microsoft.com/office/drawing/2014/main" id="{1070AC50-59AD-EE65-D82C-947F160B5CF1}"/>
+              </a:ext>
+            </a:extLst>
+          </p:cNvPr>
+          <p:cNvSpPr>
+            <a:spLocks noGrp="1"/>
+          </p:cNvSpPr>
+          <p:nvPr>
+            <p:ph type="sldNum" sz="quarter" idx="12"/>
+          </p:nvPr>
+        </p:nvSpPr>
+        <p:spPr/>
+        <p:txBody>
+          <a:bodyPr/>
+          <a:lstStyle/>
+          <a:p>
+            <a:fld id="{80C47A6C-7241-4F58-9E0D-0713A14ED342}" type="slidenum">
+              <a:rPr lang="en-CA" smtClean="0"/>
+              <a:t>‹#›</a:t>
+            </a:fld>
+            <a:endParaRPr lang="en-CA"/>
+          </a:p>
+        </p:txBody>
+      </p:sp>
+    </p:spTree>
+    <p:extLst>
+      <p:ext uri="{BB962C8B-B14F-4D97-AF65-F5344CB8AC3E}">
+        <p14:creationId xmlns:p14="http://schemas.microsoft.com/office/powerpoint/2010/main" val="767104399"/>
+      </p:ext>
+    </p:extLst>
+  </p:cSld>
+  <p:clrMapOvr>
+    <a:masterClrMapping/>
+  </p:clrMapOvr>
+</p:sldLayout>
+</file>
+
+<file path=ppt/slideLayouts/slideLayout19.xml><?xml version="1.0" encoding="utf-8"?>
+<p:sldLayout xmlns:a="http://schemas.openxmlformats.org/drawingml/2006/main" xmlns:r="http://schemas.openxmlformats.org/officeDocument/2006/relationships" xmlns:p="http://schemas.openxmlformats.org/presentationml/2006/main" type="objTx" preserve="1">
+  <p:cSld name="Content with Caption">
+    <p:spTree>
+      <p:nvGrpSpPr>
+        <p:cNvPr id="1" name=""/>
+        <p:cNvGrpSpPr/>
+        <p:nvPr/>
+      </p:nvGrpSpPr>
+      <p:grpSpPr>
+        <a:xfrm>
+          <a:off x="0" y="0"/>
+          <a:ext cx="0" cy="0"/>
+          <a:chOff x="0" y="0"/>
+          <a:chExt cx="0" cy="0"/>
+        </a:xfrm>
+      </p:grpSpPr>
+      <p:sp>
+        <p:nvSpPr>
+          <p:cNvPr id="2" name="Title 1">
+            <a:extLst>
+              <a:ext uri="{FF2B5EF4-FFF2-40B4-BE49-F238E27FC236}">
+                <a16:creationId xmlns:a16="http://schemas.microsoft.com/office/drawing/2014/main" id="{A2E19976-198E-F3DC-B8E6-21A25CD671F1}"/>
+              </a:ext>
+            </a:extLst>
+          </p:cNvPr>
+          <p:cNvSpPr>
+            <a:spLocks noGrp="1"/>
+          </p:cNvSpPr>
+          <p:nvPr>
+            <p:ph type="title"/>
+          </p:nvPr>
+        </p:nvSpPr>
+        <p:spPr>
+          <a:xfrm>
+            <a:off x="839788" y="457200"/>
+            <a:ext cx="3932237" cy="1600200"/>
+          </a:xfrm>
+        </p:spPr>
+        <p:txBody>
+          <a:bodyPr anchor="b"/>
+          <a:lstStyle>
+            <a:lvl1pPr>
+              <a:defRPr sz="3200"/>
+            </a:lvl1pPr>
+          </a:lstStyle>
+          <a:p>
+            <a:r>
+              <a:rPr lang="en-US"/>
+              <a:t>Click to edit Master title style</a:t>
+            </a:r>
+            <a:endParaRPr lang="en-CA"/>
+          </a:p>
+        </p:txBody>
+      </p:sp>
+      <p:sp>
+        <p:nvSpPr>
+          <p:cNvPr id="3" name="Content Placeholder 2">
+            <a:extLst>
+              <a:ext uri="{FF2B5EF4-FFF2-40B4-BE49-F238E27FC236}">
+                <a16:creationId xmlns:a16="http://schemas.microsoft.com/office/drawing/2014/main" id="{1E5C4BD6-2D2E-0B71-2AC3-98FEA03B3D30}"/>
+              </a:ext>
+            </a:extLst>
+          </p:cNvPr>
+          <p:cNvSpPr>
+            <a:spLocks noGrp="1"/>
+          </p:cNvSpPr>
+          <p:nvPr>
+            <p:ph idx="1"/>
+          </p:nvPr>
+        </p:nvSpPr>
+        <p:spPr>
+          <a:xfrm>
+            <a:off x="5183188" y="987425"/>
+            <a:ext cx="6172200" cy="4873625"/>
+          </a:xfrm>
+        </p:spPr>
+        <p:txBody>
+          <a:bodyPr/>
+          <a:lstStyle>
+            <a:lvl1pPr>
+              <a:defRPr sz="3200"/>
+            </a:lvl1pPr>
+            <a:lvl2pPr>
+              <a:defRPr sz="2800"/>
+            </a:lvl2pPr>
+            <a:lvl3pPr>
+              <a:defRPr sz="2400"/>
+            </a:lvl3pPr>
+            <a:lvl4pPr>
+              <a:defRPr sz="2000"/>
+            </a:lvl4pPr>
+            <a:lvl5pPr>
+              <a:defRPr sz="2000"/>
+            </a:lvl5pPr>
+            <a:lvl6pPr>
+              <a:defRPr sz="2000"/>
+            </a:lvl6pPr>
+            <a:lvl7pPr>
+              <a:defRPr sz="2000"/>
+            </a:lvl7pPr>
+            <a:lvl8pPr>
+              <a:defRPr sz="2000"/>
+            </a:lvl8pPr>
+            <a:lvl9pPr>
+              <a:defRPr sz="2000"/>
+            </a:lvl9pPr>
+          </a:lstStyle>
+          <a:p>
+            <a:pPr lvl="0"/>
+            <a:r>
+              <a:rPr lang="en-US"/>
+              <a:t>Click to edit Master text styles</a:t>
+            </a:r>
+          </a:p>
+          <a:p>
+            <a:pPr lvl="1"/>
+            <a:r>
+              <a:rPr lang="en-US"/>
+              <a:t>Second level</a:t>
+            </a:r>
+          </a:p>
+          <a:p>
+            <a:pPr lvl="2"/>
+            <a:r>
+              <a:rPr lang="en-US"/>
+              <a:t>Third level</a:t>
+            </a:r>
+          </a:p>
+          <a:p>
+            <a:pPr lvl="3"/>
+            <a:r>
+              <a:rPr lang="en-US"/>
+              <a:t>Fourth level</a:t>
+            </a:r>
+          </a:p>
+          <a:p>
+            <a:pPr lvl="4"/>
+            <a:r>
+              <a:rPr lang="en-US"/>
+              <a:t>Fifth level</a:t>
+            </a:r>
+            <a:endParaRPr lang="en-CA"/>
+          </a:p>
+        </p:txBody>
+      </p:sp>
+      <p:sp>
+        <p:nvSpPr>
+          <p:cNvPr id="4" name="Text Placeholder 3">
+            <a:extLst>
+              <a:ext uri="{FF2B5EF4-FFF2-40B4-BE49-F238E27FC236}">
+                <a16:creationId xmlns:a16="http://schemas.microsoft.com/office/drawing/2014/main" id="{1F787B55-C11A-E615-6200-215A0FCC9CE7}"/>
+              </a:ext>
+            </a:extLst>
+          </p:cNvPr>
+          <p:cNvSpPr>
+            <a:spLocks noGrp="1"/>
+          </p:cNvSpPr>
+          <p:nvPr>
+            <p:ph type="body" sz="half" idx="2"/>
+          </p:nvPr>
+        </p:nvSpPr>
+        <p:spPr>
+          <a:xfrm>
+            <a:off x="839788" y="2057400"/>
+            <a:ext cx="3932237" cy="3811588"/>
+          </a:xfrm>
+        </p:spPr>
+        <p:txBody>
+          <a:bodyPr/>
+          <a:lstStyle>
+            <a:lvl1pPr marL="0" indent="0">
+              <a:buNone/>
+              <a:defRPr sz="1600"/>
+            </a:lvl1pPr>
+            <a:lvl2pPr marL="457200" indent="0">
+              <a:buNone/>
+              <a:defRPr sz="1400"/>
+            </a:lvl2pPr>
+            <a:lvl3pPr marL="914400" indent="0">
+              <a:buNone/>
+              <a:defRPr sz="1200"/>
+            </a:lvl3pPr>
+            <a:lvl4pPr marL="1371600" indent="0">
+              <a:buNone/>
+              <a:defRPr sz="1000"/>
+            </a:lvl4pPr>
+            <a:lvl5pPr marL="1828800" indent="0">
+              <a:buNone/>
+              <a:defRPr sz="1000"/>
+            </a:lvl5pPr>
+            <a:lvl6pPr marL="2286000" indent="0">
+              <a:buNone/>
+              <a:defRPr sz="1000"/>
+            </a:lvl6pPr>
+            <a:lvl7pPr marL="2743200" indent="0">
+              <a:buNone/>
+              <a:defRPr sz="1000"/>
+            </a:lvl7pPr>
+            <a:lvl8pPr marL="3200400" indent="0">
+              <a:buNone/>
+              <a:defRPr sz="1000"/>
+            </a:lvl8pPr>
+            <a:lvl9pPr marL="3657600" indent="0">
+              <a:buNone/>
+              <a:defRPr sz="1000"/>
+            </a:lvl9pPr>
+          </a:lstStyle>
+          <a:p>
+            <a:pPr lvl="0"/>
+            <a:r>
+              <a:rPr lang="en-US"/>
+              <a:t>Click to edit Master text styles</a:t>
+            </a:r>
+          </a:p>
+        </p:txBody>
+      </p:sp>
+      <p:sp>
+        <p:nvSpPr>
+          <p:cNvPr id="5" name="Date Placeholder 4">
+            <a:extLst>
+              <a:ext uri="{FF2B5EF4-FFF2-40B4-BE49-F238E27FC236}">
+                <a16:creationId xmlns:a16="http://schemas.microsoft.com/office/drawing/2014/main" id="{00CBE0E9-2CE6-D475-7293-6BA223C2ABDE}"/>
+              </a:ext>
+            </a:extLst>
+          </p:cNvPr>
+          <p:cNvSpPr>
+            <a:spLocks noGrp="1"/>
+          </p:cNvSpPr>
+          <p:nvPr>
+            <p:ph type="dt" sz="half" idx="10"/>
+          </p:nvPr>
+        </p:nvSpPr>
+        <p:spPr/>
+        <p:txBody>
+          <a:bodyPr/>
+          <a:lstStyle/>
+          <a:p>
+            <a:fld id="{B9B56988-3E54-4E96-83C2-E79EB96AA973}" type="datetimeFigureOut">
+              <a:rPr lang="en-CA" smtClean="0"/>
+              <a:t>2025-12-12</a:t>
+            </a:fld>
+            <a:endParaRPr lang="en-CA"/>
+          </a:p>
+        </p:txBody>
+      </p:sp>
+      <p:sp>
+        <p:nvSpPr>
+          <p:cNvPr id="6" name="Footer Placeholder 5">
+            <a:extLst>
+              <a:ext uri="{FF2B5EF4-FFF2-40B4-BE49-F238E27FC236}">
+                <a16:creationId xmlns:a16="http://schemas.microsoft.com/office/drawing/2014/main" id="{E14B9D67-9512-0033-42EC-2DDDC5EE2F64}"/>
+              </a:ext>
+            </a:extLst>
+          </p:cNvPr>
+          <p:cNvSpPr>
+            <a:spLocks noGrp="1"/>
+          </p:cNvSpPr>
+          <p:nvPr>
+            <p:ph type="ftr" sz="quarter" idx="11"/>
+          </p:nvPr>
+        </p:nvSpPr>
+        <p:spPr/>
+        <p:txBody>
+          <a:bodyPr/>
+          <a:lstStyle/>
+          <a:p>
+            <a:endParaRPr lang="en-CA"/>
+          </a:p>
+        </p:txBody>
+      </p:sp>
+      <p:sp>
+        <p:nvSpPr>
+          <p:cNvPr id="7" name="Slide Number Placeholder 6">
+            <a:extLst>
+              <a:ext uri="{FF2B5EF4-FFF2-40B4-BE49-F238E27FC236}">
+                <a16:creationId xmlns:a16="http://schemas.microsoft.com/office/drawing/2014/main" id="{57A38C6E-A26C-0CB0-5CA7-DC313DA258A0}"/>
+              </a:ext>
+            </a:extLst>
+          </p:cNvPr>
+          <p:cNvSpPr>
+            <a:spLocks noGrp="1"/>
+          </p:cNvSpPr>
+          <p:nvPr>
+            <p:ph type="sldNum" sz="quarter" idx="12"/>
+          </p:nvPr>
+        </p:nvSpPr>
+        <p:spPr/>
+        <p:txBody>
+          <a:bodyPr/>
+          <a:lstStyle/>
+          <a:p>
+            <a:fld id="{80C47A6C-7241-4F58-9E0D-0713A14ED342}" type="slidenum">
+              <a:rPr lang="en-CA" smtClean="0"/>
+              <a:t>‹#›</a:t>
+            </a:fld>
+            <a:endParaRPr lang="en-CA"/>
+          </a:p>
+        </p:txBody>
+      </p:sp>
+    </p:spTree>
+    <p:extLst>
+      <p:ext uri="{BB962C8B-B14F-4D97-AF65-F5344CB8AC3E}">
+        <p14:creationId xmlns:p14="http://schemas.microsoft.com/office/powerpoint/2010/main" val="3057646012"/>
       </p:ext>
     </p:extLst>
   </p:cSld>
@@ -879,7 +2840,7 @@
           <a:p>
             <a:fld id="{4D45891E-2CD5-4CE6-8274-44086644E53A}" type="datetimeFigureOut">
               <a:rPr lang="en-CA" smtClean="0"/>
-              <a:t>2024-11-19</a:t>
+              <a:t>2025-12-15</a:t>
             </a:fld>
             <a:endParaRPr lang="en-CA"/>
           </a:p>
@@ -943,6 +2904,705 @@
     <p:extLst>
       <p:ext uri="{BB962C8B-B14F-4D97-AF65-F5344CB8AC3E}">
         <p14:creationId xmlns:p14="http://schemas.microsoft.com/office/powerpoint/2010/main" val="304971173"/>
+      </p:ext>
+    </p:extLst>
+  </p:cSld>
+  <p:clrMapOvr>
+    <a:masterClrMapping/>
+  </p:clrMapOvr>
+</p:sldLayout>
+</file>
+
+<file path=ppt/slideLayouts/slideLayout20.xml><?xml version="1.0" encoding="utf-8"?>
+<p:sldLayout xmlns:a="http://schemas.openxmlformats.org/drawingml/2006/main" xmlns:r="http://schemas.openxmlformats.org/officeDocument/2006/relationships" xmlns:p="http://schemas.openxmlformats.org/presentationml/2006/main" type="picTx" preserve="1">
+  <p:cSld name="Picture with Caption">
+    <p:spTree>
+      <p:nvGrpSpPr>
+        <p:cNvPr id="1" name=""/>
+        <p:cNvGrpSpPr/>
+        <p:nvPr/>
+      </p:nvGrpSpPr>
+      <p:grpSpPr>
+        <a:xfrm>
+          <a:off x="0" y="0"/>
+          <a:ext cx="0" cy="0"/>
+          <a:chOff x="0" y="0"/>
+          <a:chExt cx="0" cy="0"/>
+        </a:xfrm>
+      </p:grpSpPr>
+      <p:sp>
+        <p:nvSpPr>
+          <p:cNvPr id="2" name="Title 1">
+            <a:extLst>
+              <a:ext uri="{FF2B5EF4-FFF2-40B4-BE49-F238E27FC236}">
+                <a16:creationId xmlns:a16="http://schemas.microsoft.com/office/drawing/2014/main" id="{BE426B79-6300-087E-0B27-DDC81480712C}"/>
+              </a:ext>
+            </a:extLst>
+          </p:cNvPr>
+          <p:cNvSpPr>
+            <a:spLocks noGrp="1"/>
+          </p:cNvSpPr>
+          <p:nvPr>
+            <p:ph type="title"/>
+          </p:nvPr>
+        </p:nvSpPr>
+        <p:spPr>
+          <a:xfrm>
+            <a:off x="839788" y="457200"/>
+            <a:ext cx="3932237" cy="1600200"/>
+          </a:xfrm>
+        </p:spPr>
+        <p:txBody>
+          <a:bodyPr anchor="b"/>
+          <a:lstStyle>
+            <a:lvl1pPr>
+              <a:defRPr sz="3200"/>
+            </a:lvl1pPr>
+          </a:lstStyle>
+          <a:p>
+            <a:r>
+              <a:rPr lang="en-US"/>
+              <a:t>Click to edit Master title style</a:t>
+            </a:r>
+            <a:endParaRPr lang="en-CA"/>
+          </a:p>
+        </p:txBody>
+      </p:sp>
+      <p:sp>
+        <p:nvSpPr>
+          <p:cNvPr id="3" name="Picture Placeholder 2">
+            <a:extLst>
+              <a:ext uri="{FF2B5EF4-FFF2-40B4-BE49-F238E27FC236}">
+                <a16:creationId xmlns:a16="http://schemas.microsoft.com/office/drawing/2014/main" id="{E414EFD4-2A7C-4588-D2FF-CE78F404DF9E}"/>
+              </a:ext>
+            </a:extLst>
+          </p:cNvPr>
+          <p:cNvSpPr>
+            <a:spLocks noGrp="1"/>
+          </p:cNvSpPr>
+          <p:nvPr>
+            <p:ph type="pic" idx="1"/>
+          </p:nvPr>
+        </p:nvSpPr>
+        <p:spPr>
+          <a:xfrm>
+            <a:off x="5183188" y="987425"/>
+            <a:ext cx="6172200" cy="4873625"/>
+          </a:xfrm>
+        </p:spPr>
+        <p:txBody>
+          <a:bodyPr/>
+          <a:lstStyle>
+            <a:lvl1pPr marL="0" indent="0">
+              <a:buNone/>
+              <a:defRPr sz="3200"/>
+            </a:lvl1pPr>
+            <a:lvl2pPr marL="457200" indent="0">
+              <a:buNone/>
+              <a:defRPr sz="2800"/>
+            </a:lvl2pPr>
+            <a:lvl3pPr marL="914400" indent="0">
+              <a:buNone/>
+              <a:defRPr sz="2400"/>
+            </a:lvl3pPr>
+            <a:lvl4pPr marL="1371600" indent="0">
+              <a:buNone/>
+              <a:defRPr sz="2000"/>
+            </a:lvl4pPr>
+            <a:lvl5pPr marL="1828800" indent="0">
+              <a:buNone/>
+              <a:defRPr sz="2000"/>
+            </a:lvl5pPr>
+            <a:lvl6pPr marL="2286000" indent="0">
+              <a:buNone/>
+              <a:defRPr sz="2000"/>
+            </a:lvl6pPr>
+            <a:lvl7pPr marL="2743200" indent="0">
+              <a:buNone/>
+              <a:defRPr sz="2000"/>
+            </a:lvl7pPr>
+            <a:lvl8pPr marL="3200400" indent="0">
+              <a:buNone/>
+              <a:defRPr sz="2000"/>
+            </a:lvl8pPr>
+            <a:lvl9pPr marL="3657600" indent="0">
+              <a:buNone/>
+              <a:defRPr sz="2000"/>
+            </a:lvl9pPr>
+          </a:lstStyle>
+          <a:p>
+            <a:endParaRPr lang="en-CA"/>
+          </a:p>
+        </p:txBody>
+      </p:sp>
+      <p:sp>
+        <p:nvSpPr>
+          <p:cNvPr id="4" name="Text Placeholder 3">
+            <a:extLst>
+              <a:ext uri="{FF2B5EF4-FFF2-40B4-BE49-F238E27FC236}">
+                <a16:creationId xmlns:a16="http://schemas.microsoft.com/office/drawing/2014/main" id="{69A0B135-6A4F-2487-F116-F53CC7F4F57D}"/>
+              </a:ext>
+            </a:extLst>
+          </p:cNvPr>
+          <p:cNvSpPr>
+            <a:spLocks noGrp="1"/>
+          </p:cNvSpPr>
+          <p:nvPr>
+            <p:ph type="body" sz="half" idx="2"/>
+          </p:nvPr>
+        </p:nvSpPr>
+        <p:spPr>
+          <a:xfrm>
+            <a:off x="839788" y="2057400"/>
+            <a:ext cx="3932237" cy="3811588"/>
+          </a:xfrm>
+        </p:spPr>
+        <p:txBody>
+          <a:bodyPr/>
+          <a:lstStyle>
+            <a:lvl1pPr marL="0" indent="0">
+              <a:buNone/>
+              <a:defRPr sz="1600"/>
+            </a:lvl1pPr>
+            <a:lvl2pPr marL="457200" indent="0">
+              <a:buNone/>
+              <a:defRPr sz="1400"/>
+            </a:lvl2pPr>
+            <a:lvl3pPr marL="914400" indent="0">
+              <a:buNone/>
+              <a:defRPr sz="1200"/>
+            </a:lvl3pPr>
+            <a:lvl4pPr marL="1371600" indent="0">
+              <a:buNone/>
+              <a:defRPr sz="1000"/>
+            </a:lvl4pPr>
+            <a:lvl5pPr marL="1828800" indent="0">
+              <a:buNone/>
+              <a:defRPr sz="1000"/>
+            </a:lvl5pPr>
+            <a:lvl6pPr marL="2286000" indent="0">
+              <a:buNone/>
+              <a:defRPr sz="1000"/>
+            </a:lvl6pPr>
+            <a:lvl7pPr marL="2743200" indent="0">
+              <a:buNone/>
+              <a:defRPr sz="1000"/>
+            </a:lvl7pPr>
+            <a:lvl8pPr marL="3200400" indent="0">
+              <a:buNone/>
+              <a:defRPr sz="1000"/>
+            </a:lvl8pPr>
+            <a:lvl9pPr marL="3657600" indent="0">
+              <a:buNone/>
+              <a:defRPr sz="1000"/>
+            </a:lvl9pPr>
+          </a:lstStyle>
+          <a:p>
+            <a:pPr lvl="0"/>
+            <a:r>
+              <a:rPr lang="en-US"/>
+              <a:t>Click to edit Master text styles</a:t>
+            </a:r>
+          </a:p>
+        </p:txBody>
+      </p:sp>
+      <p:sp>
+        <p:nvSpPr>
+          <p:cNvPr id="5" name="Date Placeholder 4">
+            <a:extLst>
+              <a:ext uri="{FF2B5EF4-FFF2-40B4-BE49-F238E27FC236}">
+                <a16:creationId xmlns:a16="http://schemas.microsoft.com/office/drawing/2014/main" id="{0516FB26-128D-724E-E9C3-D0A04B2E2D54}"/>
+              </a:ext>
+            </a:extLst>
+          </p:cNvPr>
+          <p:cNvSpPr>
+            <a:spLocks noGrp="1"/>
+          </p:cNvSpPr>
+          <p:nvPr>
+            <p:ph type="dt" sz="half" idx="10"/>
+          </p:nvPr>
+        </p:nvSpPr>
+        <p:spPr/>
+        <p:txBody>
+          <a:bodyPr/>
+          <a:lstStyle/>
+          <a:p>
+            <a:fld id="{B9B56988-3E54-4E96-83C2-E79EB96AA973}" type="datetimeFigureOut">
+              <a:rPr lang="en-CA" smtClean="0"/>
+              <a:t>2025-12-12</a:t>
+            </a:fld>
+            <a:endParaRPr lang="en-CA"/>
+          </a:p>
+        </p:txBody>
+      </p:sp>
+      <p:sp>
+        <p:nvSpPr>
+          <p:cNvPr id="6" name="Footer Placeholder 5">
+            <a:extLst>
+              <a:ext uri="{FF2B5EF4-FFF2-40B4-BE49-F238E27FC236}">
+                <a16:creationId xmlns:a16="http://schemas.microsoft.com/office/drawing/2014/main" id="{E9FCE351-EDEF-EAC8-5A59-BDEF1F613231}"/>
+              </a:ext>
+            </a:extLst>
+          </p:cNvPr>
+          <p:cNvSpPr>
+            <a:spLocks noGrp="1"/>
+          </p:cNvSpPr>
+          <p:nvPr>
+            <p:ph type="ftr" sz="quarter" idx="11"/>
+          </p:nvPr>
+        </p:nvSpPr>
+        <p:spPr/>
+        <p:txBody>
+          <a:bodyPr/>
+          <a:lstStyle/>
+          <a:p>
+            <a:endParaRPr lang="en-CA"/>
+          </a:p>
+        </p:txBody>
+      </p:sp>
+      <p:sp>
+        <p:nvSpPr>
+          <p:cNvPr id="7" name="Slide Number Placeholder 6">
+            <a:extLst>
+              <a:ext uri="{FF2B5EF4-FFF2-40B4-BE49-F238E27FC236}">
+                <a16:creationId xmlns:a16="http://schemas.microsoft.com/office/drawing/2014/main" id="{D9AE866B-FC79-C08B-1200-78C5949D6587}"/>
+              </a:ext>
+            </a:extLst>
+          </p:cNvPr>
+          <p:cNvSpPr>
+            <a:spLocks noGrp="1"/>
+          </p:cNvSpPr>
+          <p:nvPr>
+            <p:ph type="sldNum" sz="quarter" idx="12"/>
+          </p:nvPr>
+        </p:nvSpPr>
+        <p:spPr/>
+        <p:txBody>
+          <a:bodyPr/>
+          <a:lstStyle/>
+          <a:p>
+            <a:fld id="{80C47A6C-7241-4F58-9E0D-0713A14ED342}" type="slidenum">
+              <a:rPr lang="en-CA" smtClean="0"/>
+              <a:t>‹#›</a:t>
+            </a:fld>
+            <a:endParaRPr lang="en-CA"/>
+          </a:p>
+        </p:txBody>
+      </p:sp>
+    </p:spTree>
+    <p:extLst>
+      <p:ext uri="{BB962C8B-B14F-4D97-AF65-F5344CB8AC3E}">
+        <p14:creationId xmlns:p14="http://schemas.microsoft.com/office/powerpoint/2010/main" val="1334762036"/>
+      </p:ext>
+    </p:extLst>
+  </p:cSld>
+  <p:clrMapOvr>
+    <a:masterClrMapping/>
+  </p:clrMapOvr>
+</p:sldLayout>
+</file>
+
+<file path=ppt/slideLayouts/slideLayout21.xml><?xml version="1.0" encoding="utf-8"?>
+<p:sldLayout xmlns:a="http://schemas.openxmlformats.org/drawingml/2006/main" xmlns:r="http://schemas.openxmlformats.org/officeDocument/2006/relationships" xmlns:p="http://schemas.openxmlformats.org/presentationml/2006/main" type="vertTx" preserve="1">
+  <p:cSld name="Title and Vertical Text">
+    <p:spTree>
+      <p:nvGrpSpPr>
+        <p:cNvPr id="1" name=""/>
+        <p:cNvGrpSpPr/>
+        <p:nvPr/>
+      </p:nvGrpSpPr>
+      <p:grpSpPr>
+        <a:xfrm>
+          <a:off x="0" y="0"/>
+          <a:ext cx="0" cy="0"/>
+          <a:chOff x="0" y="0"/>
+          <a:chExt cx="0" cy="0"/>
+        </a:xfrm>
+      </p:grpSpPr>
+      <p:sp>
+        <p:nvSpPr>
+          <p:cNvPr id="2" name="Title 1">
+            <a:extLst>
+              <a:ext uri="{FF2B5EF4-FFF2-40B4-BE49-F238E27FC236}">
+                <a16:creationId xmlns:a16="http://schemas.microsoft.com/office/drawing/2014/main" id="{59BF9E84-FB81-0652-7C21-5AD56B30C2ED}"/>
+              </a:ext>
+            </a:extLst>
+          </p:cNvPr>
+          <p:cNvSpPr>
+            <a:spLocks noGrp="1"/>
+          </p:cNvSpPr>
+          <p:nvPr>
+            <p:ph type="title"/>
+          </p:nvPr>
+        </p:nvSpPr>
+        <p:spPr/>
+        <p:txBody>
+          <a:bodyPr/>
+          <a:lstStyle/>
+          <a:p>
+            <a:r>
+              <a:rPr lang="en-US"/>
+              <a:t>Click to edit Master title style</a:t>
+            </a:r>
+            <a:endParaRPr lang="en-CA"/>
+          </a:p>
+        </p:txBody>
+      </p:sp>
+      <p:sp>
+        <p:nvSpPr>
+          <p:cNvPr id="3" name="Vertical Text Placeholder 2">
+            <a:extLst>
+              <a:ext uri="{FF2B5EF4-FFF2-40B4-BE49-F238E27FC236}">
+                <a16:creationId xmlns:a16="http://schemas.microsoft.com/office/drawing/2014/main" id="{09FD89D7-F04C-F478-96F6-71C5042F2D19}"/>
+              </a:ext>
+            </a:extLst>
+          </p:cNvPr>
+          <p:cNvSpPr>
+            <a:spLocks noGrp="1"/>
+          </p:cNvSpPr>
+          <p:nvPr>
+            <p:ph type="body" orient="vert" idx="1"/>
+          </p:nvPr>
+        </p:nvSpPr>
+        <p:spPr/>
+        <p:txBody>
+          <a:bodyPr vert="eaVert"/>
+          <a:lstStyle/>
+          <a:p>
+            <a:pPr lvl="0"/>
+            <a:r>
+              <a:rPr lang="en-US"/>
+              <a:t>Click to edit Master text styles</a:t>
+            </a:r>
+          </a:p>
+          <a:p>
+            <a:pPr lvl="1"/>
+            <a:r>
+              <a:rPr lang="en-US"/>
+              <a:t>Second level</a:t>
+            </a:r>
+          </a:p>
+          <a:p>
+            <a:pPr lvl="2"/>
+            <a:r>
+              <a:rPr lang="en-US"/>
+              <a:t>Third level</a:t>
+            </a:r>
+          </a:p>
+          <a:p>
+            <a:pPr lvl="3"/>
+            <a:r>
+              <a:rPr lang="en-US"/>
+              <a:t>Fourth level</a:t>
+            </a:r>
+          </a:p>
+          <a:p>
+            <a:pPr lvl="4"/>
+            <a:r>
+              <a:rPr lang="en-US"/>
+              <a:t>Fifth level</a:t>
+            </a:r>
+            <a:endParaRPr lang="en-CA"/>
+          </a:p>
+        </p:txBody>
+      </p:sp>
+      <p:sp>
+        <p:nvSpPr>
+          <p:cNvPr id="4" name="Date Placeholder 3">
+            <a:extLst>
+              <a:ext uri="{FF2B5EF4-FFF2-40B4-BE49-F238E27FC236}">
+                <a16:creationId xmlns:a16="http://schemas.microsoft.com/office/drawing/2014/main" id="{8F4D943F-0BA5-A89B-6773-8B68F25071DC}"/>
+              </a:ext>
+            </a:extLst>
+          </p:cNvPr>
+          <p:cNvSpPr>
+            <a:spLocks noGrp="1"/>
+          </p:cNvSpPr>
+          <p:nvPr>
+            <p:ph type="dt" sz="half" idx="10"/>
+          </p:nvPr>
+        </p:nvSpPr>
+        <p:spPr/>
+        <p:txBody>
+          <a:bodyPr/>
+          <a:lstStyle/>
+          <a:p>
+            <a:fld id="{B9B56988-3E54-4E96-83C2-E79EB96AA973}" type="datetimeFigureOut">
+              <a:rPr lang="en-CA" smtClean="0"/>
+              <a:t>2025-12-12</a:t>
+            </a:fld>
+            <a:endParaRPr lang="en-CA"/>
+          </a:p>
+        </p:txBody>
+      </p:sp>
+      <p:sp>
+        <p:nvSpPr>
+          <p:cNvPr id="5" name="Footer Placeholder 4">
+            <a:extLst>
+              <a:ext uri="{FF2B5EF4-FFF2-40B4-BE49-F238E27FC236}">
+                <a16:creationId xmlns:a16="http://schemas.microsoft.com/office/drawing/2014/main" id="{4B377580-66B2-D2C5-133B-8FB931D95816}"/>
+              </a:ext>
+            </a:extLst>
+          </p:cNvPr>
+          <p:cNvSpPr>
+            <a:spLocks noGrp="1"/>
+          </p:cNvSpPr>
+          <p:nvPr>
+            <p:ph type="ftr" sz="quarter" idx="11"/>
+          </p:nvPr>
+        </p:nvSpPr>
+        <p:spPr/>
+        <p:txBody>
+          <a:bodyPr/>
+          <a:lstStyle/>
+          <a:p>
+            <a:endParaRPr lang="en-CA"/>
+          </a:p>
+        </p:txBody>
+      </p:sp>
+      <p:sp>
+        <p:nvSpPr>
+          <p:cNvPr id="6" name="Slide Number Placeholder 5">
+            <a:extLst>
+              <a:ext uri="{FF2B5EF4-FFF2-40B4-BE49-F238E27FC236}">
+                <a16:creationId xmlns:a16="http://schemas.microsoft.com/office/drawing/2014/main" id="{355A010E-2DF3-45AD-C4BE-9B72DD8AF5C3}"/>
+              </a:ext>
+            </a:extLst>
+          </p:cNvPr>
+          <p:cNvSpPr>
+            <a:spLocks noGrp="1"/>
+          </p:cNvSpPr>
+          <p:nvPr>
+            <p:ph type="sldNum" sz="quarter" idx="12"/>
+          </p:nvPr>
+        </p:nvSpPr>
+        <p:spPr/>
+        <p:txBody>
+          <a:bodyPr/>
+          <a:lstStyle/>
+          <a:p>
+            <a:fld id="{80C47A6C-7241-4F58-9E0D-0713A14ED342}" type="slidenum">
+              <a:rPr lang="en-CA" smtClean="0"/>
+              <a:t>‹#›</a:t>
+            </a:fld>
+            <a:endParaRPr lang="en-CA"/>
+          </a:p>
+        </p:txBody>
+      </p:sp>
+    </p:spTree>
+    <p:extLst>
+      <p:ext uri="{BB962C8B-B14F-4D97-AF65-F5344CB8AC3E}">
+        <p14:creationId xmlns:p14="http://schemas.microsoft.com/office/powerpoint/2010/main" val="2421728918"/>
+      </p:ext>
+    </p:extLst>
+  </p:cSld>
+  <p:clrMapOvr>
+    <a:masterClrMapping/>
+  </p:clrMapOvr>
+</p:sldLayout>
+</file>
+
+<file path=ppt/slideLayouts/slideLayout22.xml><?xml version="1.0" encoding="utf-8"?>
+<p:sldLayout xmlns:a="http://schemas.openxmlformats.org/drawingml/2006/main" xmlns:r="http://schemas.openxmlformats.org/officeDocument/2006/relationships" xmlns:p="http://schemas.openxmlformats.org/presentationml/2006/main" type="vertTitleAndTx" preserve="1">
+  <p:cSld name="Vertical Title and Text">
+    <p:spTree>
+      <p:nvGrpSpPr>
+        <p:cNvPr id="1" name=""/>
+        <p:cNvGrpSpPr/>
+        <p:nvPr/>
+      </p:nvGrpSpPr>
+      <p:grpSpPr>
+        <a:xfrm>
+          <a:off x="0" y="0"/>
+          <a:ext cx="0" cy="0"/>
+          <a:chOff x="0" y="0"/>
+          <a:chExt cx="0" cy="0"/>
+        </a:xfrm>
+      </p:grpSpPr>
+      <p:sp>
+        <p:nvSpPr>
+          <p:cNvPr id="2" name="Vertical Title 1">
+            <a:extLst>
+              <a:ext uri="{FF2B5EF4-FFF2-40B4-BE49-F238E27FC236}">
+                <a16:creationId xmlns:a16="http://schemas.microsoft.com/office/drawing/2014/main" id="{CB2CD944-C1C0-9909-8BB6-249B2DFECAD6}"/>
+              </a:ext>
+            </a:extLst>
+          </p:cNvPr>
+          <p:cNvSpPr>
+            <a:spLocks noGrp="1"/>
+          </p:cNvSpPr>
+          <p:nvPr>
+            <p:ph type="title" orient="vert"/>
+          </p:nvPr>
+        </p:nvSpPr>
+        <p:spPr>
+          <a:xfrm>
+            <a:off x="8724900" y="365125"/>
+            <a:ext cx="2628900" cy="5811838"/>
+          </a:xfrm>
+        </p:spPr>
+        <p:txBody>
+          <a:bodyPr vert="eaVert"/>
+          <a:lstStyle/>
+          <a:p>
+            <a:r>
+              <a:rPr lang="en-US"/>
+              <a:t>Click to edit Master title style</a:t>
+            </a:r>
+            <a:endParaRPr lang="en-CA"/>
+          </a:p>
+        </p:txBody>
+      </p:sp>
+      <p:sp>
+        <p:nvSpPr>
+          <p:cNvPr id="3" name="Vertical Text Placeholder 2">
+            <a:extLst>
+              <a:ext uri="{FF2B5EF4-FFF2-40B4-BE49-F238E27FC236}">
+                <a16:creationId xmlns:a16="http://schemas.microsoft.com/office/drawing/2014/main" id="{67622379-B920-FBBE-DBD0-A44371E89729}"/>
+              </a:ext>
+            </a:extLst>
+          </p:cNvPr>
+          <p:cNvSpPr>
+            <a:spLocks noGrp="1"/>
+          </p:cNvSpPr>
+          <p:nvPr>
+            <p:ph type="body" orient="vert" idx="1"/>
+          </p:nvPr>
+        </p:nvSpPr>
+        <p:spPr>
+          <a:xfrm>
+            <a:off x="838200" y="365125"/>
+            <a:ext cx="7734300" cy="5811838"/>
+          </a:xfrm>
+        </p:spPr>
+        <p:txBody>
+          <a:bodyPr vert="eaVert"/>
+          <a:lstStyle/>
+          <a:p>
+            <a:pPr lvl="0"/>
+            <a:r>
+              <a:rPr lang="en-US"/>
+              <a:t>Click to edit Master text styles</a:t>
+            </a:r>
+          </a:p>
+          <a:p>
+            <a:pPr lvl="1"/>
+            <a:r>
+              <a:rPr lang="en-US"/>
+              <a:t>Second level</a:t>
+            </a:r>
+          </a:p>
+          <a:p>
+            <a:pPr lvl="2"/>
+            <a:r>
+              <a:rPr lang="en-US"/>
+              <a:t>Third level</a:t>
+            </a:r>
+          </a:p>
+          <a:p>
+            <a:pPr lvl="3"/>
+            <a:r>
+              <a:rPr lang="en-US"/>
+              <a:t>Fourth level</a:t>
+            </a:r>
+          </a:p>
+          <a:p>
+            <a:pPr lvl="4"/>
+            <a:r>
+              <a:rPr lang="en-US"/>
+              <a:t>Fifth level</a:t>
+            </a:r>
+            <a:endParaRPr lang="en-CA"/>
+          </a:p>
+        </p:txBody>
+      </p:sp>
+      <p:sp>
+        <p:nvSpPr>
+          <p:cNvPr id="4" name="Date Placeholder 3">
+            <a:extLst>
+              <a:ext uri="{FF2B5EF4-FFF2-40B4-BE49-F238E27FC236}">
+                <a16:creationId xmlns:a16="http://schemas.microsoft.com/office/drawing/2014/main" id="{9E35A36C-FB33-2002-8ABF-E93738C575F6}"/>
+              </a:ext>
+            </a:extLst>
+          </p:cNvPr>
+          <p:cNvSpPr>
+            <a:spLocks noGrp="1"/>
+          </p:cNvSpPr>
+          <p:nvPr>
+            <p:ph type="dt" sz="half" idx="10"/>
+          </p:nvPr>
+        </p:nvSpPr>
+        <p:spPr/>
+        <p:txBody>
+          <a:bodyPr/>
+          <a:lstStyle/>
+          <a:p>
+            <a:fld id="{B9B56988-3E54-4E96-83C2-E79EB96AA973}" type="datetimeFigureOut">
+              <a:rPr lang="en-CA" smtClean="0"/>
+              <a:t>2025-12-12</a:t>
+            </a:fld>
+            <a:endParaRPr lang="en-CA"/>
+          </a:p>
+        </p:txBody>
+      </p:sp>
+      <p:sp>
+        <p:nvSpPr>
+          <p:cNvPr id="5" name="Footer Placeholder 4">
+            <a:extLst>
+              <a:ext uri="{FF2B5EF4-FFF2-40B4-BE49-F238E27FC236}">
+                <a16:creationId xmlns:a16="http://schemas.microsoft.com/office/drawing/2014/main" id="{C382D71D-FFAB-5EEB-41D2-0055E363651C}"/>
+              </a:ext>
+            </a:extLst>
+          </p:cNvPr>
+          <p:cNvSpPr>
+            <a:spLocks noGrp="1"/>
+          </p:cNvSpPr>
+          <p:nvPr>
+            <p:ph type="ftr" sz="quarter" idx="11"/>
+          </p:nvPr>
+        </p:nvSpPr>
+        <p:spPr/>
+        <p:txBody>
+          <a:bodyPr/>
+          <a:lstStyle/>
+          <a:p>
+            <a:endParaRPr lang="en-CA"/>
+          </a:p>
+        </p:txBody>
+      </p:sp>
+      <p:sp>
+        <p:nvSpPr>
+          <p:cNvPr id="6" name="Slide Number Placeholder 5">
+            <a:extLst>
+              <a:ext uri="{FF2B5EF4-FFF2-40B4-BE49-F238E27FC236}">
+                <a16:creationId xmlns:a16="http://schemas.microsoft.com/office/drawing/2014/main" id="{0C5C61DB-2C1D-F144-DD1D-27C14B24D4B9}"/>
+              </a:ext>
+            </a:extLst>
+          </p:cNvPr>
+          <p:cNvSpPr>
+            <a:spLocks noGrp="1"/>
+          </p:cNvSpPr>
+          <p:nvPr>
+            <p:ph type="sldNum" sz="quarter" idx="12"/>
+          </p:nvPr>
+        </p:nvSpPr>
+        <p:spPr/>
+        <p:txBody>
+          <a:bodyPr/>
+          <a:lstStyle/>
+          <a:p>
+            <a:fld id="{80C47A6C-7241-4F58-9E0D-0713A14ED342}" type="slidenum">
+              <a:rPr lang="en-CA" smtClean="0"/>
+              <a:t>‹#›</a:t>
+            </a:fld>
+            <a:endParaRPr lang="en-CA"/>
+          </a:p>
+        </p:txBody>
+      </p:sp>
+    </p:spTree>
+    <p:extLst>
+      <p:ext uri="{BB962C8B-B14F-4D97-AF65-F5344CB8AC3E}">
+        <p14:creationId xmlns:p14="http://schemas.microsoft.com/office/powerpoint/2010/main" val="3514023998"/>
       </p:ext>
     </p:extLst>
   </p:cSld>
@@ -1155,7 +3815,7 @@
           <a:p>
             <a:fld id="{4D45891E-2CD5-4CE6-8274-44086644E53A}" type="datetimeFigureOut">
               <a:rPr lang="en-CA" smtClean="0"/>
-              <a:t>2024-11-19</a:t>
+              <a:t>2025-12-15</a:t>
             </a:fld>
             <a:endParaRPr lang="en-CA"/>
           </a:p>
@@ -1423,7 +4083,7 @@
           <a:p>
             <a:fld id="{4D45891E-2CD5-4CE6-8274-44086644E53A}" type="datetimeFigureOut">
               <a:rPr lang="en-CA" smtClean="0"/>
-              <a:t>2024-11-19</a:t>
+              <a:t>2025-12-15</a:t>
             </a:fld>
             <a:endParaRPr lang="en-CA"/>
           </a:p>
@@ -1838,7 +4498,7 @@
           <a:p>
             <a:fld id="{4D45891E-2CD5-4CE6-8274-44086644E53A}" type="datetimeFigureOut">
               <a:rPr lang="en-CA" smtClean="0"/>
-              <a:t>2024-11-19</a:t>
+              <a:t>2025-12-15</a:t>
             </a:fld>
             <a:endParaRPr lang="en-CA"/>
           </a:p>
@@ -1944,10 +4604,21 @@
             <p:ph type="title"/>
           </p:nvPr>
         </p:nvSpPr>
-        <p:spPr/>
-        <p:txBody>
-          <a:bodyPr/>
-          <a:lstStyle/>
+        <p:spPr>
+          <a:xfrm>
+            <a:off x="0" y="-136525"/>
+            <a:ext cx="10515600" cy="136525"/>
+          </a:xfrm>
+        </p:spPr>
+        <p:txBody>
+          <a:bodyPr/>
+          <a:lstStyle>
+            <a:lvl1pPr>
+              <a:defRPr sz="1100">
+                <a:latin typeface="Lucida Sans Typewriter" panose="020B0509030504030204" pitchFamily="49" charset="0"/>
+              </a:defRPr>
+            </a:lvl1pPr>
+          </a:lstStyle>
           <a:p>
             <a:r>
               <a:rPr lang="en-US"/>
@@ -1980,7 +4651,7 @@
           <a:p>
             <a:fld id="{4D45891E-2CD5-4CE6-8274-44086644E53A}" type="datetimeFigureOut">
               <a:rPr lang="en-CA" smtClean="0"/>
-              <a:t>2024-11-19</a:t>
+              <a:t>2025-12-15</a:t>
             </a:fld>
             <a:endParaRPr lang="en-CA"/>
           </a:p>
@@ -2093,7 +4764,7 @@
           <a:p>
             <a:fld id="{4D45891E-2CD5-4CE6-8274-44086644E53A}" type="datetimeFigureOut">
               <a:rPr lang="en-CA" smtClean="0"/>
-              <a:t>2024-11-19</a:t>
+              <a:t>2025-12-15</a:t>
             </a:fld>
             <a:endParaRPr lang="en-CA"/>
           </a:p>
@@ -2406,7 +5077,7 @@
           <a:p>
             <a:fld id="{4D45891E-2CD5-4CE6-8274-44086644E53A}" type="datetimeFigureOut">
               <a:rPr lang="en-CA" smtClean="0"/>
-              <a:t>2024-11-19</a:t>
+              <a:t>2025-12-15</a:t>
             </a:fld>
             <a:endParaRPr lang="en-CA"/>
           </a:p>
@@ -2695,7 +5366,7 @@
           <a:p>
             <a:fld id="{4D45891E-2CD5-4CE6-8274-44086644E53A}" type="datetimeFigureOut">
               <a:rPr lang="en-CA" smtClean="0"/>
-              <a:t>2024-11-19</a:t>
+              <a:t>2025-12-15</a:t>
             </a:fld>
             <a:endParaRPr lang="en-CA"/>
           </a:p>
@@ -2938,7 +5609,7 @@
           <a:p>
             <a:fld id="{4D45891E-2CD5-4CE6-8274-44086644E53A}" type="datetimeFigureOut">
               <a:rPr lang="en-CA" smtClean="0"/>
-              <a:t>2024-11-19</a:t>
+              <a:t>2025-12-15</a:t>
             </a:fld>
             <a:endParaRPr lang="en-CA"/>
           </a:p>
@@ -3338,7 +6009,1018 @@
 </p:sldMaster>
 </file>
 
+<file path=ppt/slideMasters/slideMaster2.xml><?xml version="1.0" encoding="utf-8"?>
+<p:sldMaster xmlns:a="http://schemas.openxmlformats.org/drawingml/2006/main" xmlns:r="http://schemas.openxmlformats.org/officeDocument/2006/relationships" xmlns:p="http://schemas.openxmlformats.org/presentationml/2006/main" preserve="1">
+  <p:cSld>
+    <p:bg>
+      <p:bgRef idx="1001">
+        <a:schemeClr val="bg1"/>
+      </p:bgRef>
+    </p:bg>
+    <p:spTree>
+      <p:nvGrpSpPr>
+        <p:cNvPr id="1" name=""/>
+        <p:cNvGrpSpPr/>
+        <p:nvPr/>
+      </p:nvGrpSpPr>
+      <p:grpSpPr>
+        <a:xfrm>
+          <a:off x="0" y="0"/>
+          <a:ext cx="0" cy="0"/>
+          <a:chOff x="0" y="0"/>
+          <a:chExt cx="0" cy="0"/>
+        </a:xfrm>
+      </p:grpSpPr>
+      <p:sp>
+        <p:nvSpPr>
+          <p:cNvPr id="2" name="Title Placeholder 1">
+            <a:extLst>
+              <a:ext uri="{FF2B5EF4-FFF2-40B4-BE49-F238E27FC236}">
+                <a16:creationId xmlns:a16="http://schemas.microsoft.com/office/drawing/2014/main" id="{DEBC2BCA-8090-F6AA-764E-B077AC51756B}"/>
+              </a:ext>
+            </a:extLst>
+          </p:cNvPr>
+          <p:cNvSpPr>
+            <a:spLocks noGrp="1"/>
+          </p:cNvSpPr>
+          <p:nvPr>
+            <p:ph type="title"/>
+          </p:nvPr>
+        </p:nvSpPr>
+        <p:spPr>
+          <a:xfrm>
+            <a:off x="838200" y="365125"/>
+            <a:ext cx="10515600" cy="1325563"/>
+          </a:xfrm>
+          <a:prstGeom prst="rect">
+            <a:avLst/>
+          </a:prstGeom>
+        </p:spPr>
+        <p:txBody>
+          <a:bodyPr vert="horz" lIns="91440" tIns="45720" rIns="91440" bIns="45720" rtlCol="0" anchor="ctr">
+            <a:normAutofit/>
+          </a:bodyPr>
+          <a:lstStyle/>
+          <a:p>
+            <a:r>
+              <a:rPr lang="en-US"/>
+              <a:t>Click to edit Master title style</a:t>
+            </a:r>
+            <a:endParaRPr lang="en-CA"/>
+          </a:p>
+        </p:txBody>
+      </p:sp>
+      <p:sp>
+        <p:nvSpPr>
+          <p:cNvPr id="3" name="Text Placeholder 2">
+            <a:extLst>
+              <a:ext uri="{FF2B5EF4-FFF2-40B4-BE49-F238E27FC236}">
+                <a16:creationId xmlns:a16="http://schemas.microsoft.com/office/drawing/2014/main" id="{51F4B193-ED14-DB98-37B9-6A76AE39D720}"/>
+              </a:ext>
+            </a:extLst>
+          </p:cNvPr>
+          <p:cNvSpPr>
+            <a:spLocks noGrp="1"/>
+          </p:cNvSpPr>
+          <p:nvPr>
+            <p:ph type="body" idx="1"/>
+          </p:nvPr>
+        </p:nvSpPr>
+        <p:spPr>
+          <a:xfrm>
+            <a:off x="838200" y="1825625"/>
+            <a:ext cx="10515600" cy="4351338"/>
+          </a:xfrm>
+          <a:prstGeom prst="rect">
+            <a:avLst/>
+          </a:prstGeom>
+        </p:spPr>
+        <p:txBody>
+          <a:bodyPr vert="horz" lIns="91440" tIns="45720" rIns="91440" bIns="45720" rtlCol="0">
+            <a:normAutofit/>
+          </a:bodyPr>
+          <a:lstStyle/>
+          <a:p>
+            <a:pPr lvl="0"/>
+            <a:r>
+              <a:rPr lang="en-US"/>
+              <a:t>Click to edit Master text styles</a:t>
+            </a:r>
+          </a:p>
+          <a:p>
+            <a:pPr lvl="1"/>
+            <a:r>
+              <a:rPr lang="en-US"/>
+              <a:t>Second level</a:t>
+            </a:r>
+          </a:p>
+          <a:p>
+            <a:pPr lvl="2"/>
+            <a:r>
+              <a:rPr lang="en-US"/>
+              <a:t>Third level</a:t>
+            </a:r>
+          </a:p>
+          <a:p>
+            <a:pPr lvl="3"/>
+            <a:r>
+              <a:rPr lang="en-US"/>
+              <a:t>Fourth level</a:t>
+            </a:r>
+          </a:p>
+          <a:p>
+            <a:pPr lvl="4"/>
+            <a:r>
+              <a:rPr lang="en-US"/>
+              <a:t>Fifth level</a:t>
+            </a:r>
+            <a:endParaRPr lang="en-CA"/>
+          </a:p>
+        </p:txBody>
+      </p:sp>
+      <p:sp>
+        <p:nvSpPr>
+          <p:cNvPr id="4" name="Date Placeholder 3">
+            <a:extLst>
+              <a:ext uri="{FF2B5EF4-FFF2-40B4-BE49-F238E27FC236}">
+                <a16:creationId xmlns:a16="http://schemas.microsoft.com/office/drawing/2014/main" id="{0983AE8E-65CF-5229-ABCF-95179334FEEF}"/>
+              </a:ext>
+            </a:extLst>
+          </p:cNvPr>
+          <p:cNvSpPr>
+            <a:spLocks noGrp="1"/>
+          </p:cNvSpPr>
+          <p:nvPr>
+            <p:ph type="dt" sz="half" idx="2"/>
+          </p:nvPr>
+        </p:nvSpPr>
+        <p:spPr>
+          <a:xfrm>
+            <a:off x="838200" y="6356350"/>
+            <a:ext cx="2743200" cy="365125"/>
+          </a:xfrm>
+          <a:prstGeom prst="rect">
+            <a:avLst/>
+          </a:prstGeom>
+        </p:spPr>
+        <p:txBody>
+          <a:bodyPr vert="horz" lIns="91440" tIns="45720" rIns="91440" bIns="45720" rtlCol="0" anchor="ctr"/>
+          <a:lstStyle>
+            <a:lvl1pPr algn="l">
+              <a:defRPr sz="1200">
+                <a:solidFill>
+                  <a:schemeClr val="tx1">
+                    <a:tint val="75000"/>
+                  </a:schemeClr>
+                </a:solidFill>
+              </a:defRPr>
+            </a:lvl1pPr>
+          </a:lstStyle>
+          <a:p>
+            <a:fld id="{B9B56988-3E54-4E96-83C2-E79EB96AA973}" type="datetimeFigureOut">
+              <a:rPr lang="en-CA" smtClean="0"/>
+              <a:t>2025-12-12</a:t>
+            </a:fld>
+            <a:endParaRPr lang="en-CA"/>
+          </a:p>
+        </p:txBody>
+      </p:sp>
+      <p:sp>
+        <p:nvSpPr>
+          <p:cNvPr id="5" name="Footer Placeholder 4">
+            <a:extLst>
+              <a:ext uri="{FF2B5EF4-FFF2-40B4-BE49-F238E27FC236}">
+                <a16:creationId xmlns:a16="http://schemas.microsoft.com/office/drawing/2014/main" id="{B2044D65-A1A2-DB03-FB68-ED6071B3AEB8}"/>
+              </a:ext>
+            </a:extLst>
+          </p:cNvPr>
+          <p:cNvSpPr>
+            <a:spLocks noGrp="1"/>
+          </p:cNvSpPr>
+          <p:nvPr>
+            <p:ph type="ftr" sz="quarter" idx="3"/>
+          </p:nvPr>
+        </p:nvSpPr>
+        <p:spPr>
+          <a:xfrm>
+            <a:off x="4038600" y="6356350"/>
+            <a:ext cx="4114800" cy="365125"/>
+          </a:xfrm>
+          <a:prstGeom prst="rect">
+            <a:avLst/>
+          </a:prstGeom>
+        </p:spPr>
+        <p:txBody>
+          <a:bodyPr vert="horz" lIns="91440" tIns="45720" rIns="91440" bIns="45720" rtlCol="0" anchor="ctr"/>
+          <a:lstStyle>
+            <a:lvl1pPr algn="ctr">
+              <a:defRPr sz="1200">
+                <a:solidFill>
+                  <a:schemeClr val="tx1">
+                    <a:tint val="75000"/>
+                  </a:schemeClr>
+                </a:solidFill>
+              </a:defRPr>
+            </a:lvl1pPr>
+          </a:lstStyle>
+          <a:p>
+            <a:endParaRPr lang="en-CA"/>
+          </a:p>
+        </p:txBody>
+      </p:sp>
+      <p:sp>
+        <p:nvSpPr>
+          <p:cNvPr id="6" name="Slide Number Placeholder 5">
+            <a:extLst>
+              <a:ext uri="{FF2B5EF4-FFF2-40B4-BE49-F238E27FC236}">
+                <a16:creationId xmlns:a16="http://schemas.microsoft.com/office/drawing/2014/main" id="{64B7D143-D27F-F501-72ED-E7109506FDC7}"/>
+              </a:ext>
+            </a:extLst>
+          </p:cNvPr>
+          <p:cNvSpPr>
+            <a:spLocks noGrp="1"/>
+          </p:cNvSpPr>
+          <p:nvPr>
+            <p:ph type="sldNum" sz="quarter" idx="4"/>
+          </p:nvPr>
+        </p:nvSpPr>
+        <p:spPr>
+          <a:xfrm>
+            <a:off x="8610600" y="6356350"/>
+            <a:ext cx="2743200" cy="365125"/>
+          </a:xfrm>
+          <a:prstGeom prst="rect">
+            <a:avLst/>
+          </a:prstGeom>
+        </p:spPr>
+        <p:txBody>
+          <a:bodyPr vert="horz" lIns="91440" tIns="45720" rIns="91440" bIns="45720" rtlCol="0" anchor="ctr"/>
+          <a:lstStyle>
+            <a:lvl1pPr algn="r">
+              <a:defRPr sz="1200">
+                <a:solidFill>
+                  <a:schemeClr val="tx1">
+                    <a:tint val="75000"/>
+                  </a:schemeClr>
+                </a:solidFill>
+              </a:defRPr>
+            </a:lvl1pPr>
+          </a:lstStyle>
+          <a:p>
+            <a:fld id="{80C47A6C-7241-4F58-9E0D-0713A14ED342}" type="slidenum">
+              <a:rPr lang="en-CA" smtClean="0"/>
+              <a:t>‹#›</a:t>
+            </a:fld>
+            <a:endParaRPr lang="en-CA"/>
+          </a:p>
+        </p:txBody>
+      </p:sp>
+    </p:spTree>
+    <p:extLst>
+      <p:ext uri="{BB962C8B-B14F-4D97-AF65-F5344CB8AC3E}">
+        <p14:creationId xmlns:p14="http://schemas.microsoft.com/office/powerpoint/2010/main" val="1345258703"/>
+      </p:ext>
+    </p:extLst>
+  </p:cSld>
+  <p:clrMap bg1="lt1" tx1="dk1" bg2="lt2" tx2="dk2" accent1="accent1" accent2="accent2" accent3="accent3" accent4="accent4" accent5="accent5" accent6="accent6" hlink="hlink" folHlink="folHlink"/>
+  <p:sldLayoutIdLst>
+    <p:sldLayoutId id="2147483661" r:id="rId1"/>
+    <p:sldLayoutId id="2147483662" r:id="rId2"/>
+    <p:sldLayoutId id="2147483663" r:id="rId3"/>
+    <p:sldLayoutId id="2147483664" r:id="rId4"/>
+    <p:sldLayoutId id="2147483665" r:id="rId5"/>
+    <p:sldLayoutId id="2147483666" r:id="rId6"/>
+    <p:sldLayoutId id="2147483667" r:id="rId7"/>
+    <p:sldLayoutId id="2147483668" r:id="rId8"/>
+    <p:sldLayoutId id="2147483669" r:id="rId9"/>
+    <p:sldLayoutId id="2147483670" r:id="rId10"/>
+    <p:sldLayoutId id="2147483671" r:id="rId11"/>
+  </p:sldLayoutIdLst>
+  <p:txStyles>
+    <p:titleStyle>
+      <a:lvl1pPr algn="l" defTabSz="914400" rtl="0" eaLnBrk="1" latinLnBrk="0" hangingPunct="1">
+        <a:lnSpc>
+          <a:spcPct val="90000"/>
+        </a:lnSpc>
+        <a:spcBef>
+          <a:spcPct val="0"/>
+        </a:spcBef>
+        <a:buNone/>
+        <a:defRPr sz="4400" kern="1200">
+          <a:solidFill>
+            <a:schemeClr val="tx1"/>
+          </a:solidFill>
+          <a:latin typeface="+mj-lt"/>
+          <a:ea typeface="+mj-ea"/>
+          <a:cs typeface="+mj-cs"/>
+        </a:defRPr>
+      </a:lvl1pPr>
+    </p:titleStyle>
+    <p:bodyStyle>
+      <a:lvl1pPr marL="228600" indent="-228600" algn="l" defTabSz="914400" rtl="0" eaLnBrk="1" latinLnBrk="0" hangingPunct="1">
+        <a:lnSpc>
+          <a:spcPct val="90000"/>
+        </a:lnSpc>
+        <a:spcBef>
+          <a:spcPts val="1000"/>
+        </a:spcBef>
+        <a:buFont typeface="Arial" panose="020B0604020202020204" pitchFamily="34" charset="0"/>
+        <a:buChar char="•"/>
+        <a:defRPr sz="2800" kern="1200">
+          <a:solidFill>
+            <a:schemeClr val="tx1"/>
+          </a:solidFill>
+          <a:latin typeface="+mn-lt"/>
+          <a:ea typeface="+mn-ea"/>
+          <a:cs typeface="+mn-cs"/>
+        </a:defRPr>
+      </a:lvl1pPr>
+      <a:lvl2pPr marL="685800" indent="-228600" algn="l" defTabSz="914400" rtl="0" eaLnBrk="1" latinLnBrk="0" hangingPunct="1">
+        <a:lnSpc>
+          <a:spcPct val="90000"/>
+        </a:lnSpc>
+        <a:spcBef>
+          <a:spcPts val="500"/>
+        </a:spcBef>
+        <a:buFont typeface="Arial" panose="020B0604020202020204" pitchFamily="34" charset="0"/>
+        <a:buChar char="•"/>
+        <a:defRPr sz="2400" kern="1200">
+          <a:solidFill>
+            <a:schemeClr val="tx1"/>
+          </a:solidFill>
+          <a:latin typeface="+mn-lt"/>
+          <a:ea typeface="+mn-ea"/>
+          <a:cs typeface="+mn-cs"/>
+        </a:defRPr>
+      </a:lvl2pPr>
+      <a:lvl3pPr marL="1143000" indent="-228600" algn="l" defTabSz="914400" rtl="0" eaLnBrk="1" latinLnBrk="0" hangingPunct="1">
+        <a:lnSpc>
+          <a:spcPct val="90000"/>
+        </a:lnSpc>
+        <a:spcBef>
+          <a:spcPts val="500"/>
+        </a:spcBef>
+        <a:buFont typeface="Arial" panose="020B0604020202020204" pitchFamily="34" charset="0"/>
+        <a:buChar char="•"/>
+        <a:defRPr sz="2000" kern="1200">
+          <a:solidFill>
+            <a:schemeClr val="tx1"/>
+          </a:solidFill>
+          <a:latin typeface="+mn-lt"/>
+          <a:ea typeface="+mn-ea"/>
+          <a:cs typeface="+mn-cs"/>
+        </a:defRPr>
+      </a:lvl3pPr>
+      <a:lvl4pPr marL="1600200" indent="-228600" algn="l" defTabSz="914400" rtl="0" eaLnBrk="1" latinLnBrk="0" hangingPunct="1">
+        <a:lnSpc>
+          <a:spcPct val="90000"/>
+        </a:lnSpc>
+        <a:spcBef>
+          <a:spcPts val="500"/>
+        </a:spcBef>
+        <a:buFont typeface="Arial" panose="020B0604020202020204" pitchFamily="34" charset="0"/>
+        <a:buChar char="•"/>
+        <a:defRPr sz="1800" kern="1200">
+          <a:solidFill>
+            <a:schemeClr val="tx1"/>
+          </a:solidFill>
+          <a:latin typeface="+mn-lt"/>
+          <a:ea typeface="+mn-ea"/>
+          <a:cs typeface="+mn-cs"/>
+        </a:defRPr>
+      </a:lvl4pPr>
+      <a:lvl5pPr marL="2057400" indent="-228600" algn="l" defTabSz="914400" rtl="0" eaLnBrk="1" latinLnBrk="0" hangingPunct="1">
+        <a:lnSpc>
+          <a:spcPct val="90000"/>
+        </a:lnSpc>
+        <a:spcBef>
+          <a:spcPts val="500"/>
+        </a:spcBef>
+        <a:buFont typeface="Arial" panose="020B0604020202020204" pitchFamily="34" charset="0"/>
+        <a:buChar char="•"/>
+        <a:defRPr sz="1800" kern="1200">
+          <a:solidFill>
+            <a:schemeClr val="tx1"/>
+          </a:solidFill>
+          <a:latin typeface="+mn-lt"/>
+          <a:ea typeface="+mn-ea"/>
+          <a:cs typeface="+mn-cs"/>
+        </a:defRPr>
+      </a:lvl5pPr>
+      <a:lvl6pPr marL="2514600" indent="-228600" algn="l" defTabSz="914400" rtl="0" eaLnBrk="1" latinLnBrk="0" hangingPunct="1">
+        <a:lnSpc>
+          <a:spcPct val="90000"/>
+        </a:lnSpc>
+        <a:spcBef>
+          <a:spcPts val="500"/>
+        </a:spcBef>
+        <a:buFont typeface="Arial" panose="020B0604020202020204" pitchFamily="34" charset="0"/>
+        <a:buChar char="•"/>
+        <a:defRPr sz="1800" kern="1200">
+          <a:solidFill>
+            <a:schemeClr val="tx1"/>
+          </a:solidFill>
+          <a:latin typeface="+mn-lt"/>
+          <a:ea typeface="+mn-ea"/>
+          <a:cs typeface="+mn-cs"/>
+        </a:defRPr>
+      </a:lvl6pPr>
+      <a:lvl7pPr marL="2971800" indent="-228600" algn="l" defTabSz="914400" rtl="0" eaLnBrk="1" latinLnBrk="0" hangingPunct="1">
+        <a:lnSpc>
+          <a:spcPct val="90000"/>
+        </a:lnSpc>
+        <a:spcBef>
+          <a:spcPts val="500"/>
+        </a:spcBef>
+        <a:buFont typeface="Arial" panose="020B0604020202020204" pitchFamily="34" charset="0"/>
+        <a:buChar char="•"/>
+        <a:defRPr sz="1800" kern="1200">
+          <a:solidFill>
+            <a:schemeClr val="tx1"/>
+          </a:solidFill>
+          <a:latin typeface="+mn-lt"/>
+          <a:ea typeface="+mn-ea"/>
+          <a:cs typeface="+mn-cs"/>
+        </a:defRPr>
+      </a:lvl7pPr>
+      <a:lvl8pPr marL="3429000" indent="-228600" algn="l" defTabSz="914400" rtl="0" eaLnBrk="1" latinLnBrk="0" hangingPunct="1">
+        <a:lnSpc>
+          <a:spcPct val="90000"/>
+        </a:lnSpc>
+        <a:spcBef>
+          <a:spcPts val="500"/>
+        </a:spcBef>
+        <a:buFont typeface="Arial" panose="020B0604020202020204" pitchFamily="34" charset="0"/>
+        <a:buChar char="•"/>
+        <a:defRPr sz="1800" kern="1200">
+          <a:solidFill>
+            <a:schemeClr val="tx1"/>
+          </a:solidFill>
+          <a:latin typeface="+mn-lt"/>
+          <a:ea typeface="+mn-ea"/>
+          <a:cs typeface="+mn-cs"/>
+        </a:defRPr>
+      </a:lvl8pPr>
+      <a:lvl9pPr marL="3886200" indent="-228600" algn="l" defTabSz="914400" rtl="0" eaLnBrk="1" latinLnBrk="0" hangingPunct="1">
+        <a:lnSpc>
+          <a:spcPct val="90000"/>
+        </a:lnSpc>
+        <a:spcBef>
+          <a:spcPts val="500"/>
+        </a:spcBef>
+        <a:buFont typeface="Arial" panose="020B0604020202020204" pitchFamily="34" charset="0"/>
+        <a:buChar char="•"/>
+        <a:defRPr sz="1800" kern="1200">
+          <a:solidFill>
+            <a:schemeClr val="tx1"/>
+          </a:solidFill>
+          <a:latin typeface="+mn-lt"/>
+          <a:ea typeface="+mn-ea"/>
+          <a:cs typeface="+mn-cs"/>
+        </a:defRPr>
+      </a:lvl9pPr>
+    </p:bodyStyle>
+    <p:otherStyle>
+      <a:defPPr>
+        <a:defRPr lang="en-US"/>
+      </a:defPPr>
+      <a:lvl1pPr marL="0" algn="l" defTabSz="914400" rtl="0" eaLnBrk="1" latinLnBrk="0" hangingPunct="1">
+        <a:defRPr sz="1800" kern="1200">
+          <a:solidFill>
+            <a:schemeClr val="tx1"/>
+          </a:solidFill>
+          <a:latin typeface="+mn-lt"/>
+          <a:ea typeface="+mn-ea"/>
+          <a:cs typeface="+mn-cs"/>
+        </a:defRPr>
+      </a:lvl1pPr>
+      <a:lvl2pPr marL="457200" algn="l" defTabSz="914400" rtl="0" eaLnBrk="1" latinLnBrk="0" hangingPunct="1">
+        <a:defRPr sz="1800" kern="1200">
+          <a:solidFill>
+            <a:schemeClr val="tx1"/>
+          </a:solidFill>
+          <a:latin typeface="+mn-lt"/>
+          <a:ea typeface="+mn-ea"/>
+          <a:cs typeface="+mn-cs"/>
+        </a:defRPr>
+      </a:lvl2pPr>
+      <a:lvl3pPr marL="914400" algn="l" defTabSz="914400" rtl="0" eaLnBrk="1" latinLnBrk="0" hangingPunct="1">
+        <a:defRPr sz="1800" kern="1200">
+          <a:solidFill>
+            <a:schemeClr val="tx1"/>
+          </a:solidFill>
+          <a:latin typeface="+mn-lt"/>
+          <a:ea typeface="+mn-ea"/>
+          <a:cs typeface="+mn-cs"/>
+        </a:defRPr>
+      </a:lvl3pPr>
+      <a:lvl4pPr marL="1371600" algn="l" defTabSz="914400" rtl="0" eaLnBrk="1" latinLnBrk="0" hangingPunct="1">
+        <a:defRPr sz="1800" kern="1200">
+          <a:solidFill>
+            <a:schemeClr val="tx1"/>
+          </a:solidFill>
+          <a:latin typeface="+mn-lt"/>
+          <a:ea typeface="+mn-ea"/>
+          <a:cs typeface="+mn-cs"/>
+        </a:defRPr>
+      </a:lvl4pPr>
+      <a:lvl5pPr marL="1828800" algn="l" defTabSz="914400" rtl="0" eaLnBrk="1" latinLnBrk="0" hangingPunct="1">
+        <a:defRPr sz="1800" kern="1200">
+          <a:solidFill>
+            <a:schemeClr val="tx1"/>
+          </a:solidFill>
+          <a:latin typeface="+mn-lt"/>
+          <a:ea typeface="+mn-ea"/>
+          <a:cs typeface="+mn-cs"/>
+        </a:defRPr>
+      </a:lvl5pPr>
+      <a:lvl6pPr marL="2286000" algn="l" defTabSz="914400" rtl="0" eaLnBrk="1" latinLnBrk="0" hangingPunct="1">
+        <a:defRPr sz="1800" kern="1200">
+          <a:solidFill>
+            <a:schemeClr val="tx1"/>
+          </a:solidFill>
+          <a:latin typeface="+mn-lt"/>
+          <a:ea typeface="+mn-ea"/>
+          <a:cs typeface="+mn-cs"/>
+        </a:defRPr>
+      </a:lvl6pPr>
+      <a:lvl7pPr marL="2743200" algn="l" defTabSz="914400" rtl="0" eaLnBrk="1" latinLnBrk="0" hangingPunct="1">
+        <a:defRPr sz="1800" kern="1200">
+          <a:solidFill>
+            <a:schemeClr val="tx1"/>
+          </a:solidFill>
+          <a:latin typeface="+mn-lt"/>
+          <a:ea typeface="+mn-ea"/>
+          <a:cs typeface="+mn-cs"/>
+        </a:defRPr>
+      </a:lvl7pPr>
+      <a:lvl8pPr marL="3200400" algn="l" defTabSz="914400" rtl="0" eaLnBrk="1" latinLnBrk="0" hangingPunct="1">
+        <a:defRPr sz="1800" kern="1200">
+          <a:solidFill>
+            <a:schemeClr val="tx1"/>
+          </a:solidFill>
+          <a:latin typeface="+mn-lt"/>
+          <a:ea typeface="+mn-ea"/>
+          <a:cs typeface="+mn-cs"/>
+        </a:defRPr>
+      </a:lvl8pPr>
+      <a:lvl9pPr marL="3657600" algn="l" defTabSz="914400" rtl="0" eaLnBrk="1" latinLnBrk="0" hangingPunct="1">
+        <a:defRPr sz="1800" kern="1200">
+          <a:solidFill>
+            <a:schemeClr val="tx1"/>
+          </a:solidFill>
+          <a:latin typeface="+mn-lt"/>
+          <a:ea typeface="+mn-ea"/>
+          <a:cs typeface="+mn-cs"/>
+        </a:defRPr>
+      </a:lvl9pPr>
+    </p:otherStyle>
+  </p:txStyles>
+</p:sldMaster>
+</file>
+
 <file path=ppt/slides/slide1.xml><?xml version="1.0" encoding="utf-8"?>
+<p:sld xmlns:a="http://schemas.openxmlformats.org/drawingml/2006/main" xmlns:r="http://schemas.openxmlformats.org/officeDocument/2006/relationships" xmlns:p="http://schemas.openxmlformats.org/presentationml/2006/main">
+  <p:cSld>
+    <p:spTree>
+      <p:nvGrpSpPr>
+        <p:cNvPr id="1" name=""/>
+        <p:cNvGrpSpPr/>
+        <p:nvPr/>
+      </p:nvGrpSpPr>
+      <p:grpSpPr>
+        <a:xfrm>
+          <a:off x="0" y="0"/>
+          <a:ext cx="0" cy="0"/>
+          <a:chOff x="0" y="0"/>
+          <a:chExt cx="0" cy="0"/>
+        </a:xfrm>
+      </p:grpSpPr>
+      <p:sp>
+        <p:nvSpPr>
+          <p:cNvPr id="2" name="Title 1">
+            <a:extLst>
+              <a:ext uri="{FF2B5EF4-FFF2-40B4-BE49-F238E27FC236}">
+                <a16:creationId xmlns:a16="http://schemas.microsoft.com/office/drawing/2014/main" id="{8B2C3361-6AD5-2E76-3609-27EB3CD85DAC}"/>
+              </a:ext>
+            </a:extLst>
+          </p:cNvPr>
+          <p:cNvSpPr>
+            <a:spLocks noGrp="1"/>
+          </p:cNvSpPr>
+          <p:nvPr>
+            <p:ph type="ctrTitle"/>
+          </p:nvPr>
+        </p:nvSpPr>
+        <p:spPr/>
+        <p:txBody>
+          <a:bodyPr/>
+          <a:lstStyle/>
+          <a:p>
+            <a:endParaRPr lang="en-CA"/>
+          </a:p>
+        </p:txBody>
+      </p:sp>
+      <p:sp>
+        <p:nvSpPr>
+          <p:cNvPr id="3" name="Subtitle 2">
+            <a:extLst>
+              <a:ext uri="{FF2B5EF4-FFF2-40B4-BE49-F238E27FC236}">
+                <a16:creationId xmlns:a16="http://schemas.microsoft.com/office/drawing/2014/main" id="{F62154EC-31F3-0EC8-60FC-C38389EDAE9E}"/>
+              </a:ext>
+            </a:extLst>
+          </p:cNvPr>
+          <p:cNvSpPr>
+            <a:spLocks noGrp="1"/>
+          </p:cNvSpPr>
+          <p:nvPr>
+            <p:ph type="subTitle" idx="1"/>
+          </p:nvPr>
+        </p:nvSpPr>
+        <p:spPr/>
+        <p:txBody>
+          <a:bodyPr/>
+          <a:lstStyle/>
+          <a:p>
+            <a:endParaRPr lang="en-CA"/>
+          </a:p>
+        </p:txBody>
+      </p:sp>
+    </p:spTree>
+    <p:extLst>
+      <p:ext uri="{BB962C8B-B14F-4D97-AF65-F5344CB8AC3E}">
+        <p14:creationId xmlns:p14="http://schemas.microsoft.com/office/powerpoint/2010/main" val="2249028928"/>
+      </p:ext>
+    </p:extLst>
+  </p:cSld>
+  <p:clrMapOvr>
+    <a:masterClrMapping/>
+  </p:clrMapOvr>
+</p:sld>
+</file>
+
+<file path=ppt/slides/slide10.xml><?xml version="1.0" encoding="utf-8"?>
+<p:sld xmlns:a="http://schemas.openxmlformats.org/drawingml/2006/main" xmlns:r="http://schemas.openxmlformats.org/officeDocument/2006/relationships" xmlns:p="http://schemas.openxmlformats.org/presentationml/2006/main">
+  <p:cSld>
+    <p:spTree>
+      <p:nvGrpSpPr>
+        <p:cNvPr id="1" name=""/>
+        <p:cNvGrpSpPr/>
+        <p:nvPr/>
+      </p:nvGrpSpPr>
+      <p:grpSpPr>
+        <a:xfrm>
+          <a:off x="0" y="0"/>
+          <a:ext cx="0" cy="0"/>
+          <a:chOff x="0" y="0"/>
+          <a:chExt cx="0" cy="0"/>
+        </a:xfrm>
+      </p:grpSpPr>
+      <p:pic>
+        <p:nvPicPr>
+          <p:cNvPr id="7" name="Picture 6">
+            <a:extLst>
+              <a:ext uri="{FF2B5EF4-FFF2-40B4-BE49-F238E27FC236}">
+                <a16:creationId xmlns:a16="http://schemas.microsoft.com/office/drawing/2014/main" id="{A176F4C2-F325-EC27-0277-3B51455CF835}"/>
+              </a:ext>
+            </a:extLst>
+          </p:cNvPr>
+          <p:cNvPicPr>
+            <a:picLocks noChangeAspect="1"/>
+          </p:cNvPicPr>
+          <p:nvPr/>
+        </p:nvPicPr>
+        <p:blipFill>
+          <a:blip r:embed="rId2">
+            <a:extLst>
+              <a:ext uri="{28A0092B-C50C-407E-A947-70E740481C1C}">
+                <a14:useLocalDpi xmlns:a14="http://schemas.microsoft.com/office/drawing/2010/main" val="0"/>
+              </a:ext>
+            </a:extLst>
+          </a:blip>
+          <a:srcRect b="40346"/>
+          <a:stretch/>
+        </p:blipFill>
+        <p:spPr>
+          <a:xfrm>
+            <a:off x="920060" y="946446"/>
+            <a:ext cx="5391902" cy="2153805"/>
+          </a:xfrm>
+          <a:prstGeom prst="rect">
+            <a:avLst/>
+          </a:prstGeom>
+        </p:spPr>
+      </p:pic>
+      <p:pic>
+        <p:nvPicPr>
+          <p:cNvPr id="2" name="Picture 1">
+            <a:extLst>
+              <a:ext uri="{FF2B5EF4-FFF2-40B4-BE49-F238E27FC236}">
+                <a16:creationId xmlns:a16="http://schemas.microsoft.com/office/drawing/2014/main" id="{347A3631-1F11-7D9B-4B96-BC34419BEAB2}"/>
+              </a:ext>
+            </a:extLst>
+          </p:cNvPr>
+          <p:cNvPicPr>
+            <a:picLocks noChangeAspect="1"/>
+          </p:cNvPicPr>
+          <p:nvPr/>
+        </p:nvPicPr>
+        <p:blipFill>
+          <a:blip r:embed="rId2">
+            <a:extLst>
+              <a:ext uri="{28A0092B-C50C-407E-A947-70E740481C1C}">
+                <a14:useLocalDpi xmlns:a14="http://schemas.microsoft.com/office/drawing/2010/main" val="0"/>
+              </a:ext>
+            </a:extLst>
+          </a:blip>
+          <a:srcRect t="90046"/>
+          <a:stretch/>
+        </p:blipFill>
+        <p:spPr>
+          <a:xfrm>
+            <a:off x="920060" y="3069607"/>
+            <a:ext cx="5391902" cy="359393"/>
+          </a:xfrm>
+          <a:prstGeom prst="rect">
+            <a:avLst/>
+          </a:prstGeom>
+        </p:spPr>
+      </p:pic>
+    </p:spTree>
+    <p:extLst>
+      <p:ext uri="{BB962C8B-B14F-4D97-AF65-F5344CB8AC3E}">
+        <p14:creationId xmlns:p14="http://schemas.microsoft.com/office/powerpoint/2010/main" val="2802224780"/>
+      </p:ext>
+    </p:extLst>
+  </p:cSld>
+  <p:clrMapOvr>
+    <a:masterClrMapping/>
+  </p:clrMapOvr>
+</p:sld>
+</file>
+
+<file path=ppt/slides/slide11.xml><?xml version="1.0" encoding="utf-8"?>
+<p:sld xmlns:a="http://schemas.openxmlformats.org/drawingml/2006/main" xmlns:r="http://schemas.openxmlformats.org/officeDocument/2006/relationships" xmlns:p="http://schemas.openxmlformats.org/presentationml/2006/main">
+  <p:cSld>
+    <p:spTree>
+      <p:nvGrpSpPr>
+        <p:cNvPr id="1" name=""/>
+        <p:cNvGrpSpPr/>
+        <p:nvPr/>
+      </p:nvGrpSpPr>
+      <p:grpSpPr>
+        <a:xfrm>
+          <a:off x="0" y="0"/>
+          <a:ext cx="0" cy="0"/>
+          <a:chOff x="0" y="0"/>
+          <a:chExt cx="0" cy="0"/>
+        </a:xfrm>
+      </p:grpSpPr>
+      <p:pic>
+        <p:nvPicPr>
+          <p:cNvPr id="3" name="Picture 2">
+            <a:extLst>
+              <a:ext uri="{FF2B5EF4-FFF2-40B4-BE49-F238E27FC236}">
+                <a16:creationId xmlns:a16="http://schemas.microsoft.com/office/drawing/2014/main" id="{71CE1145-D278-D059-F862-0CFDFCFCF25B}"/>
+              </a:ext>
+            </a:extLst>
+          </p:cNvPr>
+          <p:cNvPicPr>
+            <a:picLocks noChangeAspect="1"/>
+          </p:cNvPicPr>
+          <p:nvPr/>
+        </p:nvPicPr>
+        <p:blipFill>
+          <a:blip r:embed="rId2">
+            <a:extLst>
+              <a:ext uri="{28A0092B-C50C-407E-A947-70E740481C1C}">
+                <a14:useLocalDpi xmlns:a14="http://schemas.microsoft.com/office/drawing/2010/main" val="0"/>
+              </a:ext>
+            </a:extLst>
+          </a:blip>
+          <a:stretch>
+            <a:fillRect/>
+          </a:stretch>
+        </p:blipFill>
+        <p:spPr>
+          <a:xfrm>
+            <a:off x="0" y="707820"/>
+            <a:ext cx="12192000" cy="5442360"/>
+          </a:xfrm>
+          <a:prstGeom prst="rect">
+            <a:avLst/>
+          </a:prstGeom>
+        </p:spPr>
+      </p:pic>
+    </p:spTree>
+    <p:extLst>
+      <p:ext uri="{BB962C8B-B14F-4D97-AF65-F5344CB8AC3E}">
+        <p14:creationId xmlns:p14="http://schemas.microsoft.com/office/powerpoint/2010/main" val="2812427647"/>
+      </p:ext>
+    </p:extLst>
+  </p:cSld>
+  <p:clrMapOvr>
+    <a:masterClrMapping/>
+  </p:clrMapOvr>
+</p:sld>
+</file>
+
+<file path=ppt/slides/slide2.xml><?xml version="1.0" encoding="utf-8"?>
+<p:sld xmlns:a="http://schemas.openxmlformats.org/drawingml/2006/main" xmlns:r="http://schemas.openxmlformats.org/officeDocument/2006/relationships" xmlns:p="http://schemas.openxmlformats.org/presentationml/2006/main">
+  <p:cSld>
+    <p:spTree>
+      <p:nvGrpSpPr>
+        <p:cNvPr id="1" name="">
+          <a:extLst>
+            <a:ext uri="{FF2B5EF4-FFF2-40B4-BE49-F238E27FC236}">
+              <a16:creationId xmlns:a16="http://schemas.microsoft.com/office/drawing/2014/main" id="{61C050F0-2EAB-B928-47B9-F7E7766069B2}"/>
+            </a:ext>
+          </a:extLst>
+        </p:cNvPr>
+        <p:cNvGrpSpPr/>
+        <p:nvPr/>
+      </p:nvGrpSpPr>
+      <p:grpSpPr>
+        <a:xfrm>
+          <a:off x="0" y="0"/>
+          <a:ext cx="0" cy="0"/>
+          <a:chOff x="0" y="0"/>
+          <a:chExt cx="0" cy="0"/>
+        </a:xfrm>
+      </p:grpSpPr>
+      <p:sp>
+        <p:nvSpPr>
+          <p:cNvPr id="2" name="Title 1">
+            <a:extLst>
+              <a:ext uri="{FF2B5EF4-FFF2-40B4-BE49-F238E27FC236}">
+                <a16:creationId xmlns:a16="http://schemas.microsoft.com/office/drawing/2014/main" id="{203F2942-B9A1-17A1-E0AE-EB2C522CF5ED}"/>
+              </a:ext>
+            </a:extLst>
+          </p:cNvPr>
+          <p:cNvSpPr>
+            <a:spLocks noGrp="1"/>
+          </p:cNvSpPr>
+          <p:nvPr>
+            <p:ph type="title"/>
+          </p:nvPr>
+        </p:nvSpPr>
+        <p:spPr/>
+        <p:txBody>
+          <a:bodyPr>
+            <a:normAutofit fontScale="90000"/>
+          </a:bodyPr>
+          <a:lstStyle/>
+          <a:p>
+            <a:r>
+              <a:rPr lang="en-US"/>
+              <a:t>Excel_LocalDatabase.png</a:t>
+            </a:r>
+            <a:endParaRPr lang="en-CA"/>
+          </a:p>
+        </p:txBody>
+      </p:sp>
+      <p:sp>
+        <p:nvSpPr>
+          <p:cNvPr id="7" name="TextBox 6">
+            <a:extLst>
+              <a:ext uri="{FF2B5EF4-FFF2-40B4-BE49-F238E27FC236}">
+                <a16:creationId xmlns:a16="http://schemas.microsoft.com/office/drawing/2014/main" id="{4B44B7F0-AFEA-9971-3F6E-BC1DE6CCBE14}"/>
+              </a:ext>
+            </a:extLst>
+          </p:cNvPr>
+          <p:cNvSpPr txBox="1"/>
+          <p:nvPr/>
+        </p:nvSpPr>
+        <p:spPr>
+          <a:xfrm>
+            <a:off x="0" y="250306"/>
+            <a:ext cx="12192000" cy="369332"/>
+          </a:xfrm>
+          <a:prstGeom prst="rect">
+            <a:avLst/>
+          </a:prstGeom>
+          <a:noFill/>
+        </p:spPr>
+        <p:txBody>
+          <a:bodyPr wrap="square" rtlCol="0">
+            <a:spAutoFit/>
+          </a:bodyPr>
+          <a:lstStyle/>
+          <a:p>
+            <a:r>
+              <a:rPr lang="en-US"/>
+              <a:t> </a:t>
+            </a:r>
+            <a:endParaRPr lang="en-CA"/>
+          </a:p>
+        </p:txBody>
+      </p:sp>
+      <p:grpSp>
+        <p:nvGrpSpPr>
+          <p:cNvPr id="13" name="Group 12">
+            <a:extLst>
+              <a:ext uri="{FF2B5EF4-FFF2-40B4-BE49-F238E27FC236}">
+                <a16:creationId xmlns:a16="http://schemas.microsoft.com/office/drawing/2014/main" id="{95473FA5-6160-91C0-D4D5-3A432A78975C}"/>
+              </a:ext>
+            </a:extLst>
+          </p:cNvPr>
+          <p:cNvGrpSpPr/>
+          <p:nvPr/>
+        </p:nvGrpSpPr>
+        <p:grpSpPr>
+          <a:xfrm>
+            <a:off x="0" y="250306"/>
+            <a:ext cx="12192000" cy="1714739"/>
+            <a:chOff x="0" y="250306"/>
+            <a:chExt cx="12192000" cy="1714739"/>
+          </a:xfrm>
+        </p:grpSpPr>
+        <p:sp>
+          <p:nvSpPr>
+            <p:cNvPr id="3" name="TextBox 2">
+              <a:extLst>
+                <a:ext uri="{FF2B5EF4-FFF2-40B4-BE49-F238E27FC236}">
+                  <a16:creationId xmlns:a16="http://schemas.microsoft.com/office/drawing/2014/main" id="{5468F7F1-DD3B-AE6F-82A1-6C857537617D}"/>
+                </a:ext>
+              </a:extLst>
+            </p:cNvPr>
+            <p:cNvSpPr txBox="1"/>
+            <p:nvPr/>
+          </p:nvSpPr>
+          <p:spPr>
+            <a:xfrm>
+              <a:off x="0" y="250306"/>
+              <a:ext cx="12192000" cy="369332"/>
+            </a:xfrm>
+            <a:prstGeom prst="rect">
+              <a:avLst/>
+            </a:prstGeom>
+            <a:noFill/>
+          </p:spPr>
+          <p:txBody>
+            <a:bodyPr wrap="square" rtlCol="0">
+              <a:spAutoFit/>
+            </a:bodyPr>
+            <a:lstStyle/>
+            <a:p>
+              <a:r>
+                <a:rPr lang="en-US"/>
+                <a:t> </a:t>
+              </a:r>
+              <a:endParaRPr lang="en-CA"/>
+            </a:p>
+          </p:txBody>
+        </p:sp>
+        <p:pic>
+          <p:nvPicPr>
+            <p:cNvPr id="12" name="Picture 11" descr="A close up of words&#10;&#10;AI-generated content may be incorrect.">
+              <a:extLst>
+                <a:ext uri="{FF2B5EF4-FFF2-40B4-BE49-F238E27FC236}">
+                  <a16:creationId xmlns:a16="http://schemas.microsoft.com/office/drawing/2014/main" id="{A347207F-AC32-1AA0-0805-9FD478F6C006}"/>
+                </a:ext>
+              </a:extLst>
+            </p:cNvPr>
+            <p:cNvPicPr>
+              <a:picLocks noChangeAspect="1"/>
+            </p:cNvPicPr>
+            <p:nvPr/>
+          </p:nvPicPr>
+          <p:blipFill>
+            <a:blip r:embed="rId2"/>
+            <a:stretch>
+              <a:fillRect/>
+            </a:stretch>
+          </p:blipFill>
+          <p:spPr>
+            <a:xfrm>
+              <a:off x="0" y="250306"/>
+              <a:ext cx="3791479" cy="1714739"/>
+            </a:xfrm>
+            <a:prstGeom prst="rect">
+              <a:avLst/>
+            </a:prstGeom>
+            <a:ln>
+              <a:solidFill>
+                <a:schemeClr val="tx1"/>
+              </a:solidFill>
+            </a:ln>
+          </p:spPr>
+        </p:pic>
+      </p:grpSp>
+    </p:spTree>
+    <p:extLst>
+      <p:ext uri="{BB962C8B-B14F-4D97-AF65-F5344CB8AC3E}">
+        <p14:creationId xmlns:p14="http://schemas.microsoft.com/office/powerpoint/2010/main" val="3855484867"/>
+      </p:ext>
+    </p:extLst>
+  </p:cSld>
+  <p:clrMapOvr>
+    <a:masterClrMapping/>
+  </p:clrMapOvr>
+</p:sld>
+</file>
+
+<file path=ppt/slides/slide3.xml><?xml version="1.0" encoding="utf-8"?>
 <p:sld xmlns:a="http://schemas.openxmlformats.org/drawingml/2006/main" xmlns:r="http://schemas.openxmlformats.org/officeDocument/2006/relationships" xmlns:p="http://schemas.openxmlformats.org/presentationml/2006/main">
   <p:cSld>
     <p:spTree>
@@ -3404,7 +7086,7 @@
 </p:sld>
 </file>
 
-<file path=ppt/slides/slide2.xml><?xml version="1.0" encoding="utf-8"?>
+<file path=ppt/slides/slide4.xml><?xml version="1.0" encoding="utf-8"?>
 <p:sld xmlns:a="http://schemas.openxmlformats.org/drawingml/2006/main" xmlns:r="http://schemas.openxmlformats.org/officeDocument/2006/relationships" xmlns:p="http://schemas.openxmlformats.org/presentationml/2006/main">
   <p:cSld>
     <p:spTree>
@@ -3470,7 +7152,7 @@
 </p:sld>
 </file>
 
-<file path=ppt/slides/slide3.xml><?xml version="1.0" encoding="utf-8"?>
+<file path=ppt/slides/slide5.xml><?xml version="1.0" encoding="utf-8"?>
 <p:sld xmlns:a="http://schemas.openxmlformats.org/drawingml/2006/main" xmlns:r="http://schemas.openxmlformats.org/officeDocument/2006/relationships" xmlns:p="http://schemas.openxmlformats.org/presentationml/2006/main">
   <p:cSld>
     <p:spTree>
@@ -3536,7 +7218,7 @@
 </p:sld>
 </file>
 
-<file path=ppt/slides/slide4.xml><?xml version="1.0" encoding="utf-8"?>
+<file path=ppt/slides/slide6.xml><?xml version="1.0" encoding="utf-8"?>
 <p:sld xmlns:a="http://schemas.openxmlformats.org/drawingml/2006/main" xmlns:r="http://schemas.openxmlformats.org/officeDocument/2006/relationships" xmlns:p="http://schemas.openxmlformats.org/presentationml/2006/main">
   <p:cSld>
     <p:spTree>
@@ -3602,7 +7284,7 @@
 </p:sld>
 </file>
 
-<file path=ppt/slides/slide5.xml><?xml version="1.0" encoding="utf-8"?>
+<file path=ppt/slides/slide7.xml><?xml version="1.0" encoding="utf-8"?>
 <p:sld xmlns:a="http://schemas.openxmlformats.org/drawingml/2006/main" xmlns:r="http://schemas.openxmlformats.org/officeDocument/2006/relationships" xmlns:p="http://schemas.openxmlformats.org/presentationml/2006/main">
   <p:cSld>
     <p:spTree>
@@ -3668,7 +7350,7 @@
 </p:sld>
 </file>
 
-<file path=ppt/slides/slide6.xml><?xml version="1.0" encoding="utf-8"?>
+<file path=ppt/slides/slide8.xml><?xml version="1.0" encoding="utf-8"?>
 <p:sld xmlns:a="http://schemas.openxmlformats.org/drawingml/2006/main" xmlns:r="http://schemas.openxmlformats.org/officeDocument/2006/relationships" xmlns:p="http://schemas.openxmlformats.org/presentationml/2006/main">
   <p:cSld>
     <p:spTree>
@@ -3821,7 +7503,7 @@
 </p:sld>
 </file>
 
-<file path=ppt/slides/slide7.xml><?xml version="1.0" encoding="utf-8"?>
+<file path=ppt/slides/slide9.xml><?xml version="1.0" encoding="utf-8"?>
 <p:sld xmlns:a="http://schemas.openxmlformats.org/drawingml/2006/main" xmlns:r="http://schemas.openxmlformats.org/officeDocument/2006/relationships" xmlns:p="http://schemas.openxmlformats.org/presentationml/2006/main">
   <p:cSld>
     <p:spTree>
@@ -4064,172 +7746,6 @@
     <p:extLst>
       <p:ext uri="{BB962C8B-B14F-4D97-AF65-F5344CB8AC3E}">
         <p14:creationId xmlns:p14="http://schemas.microsoft.com/office/powerpoint/2010/main" val="822535812"/>
-      </p:ext>
-    </p:extLst>
-  </p:cSld>
-  <p:clrMapOvr>
-    <a:masterClrMapping/>
-  </p:clrMapOvr>
-</p:sld>
-</file>
-
-<file path=ppt/slides/slide8.xml><?xml version="1.0" encoding="utf-8"?>
-<p:sld xmlns:a="http://schemas.openxmlformats.org/drawingml/2006/main" xmlns:r="http://schemas.openxmlformats.org/officeDocument/2006/relationships" xmlns:p="http://schemas.openxmlformats.org/presentationml/2006/main">
-  <p:cSld>
-    <p:spTree>
-      <p:nvGrpSpPr>
-        <p:cNvPr id="1" name=""/>
-        <p:cNvGrpSpPr/>
-        <p:nvPr/>
-      </p:nvGrpSpPr>
-      <p:grpSpPr>
-        <a:xfrm>
-          <a:off x="0" y="0"/>
-          <a:ext cx="0" cy="0"/>
-          <a:chOff x="0" y="0"/>
-          <a:chExt cx="0" cy="0"/>
-        </a:xfrm>
-      </p:grpSpPr>
-      <p:pic>
-        <p:nvPicPr>
-          <p:cNvPr id="7" name="Picture 6">
-            <a:extLst>
-              <a:ext uri="{FF2B5EF4-FFF2-40B4-BE49-F238E27FC236}">
-                <a16:creationId xmlns:a16="http://schemas.microsoft.com/office/drawing/2014/main" id="{A176F4C2-F325-EC27-0277-3B51455CF835}"/>
-              </a:ext>
-            </a:extLst>
-          </p:cNvPr>
-          <p:cNvPicPr>
-            <a:picLocks noChangeAspect="1"/>
-          </p:cNvPicPr>
-          <p:nvPr/>
-        </p:nvPicPr>
-        <p:blipFill>
-          <a:blip r:embed="rId2">
-            <a:extLst>
-              <a:ext uri="{28A0092B-C50C-407E-A947-70E740481C1C}">
-                <a14:useLocalDpi xmlns:a14="http://schemas.microsoft.com/office/drawing/2010/main" val="0"/>
-              </a:ext>
-            </a:extLst>
-          </a:blip>
-          <a:srcRect b="40346"/>
-          <a:stretch/>
-        </p:blipFill>
-        <p:spPr>
-          <a:xfrm>
-            <a:off x="920060" y="946446"/>
-            <a:ext cx="5391902" cy="2153805"/>
-          </a:xfrm>
-          <a:prstGeom prst="rect">
-            <a:avLst/>
-          </a:prstGeom>
-        </p:spPr>
-      </p:pic>
-      <p:pic>
-        <p:nvPicPr>
-          <p:cNvPr id="2" name="Picture 1">
-            <a:extLst>
-              <a:ext uri="{FF2B5EF4-FFF2-40B4-BE49-F238E27FC236}">
-                <a16:creationId xmlns:a16="http://schemas.microsoft.com/office/drawing/2014/main" id="{347A3631-1F11-7D9B-4B96-BC34419BEAB2}"/>
-              </a:ext>
-            </a:extLst>
-          </p:cNvPr>
-          <p:cNvPicPr>
-            <a:picLocks noChangeAspect="1"/>
-          </p:cNvPicPr>
-          <p:nvPr/>
-        </p:nvPicPr>
-        <p:blipFill>
-          <a:blip r:embed="rId2">
-            <a:extLst>
-              <a:ext uri="{28A0092B-C50C-407E-A947-70E740481C1C}">
-                <a14:useLocalDpi xmlns:a14="http://schemas.microsoft.com/office/drawing/2010/main" val="0"/>
-              </a:ext>
-            </a:extLst>
-          </a:blip>
-          <a:srcRect t="90046"/>
-          <a:stretch/>
-        </p:blipFill>
-        <p:spPr>
-          <a:xfrm>
-            <a:off x="920060" y="3069607"/>
-            <a:ext cx="5391902" cy="359393"/>
-          </a:xfrm>
-          <a:prstGeom prst="rect">
-            <a:avLst/>
-          </a:prstGeom>
-        </p:spPr>
-      </p:pic>
-    </p:spTree>
-    <p:extLst>
-      <p:ext uri="{BB962C8B-B14F-4D97-AF65-F5344CB8AC3E}">
-        <p14:creationId xmlns:p14="http://schemas.microsoft.com/office/powerpoint/2010/main" val="2802224780"/>
-      </p:ext>
-    </p:extLst>
-  </p:cSld>
-  <p:clrMapOvr>
-    <a:masterClrMapping/>
-  </p:clrMapOvr>
-</p:sld>
-</file>
-
-<file path=ppt/slides/slide9.xml><?xml version="1.0" encoding="utf-8"?>
-<p:sld xmlns:a="http://schemas.openxmlformats.org/drawingml/2006/main" xmlns:r="http://schemas.openxmlformats.org/officeDocument/2006/relationships" xmlns:p="http://schemas.openxmlformats.org/presentationml/2006/main">
-  <p:cSld>
-    <p:spTree>
-      <p:nvGrpSpPr>
-        <p:cNvPr id="1" name=""/>
-        <p:cNvGrpSpPr/>
-        <p:nvPr/>
-      </p:nvGrpSpPr>
-      <p:grpSpPr>
-        <a:xfrm>
-          <a:off x="0" y="0"/>
-          <a:ext cx="0" cy="0"/>
-          <a:chOff x="0" y="0"/>
-          <a:chExt cx="0" cy="0"/>
-        </a:xfrm>
-      </p:grpSpPr>
-      <p:pic>
-        <p:nvPicPr>
-          <p:cNvPr id="3" name="Picture 2">
-            <a:extLst>
-              <a:ext uri="{FF2B5EF4-FFF2-40B4-BE49-F238E27FC236}">
-                <a16:creationId xmlns:a16="http://schemas.microsoft.com/office/drawing/2014/main" id="{71CE1145-D278-D059-F862-0CFDFCFCF25B}"/>
-              </a:ext>
-            </a:extLst>
-          </p:cNvPr>
-          <p:cNvPicPr>
-            <a:picLocks noChangeAspect="1"/>
-          </p:cNvPicPr>
-          <p:nvPr/>
-        </p:nvPicPr>
-        <p:blipFill>
-          <a:blip r:embed="rId2">
-            <a:extLst>
-              <a:ext uri="{28A0092B-C50C-407E-A947-70E740481C1C}">
-                <a14:useLocalDpi xmlns:a14="http://schemas.microsoft.com/office/drawing/2010/main" val="0"/>
-              </a:ext>
-            </a:extLst>
-          </a:blip>
-          <a:stretch>
-            <a:fillRect/>
-          </a:stretch>
-        </p:blipFill>
-        <p:spPr>
-          <a:xfrm>
-            <a:off x="0" y="707820"/>
-            <a:ext cx="12192000" cy="5442360"/>
-          </a:xfrm>
-          <a:prstGeom prst="rect">
-            <a:avLst/>
-          </a:prstGeom>
-        </p:spPr>
-      </p:pic>
-    </p:spTree>
-    <p:extLst>
-      <p:ext uri="{BB962C8B-B14F-4D97-AF65-F5344CB8AC3E}">
-        <p14:creationId xmlns:p14="http://schemas.microsoft.com/office/powerpoint/2010/main" val="2812427647"/>
       </p:ext>
     </p:extLst>
   </p:cSld>
@@ -4532,4 +8048,299 @@
     </a:ext>
   </a:extLst>
 </a:theme>
+</file>
+
+<file path=ppt/theme/theme2.xml><?xml version="1.0" encoding="utf-8"?>
+<a:theme xmlns:a="http://schemas.openxmlformats.org/drawingml/2006/main" name="1_Office Theme">
+  <a:themeElements>
+    <a:clrScheme name="Office">
+      <a:dk1>
+        <a:sysClr val="windowText" lastClr="000000"/>
+      </a:dk1>
+      <a:lt1>
+        <a:sysClr val="window" lastClr="FFFFFF"/>
+      </a:lt1>
+      <a:dk2>
+        <a:srgbClr val="44546A"/>
+      </a:dk2>
+      <a:lt2>
+        <a:srgbClr val="E7E6E6"/>
+      </a:lt2>
+      <a:accent1>
+        <a:srgbClr val="4472C4"/>
+      </a:accent1>
+      <a:accent2>
+        <a:srgbClr val="ED7D31"/>
+      </a:accent2>
+      <a:accent3>
+        <a:srgbClr val="A5A5A5"/>
+      </a:accent3>
+      <a:accent4>
+        <a:srgbClr val="FFC000"/>
+      </a:accent4>
+      <a:accent5>
+        <a:srgbClr val="5B9BD5"/>
+      </a:accent5>
+      <a:accent6>
+        <a:srgbClr val="70AD47"/>
+      </a:accent6>
+      <a:hlink>
+        <a:srgbClr val="0563C1"/>
+      </a:hlink>
+      <a:folHlink>
+        <a:srgbClr val="954F72"/>
+      </a:folHlink>
+    </a:clrScheme>
+    <a:fontScheme name="Office">
+      <a:majorFont>
+        <a:latin typeface="Calibri Light" panose="020F0302020204030204"/>
+        <a:ea typeface=""/>
+        <a:cs typeface=""/>
+        <a:font script="Jpan" typeface="游ゴシック Light"/>
+        <a:font script="Hang" typeface="맑은 고딕"/>
+        <a:font script="Hans" typeface="等线 Light"/>
+        <a:font script="Hant" typeface="新細明體"/>
+        <a:font script="Arab" typeface="Times New Roman"/>
+        <a:font script="Hebr" typeface="Times New Roman"/>
+        <a:font script="Thai" typeface="Angsana New"/>
+        <a:font script="Ethi" typeface="Nyala"/>
+        <a:font script="Beng" typeface="Vrinda"/>
+        <a:font script="Gujr" typeface="Shruti"/>
+        <a:font script="Khmr" typeface="MoolBoran"/>
+        <a:font script="Knda" typeface="Tunga"/>
+        <a:font script="Guru" typeface="Raavi"/>
+        <a:font script="Cans" typeface="Euphemia"/>
+        <a:font script="Cher" typeface="Plantagenet Cherokee"/>
+        <a:font script="Yiii" typeface="Microsoft Yi Baiti"/>
+        <a:font script="Tibt" typeface="Microsoft Himalaya"/>
+        <a:font script="Thaa" typeface="MV Boli"/>
+        <a:font script="Deva" typeface="Mangal"/>
+        <a:font script="Telu" typeface="Gautami"/>
+        <a:font script="Taml" typeface="Latha"/>
+        <a:font script="Syrc" typeface="Estrangelo Edessa"/>
+        <a:font script="Orya" typeface="Kalinga"/>
+        <a:font script="Mlym" typeface="Kartika"/>
+        <a:font script="Laoo" typeface="DokChampa"/>
+        <a:font script="Sinh" typeface="Iskoola Pota"/>
+        <a:font script="Mong" typeface="Mongolian Baiti"/>
+        <a:font script="Viet" typeface="Times New Roman"/>
+        <a:font script="Uigh" typeface="Microsoft Uighur"/>
+        <a:font script="Geor" typeface="Sylfaen"/>
+        <a:font script="Armn" typeface="Arial"/>
+        <a:font script="Bugi" typeface="Leelawadee UI"/>
+        <a:font script="Bopo" typeface="Microsoft JhengHei"/>
+        <a:font script="Java" typeface="Javanese Text"/>
+        <a:font script="Lisu" typeface="Segoe UI"/>
+        <a:font script="Mymr" typeface="Myanmar Text"/>
+        <a:font script="Nkoo" typeface="Ebrima"/>
+        <a:font script="Olck" typeface="Nirmala UI"/>
+        <a:font script="Osma" typeface="Ebrima"/>
+        <a:font script="Phag" typeface="Phagspa"/>
+        <a:font script="Syrn" typeface="Estrangelo Edessa"/>
+        <a:font script="Syrj" typeface="Estrangelo Edessa"/>
+        <a:font script="Syre" typeface="Estrangelo Edessa"/>
+        <a:font script="Sora" typeface="Nirmala UI"/>
+        <a:font script="Tale" typeface="Microsoft Tai Le"/>
+        <a:font script="Talu" typeface="Microsoft New Tai Lue"/>
+        <a:font script="Tfng" typeface="Ebrima"/>
+      </a:majorFont>
+      <a:minorFont>
+        <a:latin typeface="Calibri" panose="020F0502020204030204"/>
+        <a:ea typeface=""/>
+        <a:cs typeface=""/>
+        <a:font script="Jpan" typeface="游ゴシック"/>
+        <a:font script="Hang" typeface="맑은 고딕"/>
+        <a:font script="Hans" typeface="等线"/>
+        <a:font script="Hant" typeface="新細明體"/>
+        <a:font script="Arab" typeface="Arial"/>
+        <a:font script="Hebr" typeface="Arial"/>
+        <a:font script="Thai" typeface="Cordia New"/>
+        <a:font script="Ethi" typeface="Nyala"/>
+        <a:font script="Beng" typeface="Vrinda"/>
+        <a:font script="Gujr" typeface="Shruti"/>
+        <a:font script="Khmr" typeface="DaunPenh"/>
+        <a:font script="Knda" typeface="Tunga"/>
+        <a:font script="Guru" typeface="Raavi"/>
+        <a:font script="Cans" typeface="Euphemia"/>
+        <a:font script="Cher" typeface="Plantagenet Cherokee"/>
+        <a:font script="Yiii" typeface="Microsoft Yi Baiti"/>
+        <a:font script="Tibt" typeface="Microsoft Himalaya"/>
+        <a:font script="Thaa" typeface="MV Boli"/>
+        <a:font script="Deva" typeface="Mangal"/>
+        <a:font script="Telu" typeface="Gautami"/>
+        <a:font script="Taml" typeface="Latha"/>
+        <a:font script="Syrc" typeface="Estrangelo Edessa"/>
+        <a:font script="Orya" typeface="Kalinga"/>
+        <a:font script="Mlym" typeface="Kartika"/>
+        <a:font script="Laoo" typeface="DokChampa"/>
+        <a:font script="Sinh" typeface="Iskoola Pota"/>
+        <a:font script="Mong" typeface="Mongolian Baiti"/>
+        <a:font script="Viet" typeface="Arial"/>
+        <a:font script="Uigh" typeface="Microsoft Uighur"/>
+        <a:font script="Geor" typeface="Sylfaen"/>
+        <a:font script="Armn" typeface="Arial"/>
+        <a:font script="Bugi" typeface="Leelawadee UI"/>
+        <a:font script="Bopo" typeface="Microsoft JhengHei"/>
+        <a:font script="Java" typeface="Javanese Text"/>
+        <a:font script="Lisu" typeface="Segoe UI"/>
+        <a:font script="Mymr" typeface="Myanmar Text"/>
+        <a:font script="Nkoo" typeface="Ebrima"/>
+        <a:font script="Olck" typeface="Nirmala UI"/>
+        <a:font script="Osma" typeface="Ebrima"/>
+        <a:font script="Phag" typeface="Phagspa"/>
+        <a:font script="Syrn" typeface="Estrangelo Edessa"/>
+        <a:font script="Syrj" typeface="Estrangelo Edessa"/>
+        <a:font script="Syre" typeface="Estrangelo Edessa"/>
+        <a:font script="Sora" typeface="Nirmala UI"/>
+        <a:font script="Tale" typeface="Microsoft Tai Le"/>
+        <a:font script="Talu" typeface="Microsoft New Tai Lue"/>
+        <a:font script="Tfng" typeface="Ebrima"/>
+      </a:minorFont>
+    </a:fontScheme>
+    <a:fmtScheme name="Office">
+      <a:fillStyleLst>
+        <a:solidFill>
+          <a:schemeClr val="phClr"/>
+        </a:solidFill>
+        <a:gradFill rotWithShape="1">
+          <a:gsLst>
+            <a:gs pos="0">
+              <a:schemeClr val="phClr">
+                <a:lumMod val="110000"/>
+                <a:satMod val="105000"/>
+                <a:tint val="67000"/>
+              </a:schemeClr>
+            </a:gs>
+            <a:gs pos="50000">
+              <a:schemeClr val="phClr">
+                <a:lumMod val="105000"/>
+                <a:satMod val="103000"/>
+                <a:tint val="73000"/>
+              </a:schemeClr>
+            </a:gs>
+            <a:gs pos="100000">
+              <a:schemeClr val="phClr">
+                <a:lumMod val="105000"/>
+                <a:satMod val="109000"/>
+                <a:tint val="81000"/>
+              </a:schemeClr>
+            </a:gs>
+          </a:gsLst>
+          <a:lin ang="5400000" scaled="0"/>
+        </a:gradFill>
+        <a:gradFill rotWithShape="1">
+          <a:gsLst>
+            <a:gs pos="0">
+              <a:schemeClr val="phClr">
+                <a:satMod val="103000"/>
+                <a:lumMod val="102000"/>
+                <a:tint val="94000"/>
+              </a:schemeClr>
+            </a:gs>
+            <a:gs pos="50000">
+              <a:schemeClr val="phClr">
+                <a:satMod val="110000"/>
+                <a:lumMod val="100000"/>
+                <a:shade val="100000"/>
+              </a:schemeClr>
+            </a:gs>
+            <a:gs pos="100000">
+              <a:schemeClr val="phClr">
+                <a:lumMod val="99000"/>
+                <a:satMod val="120000"/>
+                <a:shade val="78000"/>
+              </a:schemeClr>
+            </a:gs>
+          </a:gsLst>
+          <a:lin ang="5400000" scaled="0"/>
+        </a:gradFill>
+      </a:fillStyleLst>
+      <a:lnStyleLst>
+        <a:ln w="6350" cap="flat" cmpd="sng" algn="ctr">
+          <a:solidFill>
+            <a:schemeClr val="phClr"/>
+          </a:solidFill>
+          <a:prstDash val="solid"/>
+          <a:miter lim="800000"/>
+        </a:ln>
+        <a:ln w="12700" cap="flat" cmpd="sng" algn="ctr">
+          <a:solidFill>
+            <a:schemeClr val="phClr"/>
+          </a:solidFill>
+          <a:prstDash val="solid"/>
+          <a:miter lim="800000"/>
+        </a:ln>
+        <a:ln w="19050" cap="flat" cmpd="sng" algn="ctr">
+          <a:solidFill>
+            <a:schemeClr val="phClr"/>
+          </a:solidFill>
+          <a:prstDash val="solid"/>
+          <a:miter lim="800000"/>
+        </a:ln>
+      </a:lnStyleLst>
+      <a:effectStyleLst>
+        <a:effectStyle>
+          <a:effectLst/>
+        </a:effectStyle>
+        <a:effectStyle>
+          <a:effectLst/>
+        </a:effectStyle>
+        <a:effectStyle>
+          <a:effectLst>
+            <a:outerShdw blurRad="57150" dist="19050" dir="5400000" algn="ctr" rotWithShape="0">
+              <a:srgbClr val="000000">
+                <a:alpha val="63000"/>
+              </a:srgbClr>
+            </a:outerShdw>
+          </a:effectLst>
+        </a:effectStyle>
+      </a:effectStyleLst>
+      <a:bgFillStyleLst>
+        <a:solidFill>
+          <a:schemeClr val="phClr"/>
+        </a:solidFill>
+        <a:solidFill>
+          <a:schemeClr val="phClr">
+            <a:tint val="95000"/>
+            <a:satMod val="170000"/>
+          </a:schemeClr>
+        </a:solidFill>
+        <a:gradFill rotWithShape="1">
+          <a:gsLst>
+            <a:gs pos="0">
+              <a:schemeClr val="phClr">
+                <a:tint val="93000"/>
+                <a:satMod val="150000"/>
+                <a:shade val="98000"/>
+                <a:lumMod val="102000"/>
+              </a:schemeClr>
+            </a:gs>
+            <a:gs pos="50000">
+              <a:schemeClr val="phClr">
+                <a:tint val="98000"/>
+                <a:satMod val="130000"/>
+                <a:shade val="90000"/>
+                <a:lumMod val="103000"/>
+              </a:schemeClr>
+            </a:gs>
+            <a:gs pos="100000">
+              <a:schemeClr val="phClr">
+                <a:shade val="63000"/>
+                <a:satMod val="120000"/>
+              </a:schemeClr>
+            </a:gs>
+          </a:gsLst>
+          <a:lin ang="5400000" scaled="0"/>
+        </a:gradFill>
+      </a:bgFillStyleLst>
+    </a:fmtScheme>
+  </a:themeElements>
+  <a:objectDefaults/>
+  <a:extraClrSchemeLst/>
+  <a:extLst>
+    <a:ext uri="{05A4C25C-085E-4340-85A3-A5531E510DB2}">
+      <thm15:themeFamily xmlns:thm15="http://schemas.microsoft.com/office/thememl/2012/main" name="Office Theme" id="{62F939B6-93AF-4DB8-9C6B-D6C7DFDC589F}" vid="{4A3C46E8-61CC-4603-A589-7422A47A8E4A}"/>
+    </a:ext>
+  </a:extLst>
+</a:theme>
 </file>
</xml_diff>